<commit_message>
More paper and presentation fixes/changes.
git-svn-id: https://scm.projects.hlrs.de/svn/ls1/MarDyn/branches/AndreasKirsch@799 a63bd714-7e14-4b5e-94e7-302c8c8ff188
</commit_message>
<xml_diff>
--- a/paper/presentation.pptx
+++ b/paper/presentation.pptx
@@ -5,22 +5,21 @@
     <p:sldMasterId id="2147483666" r:id="rId1"/>
   </p:sldMasterIdLst>
   <p:notesMasterIdLst>
-    <p:notesMasterId r:id="rId15"/>
+    <p:notesMasterId r:id="rId14"/>
   </p:notesMasterIdLst>
   <p:sldIdLst>
     <p:sldId id="257" r:id="rId2"/>
-    <p:sldId id="258" r:id="rId3"/>
-    <p:sldId id="259" r:id="rId4"/>
-    <p:sldId id="261" r:id="rId5"/>
-    <p:sldId id="260" r:id="rId6"/>
-    <p:sldId id="265" r:id="rId7"/>
-    <p:sldId id="262" r:id="rId8"/>
-    <p:sldId id="263" r:id="rId9"/>
-    <p:sldId id="264" r:id="rId10"/>
-    <p:sldId id="266" r:id="rId11"/>
-    <p:sldId id="267" r:id="rId12"/>
-    <p:sldId id="268" r:id="rId13"/>
-    <p:sldId id="269" r:id="rId14"/>
+    <p:sldId id="270" r:id="rId3"/>
+    <p:sldId id="261" r:id="rId4"/>
+    <p:sldId id="260" r:id="rId5"/>
+    <p:sldId id="265" r:id="rId6"/>
+    <p:sldId id="262" r:id="rId7"/>
+    <p:sldId id="263" r:id="rId8"/>
+    <p:sldId id="264" r:id="rId9"/>
+    <p:sldId id="266" r:id="rId10"/>
+    <p:sldId id="267" r:id="rId11"/>
+    <p:sldId id="268" r:id="rId12"/>
+    <p:sldId id="269" r:id="rId13"/>
   </p:sldIdLst>
   <p:sldSz cx="9144000" cy="6858000" type="screen4x3"/>
   <p:notesSz cx="6858000" cy="9144000"/>
@@ -174,10 +173,10 @@
                   <c:v>57.03002</c:v>
                 </c:pt>
                 <c:pt idx="2">
-                  <c:v>203.99020000000002</c:v>
+                  <c:v>203.99020000000004</c:v>
                 </c:pt>
                 <c:pt idx="3">
-                  <c:v>689.88759999999991</c:v>
+                  <c:v>689.88759999999979</c:v>
                 </c:pt>
                 <c:pt idx="4">
                   <c:v>1828.002</c:v>
@@ -230,7 +229,7 @@
                   <c:v>7.650366</c:v>
                 </c:pt>
                 <c:pt idx="1">
-                  <c:v>59.026650000000004</c:v>
+                  <c:v>59.026650000000011</c:v>
                 </c:pt>
                 <c:pt idx="2">
                   <c:v>217.91130000000001</c:v>
@@ -242,7 +241,7 @@
                   <c:v>2640.7059999999997</c:v>
                 </c:pt>
                 <c:pt idx="5">
-                  <c:v>9042.7459999999974</c:v>
+                  <c:v>9042.7459999999955</c:v>
                 </c:pt>
               </c:numCache>
             </c:numRef>
@@ -298,7 +297,7 @@
                   <c:v>4.4110519999999998</c:v>
                 </c:pt>
                 <c:pt idx="2">
-                  <c:v>11.114289999999999</c:v>
+                  <c:v>11.11429</c:v>
                 </c:pt>
                 <c:pt idx="3">
                   <c:v>33.465260000000001</c:v>
@@ -357,22 +356,22 @@
                 <c:formatCode>0.00E+00</c:formatCode>
                 <c:ptCount val="6"/>
                 <c:pt idx="0">
-                  <c:v>4.9185359999999987</c:v>
+                  <c:v>4.9185359999999978</c:v>
                 </c:pt>
                 <c:pt idx="1">
-                  <c:v>5.7502640000000005</c:v>
+                  <c:v>5.7502640000000014</c:v>
                 </c:pt>
                 <c:pt idx="2">
-                  <c:v>12.989080000000001</c:v>
+                  <c:v>12.989080000000003</c:v>
                 </c:pt>
                 <c:pt idx="3">
                   <c:v>36.925960000000003</c:v>
                 </c:pt>
                 <c:pt idx="4">
-                  <c:v>103.60579999999999</c:v>
+                  <c:v>103.60579999999997</c:v>
                 </c:pt>
                 <c:pt idx="5">
-                  <c:v>460.47829999999993</c:v>
+                  <c:v>460.47829999999988</c:v>
                 </c:pt>
               </c:numCache>
             </c:numRef>
@@ -422,13 +421,13 @@
                 <c:formatCode>0.00E+00</c:formatCode>
                 <c:ptCount val="7"/>
                 <c:pt idx="0">
-                  <c:v>6.1424709999999987</c:v>
+                  <c:v>6.1424709999999978</c:v>
                 </c:pt>
                 <c:pt idx="1">
                   <c:v>4.0530939999999998</c:v>
                 </c:pt>
                 <c:pt idx="2">
-                  <c:v>8.8355450000000033</c:v>
+                  <c:v>8.8355450000000051</c:v>
                 </c:pt>
                 <c:pt idx="3">
                   <c:v>22.91724</c:v>
@@ -499,27 +498,27 @@
                   <c:v>9.2224020000000007</c:v>
                 </c:pt>
                 <c:pt idx="3">
-                  <c:v>23.414729999999995</c:v>
+                  <c:v>23.414729999999988</c:v>
                 </c:pt>
                 <c:pt idx="4">
-                  <c:v>71.597660000000019</c:v>
+                  <c:v>71.597660000000047</c:v>
                 </c:pt>
                 <c:pt idx="5">
-                  <c:v>250.28730000000002</c:v>
+                  <c:v>250.28730000000004</c:v>
                 </c:pt>
                 <c:pt idx="6">
-                  <c:v>465.14139999999992</c:v>
+                  <c:v>465.14139999999986</c:v>
                 </c:pt>
               </c:numCache>
             </c:numRef>
           </c:yVal>
           <c:smooth val="1"/>
         </c:ser>
-        <c:axId val="78562432"/>
-        <c:axId val="78564352"/>
+        <c:axId val="80163968"/>
+        <c:axId val="80165888"/>
       </c:scatterChart>
       <c:valAx>
-        <c:axId val="78562432"/>
+        <c:axId val="80163968"/>
         <c:scaling>
           <c:orientation val="minMax"/>
           <c:max val="50"/>
@@ -546,13 +545,13 @@
         </c:title>
         <c:numFmt formatCode="General" sourceLinked="0"/>
         <c:tickLblPos val="nextTo"/>
-        <c:crossAx val="78564352"/>
+        <c:crossAx val="80165888"/>
         <c:crosses val="autoZero"/>
         <c:crossBetween val="midCat"/>
         <c:majorUnit val="5"/>
       </c:valAx>
       <c:valAx>
-        <c:axId val="78564352"/>
+        <c:axId val="80165888"/>
         <c:scaling>
           <c:logBase val="10"/>
           <c:orientation val="minMax"/>
@@ -580,7 +579,7 @@
         </c:title>
         <c:numFmt formatCode="General" sourceLinked="0"/>
         <c:tickLblPos val="nextTo"/>
-        <c:crossAx val="78562432"/>
+        <c:crossAx val="80163968"/>
         <c:crosses val="autoZero"/>
         <c:crossBetween val="midCat"/>
       </c:valAx>
@@ -656,19 +655,19 @@
                   <c:v>4.986936</c:v>
                 </c:pt>
                 <c:pt idx="1">
-                  <c:v>35.123510000000003</c:v>
+                  <c:v>35.12351000000001</c:v>
                 </c:pt>
                 <c:pt idx="2">
-                  <c:v>121.8083</c:v>
+                  <c:v>121.80829999999999</c:v>
                 </c:pt>
                 <c:pt idx="3">
-                  <c:v>413.29919999999998</c:v>
+                  <c:v>413.29919999999987</c:v>
                 </c:pt>
                 <c:pt idx="4">
                   <c:v>1358.2809999999999</c:v>
                 </c:pt>
                 <c:pt idx="5">
-                  <c:v>4439.1279999999997</c:v>
+                  <c:v>4439.1280000000015</c:v>
                 </c:pt>
               </c:numCache>
             </c:numRef>
@@ -715,10 +714,10 @@
                 <c:formatCode>0.00</c:formatCode>
                 <c:ptCount val="6"/>
                 <c:pt idx="0">
-                  <c:v>3.071968</c:v>
+                  <c:v>3.0719679999999996</c:v>
                 </c:pt>
                 <c:pt idx="1">
-                  <c:v>8.7376850000000008</c:v>
+                  <c:v>8.737684999999999</c:v>
                 </c:pt>
                 <c:pt idx="2">
                   <c:v>25.130849999999999</c:v>
@@ -727,7 +726,7 @@
                   <c:v>74.436170000000004</c:v>
                 </c:pt>
                 <c:pt idx="4">
-                  <c:v>344.20729999999998</c:v>
+                  <c:v>344.20729999999992</c:v>
                 </c:pt>
                 <c:pt idx="5">
                   <c:v>1961.1189999999999</c:v>
@@ -777,19 +776,19 @@
                 <c:formatCode>0.00</c:formatCode>
                 <c:ptCount val="6"/>
                 <c:pt idx="0">
-                  <c:v>5.5388809999999999</c:v>
+                  <c:v>5.5388809999999991</c:v>
                 </c:pt>
                 <c:pt idx="1">
-                  <c:v>5.3609549999999997</c:v>
+                  <c:v>5.3609549999999979</c:v>
                 </c:pt>
                 <c:pt idx="2">
-                  <c:v>14.401730000000001</c:v>
+                  <c:v>14.401730000000002</c:v>
                 </c:pt>
                 <c:pt idx="3">
-                  <c:v>37.649799999999999</c:v>
+                  <c:v>37.649800000000006</c:v>
                 </c:pt>
                 <c:pt idx="4">
-                  <c:v>125.7666</c:v>
+                  <c:v>125.76660000000001</c:v>
                 </c:pt>
                 <c:pt idx="5">
                   <c:v>417.81330000000003</c:v>
@@ -799,11 +798,11 @@
           </c:yVal>
           <c:smooth val="1"/>
         </c:ser>
-        <c:axId val="115918720"/>
-        <c:axId val="112988160"/>
+        <c:axId val="83752064"/>
+        <c:axId val="83753984"/>
       </c:scatterChart>
       <c:valAx>
-        <c:axId val="115918720"/>
+        <c:axId val="83752064"/>
         <c:scaling>
           <c:orientation val="minMax"/>
           <c:max val="40"/>
@@ -830,13 +829,13 @@
         </c:title>
         <c:numFmt formatCode="General" sourceLinked="0"/>
         <c:tickLblPos val="nextTo"/>
-        <c:crossAx val="112988160"/>
+        <c:crossAx val="83753984"/>
         <c:crosses val="autoZero"/>
         <c:crossBetween val="midCat"/>
         <c:majorUnit val="5"/>
       </c:valAx>
       <c:valAx>
-        <c:axId val="112988160"/>
+        <c:axId val="83753984"/>
         <c:scaling>
           <c:logBase val="10"/>
           <c:orientation val="minMax"/>
@@ -864,7 +863,7 @@
         </c:title>
         <c:numFmt formatCode="General" sourceLinked="0"/>
         <c:tickLblPos val="nextTo"/>
-        <c:crossAx val="115918720"/>
+        <c:crossAx val="83752064"/>
         <c:crosses val="autoZero"/>
         <c:crossBetween val="midCat"/>
       </c:valAx>
@@ -1286,22 +1285,93 @@
           <a:p>
             <a:r>
               <a:rPr lang="en-US" dirty="0" smtClean="0"/>
-              <a:t>stress “</a:t>
-            </a:r>
-            <a:r>
-              <a:rPr lang="en-US" b="1" dirty="0" smtClean="0"/>
-              <a:t>efficient</a:t>
+              <a:t>Based on </a:t>
+            </a:r>
+            <a:r>
+              <a:rPr lang="en-US" dirty="0" err="1" smtClean="0"/>
+              <a:t>MarDyn</a:t>
+            </a:r>
+            <a:endParaRPr lang="en-US" dirty="0" smtClean="0"/>
+          </a:p>
+          <a:p>
+            <a:r>
+              <a:rPr lang="en-US" dirty="0" smtClean="0"/>
+              <a:t>Kai </a:t>
+            </a:r>
+            <a:r>
+              <a:rPr lang="en-US" dirty="0" err="1" smtClean="0"/>
+              <a:t>Orend’s</a:t>
+            </a:r>
+            <a:r>
+              <a:rPr lang="en-US" dirty="0" smtClean="0"/>
+              <a:t> “</a:t>
+            </a:r>
+            <a:r>
+              <a:rPr lang="en-US" dirty="0" err="1" smtClean="0"/>
+              <a:t>Numerische</a:t>
+            </a:r>
+            <a:r>
+              <a:rPr lang="en-US" dirty="0" smtClean="0"/>
+              <a:t> </a:t>
+            </a:r>
+            <a:r>
+              <a:rPr lang="en-US" dirty="0" err="1" smtClean="0"/>
+              <a:t>Aspekte</a:t>
+            </a:r>
+            <a:r>
+              <a:rPr lang="en-US" dirty="0" smtClean="0"/>
+              <a:t> </a:t>
+            </a:r>
+            <a:r>
+              <a:rPr lang="en-US" dirty="0" err="1" smtClean="0"/>
+              <a:t>bei</a:t>
+            </a:r>
+            <a:r>
+              <a:rPr lang="en-US" dirty="0" smtClean="0"/>
+              <a:t> </a:t>
+            </a:r>
+            <a:r>
+              <a:rPr lang="en-US" dirty="0" err="1" smtClean="0"/>
+              <a:t>Molekulardynamik-Simulationen</a:t>
+            </a:r>
+            <a:r>
+              <a:rPr lang="en-US" dirty="0" smtClean="0"/>
+              <a:t> - </a:t>
+            </a:r>
+            <a:r>
+              <a:rPr lang="en-US" dirty="0" err="1" smtClean="0"/>
+              <a:t>Beschleunigung</a:t>
+            </a:r>
+            <a:r>
+              <a:rPr lang="en-US" dirty="0" smtClean="0"/>
+              <a:t> </a:t>
+            </a:r>
+            <a:r>
+              <a:rPr lang="en-US" dirty="0" err="1" smtClean="0"/>
+              <a:t>durch</a:t>
+            </a:r>
+            <a:r>
+              <a:rPr lang="en-US" dirty="0" smtClean="0"/>
+              <a:t> </a:t>
+            </a:r>
+            <a:r>
+              <a:rPr lang="en-US" dirty="0" err="1" smtClean="0"/>
+              <a:t>Graphikkarten</a:t>
             </a:r>
             <a:r>
               <a:rPr lang="en-US" dirty="0" smtClean="0"/>
               <a:t>”</a:t>
             </a:r>
-          </a:p>
-          <a:p>
-            <a:r>
+            <a:br>
               <a:rPr lang="en-US" dirty="0" smtClean="0"/>
-              <a:t>that took most of my time</a:t>
-            </a:r>
+            </a:br>
+            <a:r>
+              <a:rPr lang="en-US" dirty="0" smtClean="0">
+                <a:hlinkClick r:id="rId3"/>
+              </a:rPr>
+              <a:t>http://www5.in.tum.de/pub/orend2010.pdf</a:t>
+            </a:r>
+            <a:endParaRPr lang="en-US" dirty="0" smtClean="0"/>
           </a:p>
           <a:p>
             <a:endParaRPr lang="en-US" dirty="0"/>
@@ -1326,7 +1396,7 @@
             <a:fld id="{FDBF08A4-716A-4A7F-AEC8-1293D93B8B14}" type="slidenum">
               <a:rPr lang="en-US" smtClean="0"/>
               <a:pPr/>
-              <a:t>2</a:t>
+              <a:t>1</a:t>
             </a:fld>
             <a:endParaRPr lang="en-US"/>
           </a:p>
@@ -1387,12 +1457,12 @@
           <a:lstStyle/>
           <a:p>
             <a:r>
-              <a:rPr lang="en-US" dirty="0" err="1" smtClean="0"/>
-              <a:t>Orend’s</a:t>
-            </a:r>
-            <a:r>
               <a:rPr lang="en-US" dirty="0" smtClean="0"/>
-              <a:t> code was useless</a:t>
+              <a:t>Explain</a:t>
+            </a:r>
+            <a:r>
+              <a:rPr lang="en-US" baseline="0" dirty="0" smtClean="0"/>
+              <a:t> thread block and warp block processor</a:t>
             </a:r>
             <a:endParaRPr lang="en-US" dirty="0"/>
           </a:p>
@@ -1416,7 +1486,7 @@
             <a:fld id="{FDBF08A4-716A-4A7F-AEC8-1293D93B8B14}" type="slidenum">
               <a:rPr lang="en-US" smtClean="0"/>
               <a:pPr/>
-              <a:t>3</a:t>
+              <a:t>4</a:t>
             </a:fld>
             <a:endParaRPr lang="en-US"/>
           </a:p>
@@ -1476,14 +1546,6 @@
           </a:bodyPr>
           <a:lstStyle/>
           <a:p>
-            <a:r>
-              <a:rPr lang="en-US" dirty="0" smtClean="0"/>
-              <a:t>Explain</a:t>
-            </a:r>
-            <a:r>
-              <a:rPr lang="en-US" baseline="0" dirty="0" smtClean="0"/>
-              <a:t> thread block and warp block processor</a:t>
-            </a:r>
             <a:endParaRPr lang="en-US" dirty="0"/>
           </a:p>
         </p:txBody>
@@ -1566,6 +1628,34 @@
           </a:bodyPr>
           <a:lstStyle/>
           <a:p>
+            <a:r>
+              <a:rPr lang="en-US" dirty="0" smtClean="0"/>
+              <a:t>Draw a CUDA</a:t>
+            </a:r>
+            <a:r>
+              <a:rPr lang="en-US" baseline="0" dirty="0" smtClean="0"/>
+              <a:t> architecture diagram to explain thread blocks and warp blocks</a:t>
+            </a:r>
+          </a:p>
+          <a:p>
+            <a:endParaRPr lang="en-US" baseline="0" dirty="0" smtClean="0"/>
+          </a:p>
+          <a:p>
+            <a:r>
+              <a:rPr lang="en-US" baseline="0" dirty="0" smtClean="0"/>
+              <a:t>Fixed thread block size for all cells -&gt; not good for sparse domains</a:t>
+            </a:r>
+          </a:p>
+          <a:p>
+            <a:r>
+              <a:rPr lang="en-US" baseline="0" dirty="0" smtClean="0"/>
+              <a:t>Only useful for high densities</a:t>
+            </a:r>
+          </a:p>
+          <a:p>
+            <a:endParaRPr lang="en-US" baseline="0" dirty="0" smtClean="0"/>
+          </a:p>
+          <a:p>
             <a:endParaRPr lang="en-US" dirty="0"/>
           </a:p>
         </p:txBody>
@@ -1650,30 +1740,18 @@
           <a:p>
             <a:r>
               <a:rPr lang="en-US" dirty="0" smtClean="0"/>
-              <a:t>Draw a CUDA</a:t>
+              <a:t>Draw diagram that shows how WBCP</a:t>
             </a:r>
             <a:r>
               <a:rPr lang="en-US" baseline="0" dirty="0" smtClean="0"/>
-              <a:t> architecture diagram to explain thread blocks and warp blocks</a:t>
-            </a:r>
-          </a:p>
-          <a:p>
-            <a:endParaRPr lang="en-US" baseline="0" dirty="0" smtClean="0"/>
+              <a:t> works</a:t>
+            </a:r>
           </a:p>
           <a:p>
             <a:r>
               <a:rPr lang="en-US" baseline="0" dirty="0" smtClean="0"/>
-              <a:t>Fixed thread block size for all cells -&gt; not good for sparse domains</a:t>
-            </a:r>
-          </a:p>
-          <a:p>
-            <a:r>
-              <a:rPr lang="en-US" baseline="0" dirty="0" smtClean="0"/>
-              <a:t>Only useful for high densities</a:t>
-            </a:r>
-          </a:p>
-          <a:p>
-            <a:endParaRPr lang="en-US" baseline="0" dirty="0" smtClean="0"/>
+              <a:t>Including dynamic job scheduling</a:t>
+            </a:r>
           </a:p>
           <a:p>
             <a:endParaRPr lang="en-US" dirty="0"/>
@@ -1760,21 +1838,33 @@
           <a:p>
             <a:r>
               <a:rPr lang="en-US" dirty="0" smtClean="0"/>
-              <a:t>Draw diagram that shows how WBCP</a:t>
+              <a:t>Shared</a:t>
             </a:r>
             <a:r>
               <a:rPr lang="en-US" baseline="0" dirty="0" smtClean="0"/>
-              <a:t> works</a:t>
+              <a:t> memory results differ for TBCP and WBCP</a:t>
             </a:r>
           </a:p>
           <a:p>
             <a:r>
               <a:rPr lang="en-US" baseline="0" dirty="0" smtClean="0"/>
-              <a:t>Including dynamic job scheduling</a:t>
-            </a:r>
-          </a:p>
-          <a:p>
-            <a:endParaRPr lang="en-US" dirty="0"/>
+              <a:t>Constant memory was a good idea</a:t>
+            </a:r>
+          </a:p>
+          <a:p>
+            <a:r>
+              <a:rPr lang="en-US" baseline="0" dirty="0" smtClean="0"/>
+              <a:t>Non-interleaved storage failed because of temporarily sparse access patterns (more cache misses with non-interleaved data)</a:t>
+            </a:r>
+          </a:p>
+          <a:p>
+            <a:endParaRPr lang="en-US" baseline="0" dirty="0" smtClean="0"/>
+          </a:p>
+          <a:p>
+            <a:r>
+              <a:rPr lang="en-US" b="1" baseline="0" dirty="0" smtClean="0"/>
+              <a:t>TODO: fully interleaved molecule storage</a:t>
+            </a:r>
           </a:p>
         </p:txBody>
       </p:sp>
@@ -1858,33 +1948,62 @@
           <a:p>
             <a:r>
               <a:rPr lang="en-US" dirty="0" smtClean="0"/>
-              <a:t>Shared</a:t>
+              <a:t>*Global </a:t>
+            </a:r>
+            <a:r>
+              <a:rPr lang="en-US" b="1" dirty="0" smtClean="0"/>
+              <a:t>constant</a:t>
+            </a:r>
+            <a:r>
+              <a:rPr lang="en-US" b="1" baseline="0" dirty="0" smtClean="0"/>
+              <a:t> </a:t>
             </a:r>
             <a:r>
               <a:rPr lang="en-US" baseline="0" dirty="0" smtClean="0"/>
-              <a:t> memory results differ for TBCP and WBCP</a:t>
-            </a:r>
+              <a:t>variables to avoid kernel parameters</a:t>
+            </a:r>
+          </a:p>
+          <a:p>
+            <a:endParaRPr lang="en-US" baseline="0" dirty="0" smtClean="0"/>
           </a:p>
           <a:p>
             <a:r>
               <a:rPr lang="en-US" baseline="0" dirty="0" smtClean="0"/>
-              <a:t>Constant memory was a good idea</a:t>
-            </a:r>
-          </a:p>
-          <a:p>
+              <a:t>*Heavy use of </a:t>
+            </a:r>
+            <a:r>
+              <a:rPr lang="en-US" b="1" baseline="0" dirty="0" smtClean="0"/>
+              <a:t>template</a:t>
+            </a:r>
             <a:r>
               <a:rPr lang="en-US" baseline="0" dirty="0" smtClean="0"/>
-              <a:t>Non-interleaved storage failed because of temporarily sparse access patterns (more cache misses with non-interleaved data)</a:t>
-            </a:r>
-          </a:p>
-          <a:p>
+              <a:t> parameters to link modules together and keep things </a:t>
+            </a:r>
+            <a:r>
+              <a:rPr lang="en-US" baseline="0" dirty="0" err="1" smtClean="0"/>
+              <a:t>interchangable</a:t>
+            </a:r>
             <a:endParaRPr lang="en-US" baseline="0" dirty="0" smtClean="0"/>
           </a:p>
           <a:p>
             <a:r>
               <a:rPr lang="en-US" b="1" baseline="0" dirty="0" smtClean="0"/>
-              <a:t>TODO: fully interleaved molecule storage</a:t>
-            </a:r>
+              <a:t>----! CUDA/C++ still sucks for fast, modular code</a:t>
+            </a:r>
+          </a:p>
+          <a:p>
+            <a:endParaRPr lang="en-US" dirty="0" smtClean="0"/>
+          </a:p>
+          <a:p>
+            <a:r>
+              <a:rPr lang="en-US" dirty="0" smtClean="0"/>
+              <a:t>* 3</a:t>
+            </a:r>
+            <a:r>
+              <a:rPr lang="en-US" baseline="0" dirty="0" smtClean="0"/>
+              <a:t> source code iterations during the project</a:t>
+            </a:r>
+            <a:endParaRPr lang="en-US" dirty="0"/>
           </a:p>
         </p:txBody>
       </p:sp>
@@ -1968,145 +2087,6 @@
           <a:p>
             <a:r>
               <a:rPr lang="en-US" dirty="0" smtClean="0"/>
-              <a:t>*Global </a:t>
-            </a:r>
-            <a:r>
-              <a:rPr lang="en-US" b="1" dirty="0" smtClean="0"/>
-              <a:t>constant</a:t>
-            </a:r>
-            <a:r>
-              <a:rPr lang="en-US" b="1" baseline="0" dirty="0" smtClean="0"/>
-              <a:t> </a:t>
-            </a:r>
-            <a:r>
-              <a:rPr lang="en-US" baseline="0" dirty="0" smtClean="0"/>
-              <a:t>variables to avoid kernel parameters</a:t>
-            </a:r>
-          </a:p>
-          <a:p>
-            <a:endParaRPr lang="en-US" baseline="0" dirty="0" smtClean="0"/>
-          </a:p>
-          <a:p>
-            <a:r>
-              <a:rPr lang="en-US" baseline="0" dirty="0" smtClean="0"/>
-              <a:t>*Heavy use of </a:t>
-            </a:r>
-            <a:r>
-              <a:rPr lang="en-US" b="1" baseline="0" dirty="0" smtClean="0"/>
-              <a:t>template</a:t>
-            </a:r>
-            <a:r>
-              <a:rPr lang="en-US" baseline="0" dirty="0" smtClean="0"/>
-              <a:t> parameters to link modules together and keep things </a:t>
-            </a:r>
-            <a:r>
-              <a:rPr lang="en-US" baseline="0" dirty="0" err="1" smtClean="0"/>
-              <a:t>interchangable</a:t>
-            </a:r>
-            <a:endParaRPr lang="en-US" baseline="0" dirty="0" smtClean="0"/>
-          </a:p>
-          <a:p>
-            <a:r>
-              <a:rPr lang="en-US" b="1" baseline="0" dirty="0" smtClean="0"/>
-              <a:t>----! CUDA/C++ still sucks for fast, modular code</a:t>
-            </a:r>
-          </a:p>
-          <a:p>
-            <a:endParaRPr lang="en-US" dirty="0" smtClean="0"/>
-          </a:p>
-          <a:p>
-            <a:r>
-              <a:rPr lang="en-US" dirty="0" smtClean="0"/>
-              <a:t>* 3</a:t>
-            </a:r>
-            <a:r>
-              <a:rPr lang="en-US" baseline="0" dirty="0" smtClean="0"/>
-              <a:t> source code iterations during the project</a:t>
-            </a:r>
-            <a:endParaRPr lang="en-US" dirty="0"/>
-          </a:p>
-        </p:txBody>
-      </p:sp>
-      <p:sp>
-        <p:nvSpPr>
-          <p:cNvPr id="4" name="Slide Number Placeholder 3"/>
-          <p:cNvSpPr>
-            <a:spLocks noGrp="1"/>
-          </p:cNvSpPr>
-          <p:nvPr>
-            <p:ph type="sldNum" sz="quarter" idx="10"/>
-          </p:nvPr>
-        </p:nvSpPr>
-        <p:spPr/>
-        <p:txBody>
-          <a:bodyPr/>
-          <a:lstStyle/>
-          <a:p>
-            <a:fld id="{FDBF08A4-716A-4A7F-AEC8-1293D93B8B14}" type="slidenum">
-              <a:rPr lang="en-US" smtClean="0"/>
-              <a:pPr/>
-              <a:t>10</a:t>
-            </a:fld>
-            <a:endParaRPr lang="en-US"/>
-          </a:p>
-        </p:txBody>
-      </p:sp>
-    </p:spTree>
-  </p:cSld>
-  <p:clrMapOvr>
-    <a:masterClrMapping/>
-  </p:clrMapOvr>
-</p:notes>
-</file>
-
-<file path=ppt/notesSlides/notesSlide9.xml><?xml version="1.0" encoding="utf-8"?>
-<p:notes xmlns:a="http://schemas.openxmlformats.org/drawingml/2006/main" xmlns:r="http://schemas.openxmlformats.org/officeDocument/2006/relationships" xmlns:p="http://schemas.openxmlformats.org/presentationml/2006/main">
-  <p:cSld>
-    <p:spTree>
-      <p:nvGrpSpPr>
-        <p:cNvPr id="1" name=""/>
-        <p:cNvGrpSpPr/>
-        <p:nvPr/>
-      </p:nvGrpSpPr>
-      <p:grpSpPr>
-        <a:xfrm>
-          <a:off x="0" y="0"/>
-          <a:ext cx="0" cy="0"/>
-          <a:chOff x="0" y="0"/>
-          <a:chExt cx="0" cy="0"/>
-        </a:xfrm>
-      </p:grpSpPr>
-      <p:sp>
-        <p:nvSpPr>
-          <p:cNvPr id="2" name="Slide Image Placeholder 1"/>
-          <p:cNvSpPr>
-            <a:spLocks noGrp="1" noRot="1" noChangeAspect="1"/>
-          </p:cNvSpPr>
-          <p:nvPr>
-            <p:ph type="sldImg"/>
-          </p:nvPr>
-        </p:nvSpPr>
-        <p:spPr/>
-      </p:sp>
-      <p:sp>
-        <p:nvSpPr>
-          <p:cNvPr id="3" name="Notes Placeholder 2"/>
-          <p:cNvSpPr>
-            <a:spLocks noGrp="1"/>
-          </p:cNvSpPr>
-          <p:nvPr>
-            <p:ph type="body" idx="1"/>
-          </p:nvPr>
-        </p:nvSpPr>
-        <p:spPr/>
-        <p:txBody>
-          <a:bodyPr>
-            <a:normAutofit/>
-          </a:bodyPr>
-          <a:lstStyle/>
-          <a:p>
-            <a:r>
-              <a:rPr lang="en-US" dirty="0" smtClean="0"/>
               <a:t>PTX reduction and enhanced</a:t>
             </a:r>
             <a:r>
@@ -2135,7 +2115,7 @@
             <a:fld id="{FDBF08A4-716A-4A7F-AEC8-1293D93B8B14}" type="slidenum">
               <a:rPr lang="en-US" smtClean="0"/>
               <a:pPr/>
-              <a:t>12</a:t>
+              <a:t>11</a:t>
             </a:fld>
             <a:endParaRPr lang="en-US"/>
           </a:p>
@@ -5108,19 +5088,23 @@
             <a:spLocks noGrp="1"/>
           </p:cNvSpPr>
           <p:nvPr>
-            <p:ph type="title"/>
+            <p:ph type="ctrTitle"/>
           </p:nvPr>
         </p:nvSpPr>
         <p:spPr/>
         <p:txBody>
           <a:bodyPr>
-            <a:normAutofit/>
+            <a:normAutofit fontScale="90000"/>
           </a:bodyPr>
           <a:lstStyle/>
           <a:p>
             <a:r>
               <a:rPr lang="en-US" sz="3200" dirty="0" smtClean="0"/>
-              <a:t>Andreas Kirsch</a:t>
+              <a:t>Efficient Implementation of Multi-Center Potential Models in Molecular Dynamics with </a:t>
+            </a:r>
+            <a:r>
+              <a:rPr lang="en-US" sz="3200" dirty="0" err="1" smtClean="0"/>
+              <a:t>Cuda</a:t>
             </a:r>
             <a:endParaRPr lang="en-US" sz="3200" dirty="0"/>
           </a:p>
@@ -5133,7 +5117,7 @@
             <a:spLocks noGrp="1"/>
           </p:cNvSpPr>
           <p:nvPr>
-            <p:ph idx="1"/>
+            <p:ph type="subTitle" idx="1"/>
           </p:nvPr>
         </p:nvSpPr>
         <p:spPr/>
@@ -5148,11 +5132,7 @@
             </a:pPr>
             <a:r>
               <a:rPr lang="en-US" dirty="0" smtClean="0"/>
-              <a:t>Efficient Implementation of Multi-Center Potential Models in Molecular Dynamics with </a:t>
-            </a:r>
-            <a:r>
-              <a:rPr lang="en-US" dirty="0" err="1" smtClean="0"/>
-              <a:t>Cuda</a:t>
+              <a:t>Andreas Kirsch</a:t>
             </a:r>
             <a:endParaRPr lang="en-US" dirty="0"/>
           </a:p>
@@ -5202,40 +5182,105 @@
         </p:nvSpPr>
         <p:spPr/>
         <p:txBody>
-          <a:bodyPr/>
+          <a:bodyPr>
+            <a:normAutofit/>
+          </a:bodyPr>
           <a:lstStyle/>
           <a:p>
             <a:r>
               <a:rPr lang="en-US" dirty="0" smtClean="0"/>
-              <a:t>Architecture/Implementation</a:t>
+              <a:t>Interesting Papers</a:t>
             </a:r>
             <a:endParaRPr lang="en-US" dirty="0"/>
           </a:p>
         </p:txBody>
       </p:sp>
-      <p:pic>
-        <p:nvPicPr>
-          <p:cNvPr id="4" name="Content Placeholder 3" descr="component_architecture.png"/>
-          <p:cNvPicPr>
-            <a:picLocks noGrp="1" noChangeAspect="1"/>
-          </p:cNvPicPr>
+      <p:sp>
+        <p:nvSpPr>
+          <p:cNvPr id="3" name="Content Placeholder 2"/>
+          <p:cNvSpPr>
+            <a:spLocks noGrp="1"/>
+          </p:cNvSpPr>
           <p:nvPr>
             <p:ph idx="1"/>
           </p:nvPr>
-        </p:nvPicPr>
-        <p:blipFill>
-          <a:blip r:embed="rId3" cstate="print"/>
-          <a:stretch>
-            <a:fillRect/>
-          </a:stretch>
-        </p:blipFill>
-        <p:spPr>
-          <a:xfrm>
-            <a:off x="244608" y="2247900"/>
-            <a:ext cx="8654784" cy="2362200"/>
-          </a:xfrm>
-        </p:spPr>
-      </p:pic>
+        </p:nvSpPr>
+        <p:spPr/>
+        <p:txBody>
+          <a:bodyPr>
+            <a:normAutofit fontScale="92500" lnSpcReduction="10000"/>
+          </a:bodyPr>
+          <a:lstStyle/>
+          <a:p>
+            <a:r>
+              <a:rPr lang="en-US" dirty="0" smtClean="0"/>
+              <a:t>Better performance at lower occupancy</a:t>
+            </a:r>
+            <a:br>
+              <a:rPr lang="en-US" dirty="0" smtClean="0"/>
+            </a:br>
+            <a:r>
+              <a:rPr lang="en-US" dirty="0" smtClean="0">
+                <a:hlinkClick r:id="rId2"/>
+              </a:rPr>
+              <a:t>http://www.cs.berkeley.edu/~volkov/volkov10-GTC.pdf</a:t>
+            </a:r>
+            <a:endParaRPr lang="en-US" dirty="0" smtClean="0"/>
+          </a:p>
+          <a:p>
+            <a:r>
+              <a:rPr lang="en-US" dirty="0" smtClean="0"/>
+              <a:t>Demystifying GPU </a:t>
+            </a:r>
+            <a:r>
+              <a:rPr lang="en-US" dirty="0" err="1" smtClean="0"/>
+              <a:t>microarchitecture</a:t>
+            </a:r>
+            <a:r>
+              <a:rPr lang="en-US" dirty="0" smtClean="0"/>
+              <a:t> through </a:t>
+            </a:r>
+            <a:r>
+              <a:rPr lang="en-US" dirty="0" err="1" smtClean="0"/>
+              <a:t>microbenchmarking</a:t>
+            </a:r>
+            <a:r>
+              <a:rPr lang="en-US" dirty="0" smtClean="0"/>
+              <a:t/>
+            </a:r>
+            <a:br>
+              <a:rPr lang="en-US" dirty="0" smtClean="0"/>
+            </a:br>
+            <a:r>
+              <a:rPr lang="en-US" dirty="0" smtClean="0">
+                <a:hlinkClick r:id="rId3"/>
+              </a:rPr>
+              <a:t>http://www.stuffedcow.net/research/cudabmk</a:t>
+            </a:r>
+            <a:endParaRPr lang="en-US" dirty="0" smtClean="0"/>
+          </a:p>
+          <a:p>
+            <a:r>
+              <a:rPr lang="en-US" dirty="0" err="1" smtClean="0"/>
+              <a:t>CudaDMA</a:t>
+            </a:r>
+            <a:r>
+              <a:rPr lang="en-US" dirty="0" smtClean="0"/>
+              <a:t>: Optimizing GPU Memory Bandwidth via Warp Specialization</a:t>
+            </a:r>
+            <a:br>
+              <a:rPr lang="en-US" dirty="0" smtClean="0"/>
+            </a:br>
+            <a:r>
+              <a:rPr lang="en-US" dirty="0" smtClean="0">
+                <a:hlinkClick r:id="rId4"/>
+              </a:rPr>
+              <a:t>http://www.stanford.edu/~mebauer/pdfs/cudadma-sc11.pdf</a:t>
+            </a:r>
+            <a:endParaRPr lang="en-US" dirty="0"/>
+          </a:p>
+        </p:txBody>
+      </p:sp>
     </p:spTree>
   </p:cSld>
   <p:clrMapOvr>
@@ -5280,14 +5325,12 @@
         </p:nvSpPr>
         <p:spPr/>
         <p:txBody>
-          <a:bodyPr>
-            <a:normAutofit/>
-          </a:bodyPr>
+          <a:bodyPr/>
           <a:lstStyle/>
           <a:p>
             <a:r>
               <a:rPr lang="en-US" dirty="0" smtClean="0"/>
-              <a:t>Interesting Papers</a:t>
+              <a:t>Interesting Bugs	 &amp; Facts</a:t>
             </a:r>
             <a:endParaRPr lang="en-US" dirty="0"/>
           </a:p>
@@ -5305,77 +5348,63 @@
         </p:nvSpPr>
         <p:spPr/>
         <p:txBody>
-          <a:bodyPr>
-            <a:normAutofit fontScale="92500" lnSpcReduction="10000"/>
-          </a:bodyPr>
+          <a:bodyPr/>
           <a:lstStyle/>
           <a:p>
             <a:r>
               <a:rPr lang="en-US" dirty="0" smtClean="0"/>
-              <a:t>Better performance at lower occupancy</a:t>
-            </a:r>
-            <a:br>
+              <a:t>Constructors can be evil (for shared memory objects)</a:t>
+            </a:r>
+          </a:p>
+          <a:p>
+            <a:r>
               <a:rPr lang="en-US" dirty="0" smtClean="0"/>
-            </a:br>
-            <a:r>
-              <a:rPr lang="en-US" dirty="0" smtClean="0">
-                <a:hlinkClick r:id="rId2"/>
-              </a:rPr>
-              <a:t>http://www.cs.berkeley.edu/~volkov/volkov10-GTC.pdf</a:t>
-            </a:r>
-            <a:endParaRPr lang="en-US" dirty="0" smtClean="0"/>
-          </a:p>
-          <a:p>
+              <a:t>Too many nested, </a:t>
+            </a:r>
+            <a:r>
+              <a:rPr lang="en-US" dirty="0" err="1" smtClean="0"/>
+              <a:t>inlined</a:t>
+            </a:r>
             <a:r>
               <a:rPr lang="en-US" dirty="0" smtClean="0"/>
-              <a:t>Demystifying GPU </a:t>
+              <a:t> loops confuse the compiler: __</a:t>
             </a:r>
             <a:r>
               <a:rPr lang="en-US" dirty="0" err="1" smtClean="0"/>
-              <a:t>microarchitecture</a:t>
+              <a:t>noinline</a:t>
             </a:r>
             <a:r>
               <a:rPr lang="en-US" dirty="0" smtClean="0"/>
-              <a:t> through </a:t>
+              <a:t>__ to the rescue!</a:t>
+            </a:r>
+          </a:p>
+          <a:p>
+            <a:r>
+              <a:rPr lang="en-US" dirty="0" smtClean="0"/>
+              <a:t>__</a:t>
             </a:r>
             <a:r>
               <a:rPr lang="en-US" dirty="0" err="1" smtClean="0"/>
-              <a:t>microbenchmarking</a:t>
+              <a:t>syncthreads</a:t>
             </a:r>
             <a:r>
               <a:rPr lang="en-US" dirty="0" smtClean="0"/>
-              <a:t/>
-            </a:r>
-            <a:br>
+              <a:t>() should be called __</a:t>
+            </a:r>
+            <a:r>
+              <a:rPr lang="en-US" dirty="0" err="1" smtClean="0"/>
+              <a:t>syncwarps</a:t>
+            </a:r>
+            <a:r>
               <a:rPr lang="en-US" dirty="0" smtClean="0"/>
-            </a:br>
-            <a:r>
-              <a:rPr lang="en-US" dirty="0" smtClean="0">
-                <a:hlinkClick r:id="rId3"/>
-              </a:rPr>
-              <a:t>http://www.stuffedcow.net/research/cudabmk</a:t>
-            </a:r>
-            <a:endParaRPr lang="en-US" dirty="0" smtClean="0"/>
-          </a:p>
-          <a:p>
-            <a:r>
-              <a:rPr lang="en-US" dirty="0" err="1" smtClean="0"/>
-              <a:t>CudaDMA</a:t>
-            </a:r>
+              <a:t>()!</a:t>
+            </a:r>
+          </a:p>
+          <a:p>
             <a:r>
               <a:rPr lang="en-US" dirty="0" smtClean="0"/>
-              <a:t>: Optimizing GPU Memory Bandwidth via Warp Specialization</a:t>
-            </a:r>
-            <a:br>
-              <a:rPr lang="en-US" dirty="0" smtClean="0"/>
-            </a:br>
-            <a:r>
-              <a:rPr lang="en-US" dirty="0" smtClean="0">
-                <a:hlinkClick r:id="rId4"/>
-              </a:rPr>
-              <a:t>http://www.stanford.edu/~mebauer/pdfs/cudadma-sc11.pdf</a:t>
-            </a:r>
-            <a:endParaRPr lang="en-US" dirty="0"/>
+              <a:t>PTX assembly has more “features”</a:t>
+            </a:r>
           </a:p>
         </p:txBody>
       </p:sp>
@@ -5426,133 +5455,6 @@
           <a:bodyPr/>
           <a:lstStyle/>
           <a:p>
-            <a:r>
-              <a:rPr lang="en-US" dirty="0" smtClean="0"/>
-              <a:t>Interesting Bugs	 &amp; Facts</a:t>
-            </a:r>
-            <a:endParaRPr lang="en-US" dirty="0"/>
-          </a:p>
-        </p:txBody>
-      </p:sp>
-      <p:sp>
-        <p:nvSpPr>
-          <p:cNvPr id="3" name="Content Placeholder 2"/>
-          <p:cNvSpPr>
-            <a:spLocks noGrp="1"/>
-          </p:cNvSpPr>
-          <p:nvPr>
-            <p:ph idx="1"/>
-          </p:nvPr>
-        </p:nvSpPr>
-        <p:spPr/>
-        <p:txBody>
-          <a:bodyPr/>
-          <a:lstStyle/>
-          <a:p>
-            <a:r>
-              <a:rPr lang="en-US" dirty="0" smtClean="0"/>
-              <a:t>Constructors can be evil (for shared memory objects)</a:t>
-            </a:r>
-          </a:p>
-          <a:p>
-            <a:r>
-              <a:rPr lang="en-US" dirty="0" smtClean="0"/>
-              <a:t>Too many nested, </a:t>
-            </a:r>
-            <a:r>
-              <a:rPr lang="en-US" dirty="0" err="1" smtClean="0"/>
-              <a:t>inlined</a:t>
-            </a:r>
-            <a:r>
-              <a:rPr lang="en-US" dirty="0" smtClean="0"/>
-              <a:t> loops confuse the compiler: __</a:t>
-            </a:r>
-            <a:r>
-              <a:rPr lang="en-US" dirty="0" err="1" smtClean="0"/>
-              <a:t>noinline</a:t>
-            </a:r>
-            <a:r>
-              <a:rPr lang="en-US" dirty="0" smtClean="0"/>
-              <a:t>__ to the rescue!</a:t>
-            </a:r>
-          </a:p>
-          <a:p>
-            <a:r>
-              <a:rPr lang="en-US" dirty="0" smtClean="0"/>
-              <a:t>__</a:t>
-            </a:r>
-            <a:r>
-              <a:rPr lang="en-US" dirty="0" err="1" smtClean="0"/>
-              <a:t>syncthreads</a:t>
-            </a:r>
-            <a:r>
-              <a:rPr lang="en-US" dirty="0" smtClean="0"/>
-              <a:t>() should be called __</a:t>
-            </a:r>
-            <a:r>
-              <a:rPr lang="en-US" dirty="0" err="1" smtClean="0"/>
-              <a:t>syncwarps</a:t>
-            </a:r>
-            <a:r>
-              <a:rPr lang="en-US" dirty="0" smtClean="0"/>
-              <a:t>()!</a:t>
-            </a:r>
-          </a:p>
-          <a:p>
-            <a:r>
-              <a:rPr lang="en-US" dirty="0" smtClean="0"/>
-              <a:t>PTX assembly has more “features”</a:t>
-            </a:r>
-          </a:p>
-        </p:txBody>
-      </p:sp>
-    </p:spTree>
-  </p:cSld>
-  <p:clrMapOvr>
-    <a:masterClrMapping/>
-  </p:clrMapOvr>
-  <p:timing>
-    <p:tnLst>
-      <p:par>
-        <p:cTn id="1" dur="indefinite" restart="never" nodeType="tmRoot"/>
-      </p:par>
-    </p:tnLst>
-  </p:timing>
-</p:sld>
-</file>
-
-<file path=ppt/slides/slide13.xml><?xml version="1.0" encoding="utf-8"?>
-<p:sld xmlns:a="http://schemas.openxmlformats.org/drawingml/2006/main" xmlns:r="http://schemas.openxmlformats.org/officeDocument/2006/relationships" xmlns:p="http://schemas.openxmlformats.org/presentationml/2006/main">
-  <p:cSld>
-    <p:spTree>
-      <p:nvGrpSpPr>
-        <p:cNvPr id="1" name=""/>
-        <p:cNvGrpSpPr/>
-        <p:nvPr/>
-      </p:nvGrpSpPr>
-      <p:grpSpPr>
-        <a:xfrm>
-          <a:off x="0" y="0"/>
-          <a:ext cx="0" cy="0"/>
-          <a:chOff x="0" y="0"/>
-          <a:chExt cx="0" cy="0"/>
-        </a:xfrm>
-      </p:grpSpPr>
-      <p:sp>
-        <p:nvSpPr>
-          <p:cNvPr id="2" name="Title 1"/>
-          <p:cNvSpPr>
-            <a:spLocks noGrp="1"/>
-          </p:cNvSpPr>
-          <p:nvPr>
-            <p:ph type="title"/>
-          </p:nvPr>
-        </p:nvSpPr>
-        <p:spPr/>
-        <p:txBody>
-          <a:bodyPr/>
-          <a:lstStyle/>
-          <a:p>
             <a:endParaRPr lang="en-US" dirty="0"/>
           </a:p>
         </p:txBody>
@@ -5639,7 +5541,7 @@
           <a:p>
             <a:r>
               <a:rPr lang="en-US" dirty="0" smtClean="0"/>
-              <a:t>What I did</a:t>
+              <a:t>Molecule Interactions</a:t>
             </a:r>
             <a:endParaRPr lang="en-US" dirty="0"/>
           </a:p>
@@ -5647,7 +5549,7 @@
       </p:sp>
       <p:sp>
         <p:nvSpPr>
-          <p:cNvPr id="4" name="Title 1"/>
+          <p:cNvPr id="3" name="Content Placeholder 2"/>
           <p:cNvSpPr>
             <a:spLocks noGrp="1"/>
           </p:cNvSpPr>
@@ -5657,22 +5559,52 @@
         </p:nvSpPr>
         <p:spPr/>
         <p:txBody>
-          <a:bodyPr anchor="ctr">
-            <a:normAutofit/>
+          <a:bodyPr>
+            <a:normAutofit lnSpcReduction="10000"/>
           </a:bodyPr>
           <a:lstStyle/>
           <a:p>
-            <a:pPr algn="ctr">
-              <a:buNone/>
-            </a:pPr>
             <a:r>
               <a:rPr lang="en-US" dirty="0" smtClean="0"/>
-              <a:t>Efficient Implementation of Multi-Center Potential Models in Molecular Dynamics with </a:t>
+              <a:t>One molecule can be made up of multiple sites</a:t>
+            </a:r>
+          </a:p>
+          <a:p>
+            <a:r>
+              <a:rPr lang="en-US" dirty="0" smtClean="0"/>
+              <a:t>Different potentials possible for the sites: </a:t>
             </a:r>
             <a:r>
               <a:rPr lang="en-US" dirty="0" err="1" smtClean="0"/>
-              <a:t>Cuda</a:t>
-            </a:r>
+              <a:t>Lennard</a:t>
+            </a:r>
+            <a:r>
+              <a:rPr lang="en-US" dirty="0" smtClean="0"/>
+              <a:t>-Jones, Charges, Dipoles</a:t>
+            </a:r>
+          </a:p>
+          <a:p>
+            <a:r>
+              <a:rPr lang="en-US" dirty="0" smtClean="0"/>
+              <a:t>Interactions need to be calculated between all molecule pairs</a:t>
+            </a:r>
+          </a:p>
+          <a:p>
+            <a:r>
+              <a:rPr lang="en-US" dirty="0" smtClean="0"/>
+              <a:t>Simplification: use a cutoff radius to reduce the number of interactions</a:t>
+            </a:r>
+          </a:p>
+          <a:p>
+            <a:r>
+              <a:rPr lang="en-US" dirty="0" smtClean="0"/>
+              <a:t>Result: Linked Cell Algorithm</a:t>
+            </a:r>
+          </a:p>
+          <a:p>
+            <a:endParaRPr lang="en-US" dirty="0" smtClean="0"/>
+          </a:p>
+          <a:p>
             <a:endParaRPr lang="en-US" dirty="0"/>
           </a:p>
         </p:txBody>
@@ -5682,13 +5614,6 @@
   <p:clrMapOvr>
     <a:masterClrMapping/>
   </p:clrMapOvr>
-  <p:timing>
-    <p:tnLst>
-      <p:par>
-        <p:cTn id="1" dur="indefinite" restart="never" nodeType="tmRoot"/>
-      </p:par>
-    </p:tnLst>
-  </p:timing>
 </p:sld>
 </file>
 
@@ -5721,124 +5646,42 @@
         </p:nvSpPr>
         <p:spPr/>
         <p:txBody>
-          <a:bodyPr/>
+          <a:bodyPr>
+            <a:normAutofit/>
+          </a:bodyPr>
           <a:lstStyle/>
           <a:p>
             <a:r>
               <a:rPr lang="en-US" dirty="0" smtClean="0"/>
-              <a:t>Previous Work</a:t>
+              <a:t>Modules and Dependencies</a:t>
             </a:r>
             <a:endParaRPr lang="en-US" dirty="0"/>
           </a:p>
         </p:txBody>
       </p:sp>
-      <p:sp>
-        <p:nvSpPr>
-          <p:cNvPr id="3" name="Content Placeholder 2"/>
-          <p:cNvSpPr>
-            <a:spLocks noGrp="1"/>
-          </p:cNvSpPr>
+      <p:pic>
+        <p:nvPicPr>
+          <p:cNvPr id="8" name="Content Placeholder 7" descr="component_dependencies.png"/>
+          <p:cNvPicPr>
+            <a:picLocks noGrp="1" noChangeAspect="1"/>
+          </p:cNvPicPr>
           <p:nvPr>
             <p:ph idx="1"/>
           </p:nvPr>
-        </p:nvSpPr>
-        <p:spPr/>
-        <p:txBody>
-          <a:bodyPr/>
-          <a:lstStyle/>
-          <a:p>
-            <a:r>
-              <a:rPr lang="en-US" dirty="0" smtClean="0"/>
-              <a:t>Based on </a:t>
-            </a:r>
-            <a:r>
-              <a:rPr lang="en-US" dirty="0" err="1" smtClean="0"/>
-              <a:t>MarDyn</a:t>
-            </a:r>
-            <a:endParaRPr lang="en-US" dirty="0" smtClean="0"/>
-          </a:p>
-          <a:p>
-            <a:r>
-              <a:rPr lang="en-US" dirty="0" smtClean="0"/>
-              <a:t>Kai </a:t>
-            </a:r>
-            <a:r>
-              <a:rPr lang="en-US" dirty="0" err="1" smtClean="0"/>
-              <a:t>Orend’s</a:t>
-            </a:r>
-            <a:r>
-              <a:rPr lang="en-US" dirty="0" smtClean="0"/>
-              <a:t> “</a:t>
-            </a:r>
-            <a:r>
-              <a:rPr lang="en-US" dirty="0" err="1" smtClean="0"/>
-              <a:t>Numerische</a:t>
-            </a:r>
-            <a:r>
-              <a:rPr lang="en-US" dirty="0" smtClean="0"/>
-              <a:t> </a:t>
-            </a:r>
-            <a:r>
-              <a:rPr lang="en-US" dirty="0" err="1" smtClean="0"/>
-              <a:t>Aspekte</a:t>
-            </a:r>
-            <a:r>
-              <a:rPr lang="en-US" dirty="0" smtClean="0"/>
-              <a:t> </a:t>
-            </a:r>
-            <a:r>
-              <a:rPr lang="en-US" dirty="0" err="1" smtClean="0"/>
-              <a:t>bei</a:t>
-            </a:r>
-            <a:r>
-              <a:rPr lang="en-US" dirty="0" smtClean="0"/>
-              <a:t> </a:t>
-            </a:r>
-            <a:r>
-              <a:rPr lang="en-US" dirty="0" err="1" smtClean="0"/>
-              <a:t>Molekulardynamik-Simulationen</a:t>
-            </a:r>
-            <a:r>
-              <a:rPr lang="en-US" dirty="0" smtClean="0"/>
-              <a:t> - </a:t>
-            </a:r>
-            <a:r>
-              <a:rPr lang="en-US" dirty="0" err="1" smtClean="0"/>
-              <a:t>Beschleunigung</a:t>
-            </a:r>
-            <a:r>
-              <a:rPr lang="en-US" dirty="0" smtClean="0"/>
-              <a:t> </a:t>
-            </a:r>
-            <a:r>
-              <a:rPr lang="en-US" dirty="0" err="1" smtClean="0"/>
-              <a:t>durch</a:t>
-            </a:r>
-            <a:r>
-              <a:rPr lang="en-US" dirty="0" smtClean="0"/>
-              <a:t> </a:t>
-            </a:r>
-            <a:r>
-              <a:rPr lang="en-US" dirty="0" err="1" smtClean="0"/>
-              <a:t>Graphikkarten</a:t>
-            </a:r>
-            <a:r>
-              <a:rPr lang="en-US" dirty="0" smtClean="0"/>
-              <a:t>”</a:t>
-            </a:r>
-            <a:br>
-              <a:rPr lang="en-US" dirty="0" smtClean="0"/>
-            </a:br>
-            <a:r>
-              <a:rPr lang="en-US" dirty="0" smtClean="0">
-                <a:hlinkClick r:id="rId3"/>
-              </a:rPr>
-              <a:t>http://www5.in.tum.de/pub/orend2010.pdf</a:t>
-            </a:r>
-            <a:endParaRPr lang="en-US" dirty="0" smtClean="0"/>
-          </a:p>
-        </p:txBody>
-      </p:sp>
+        </p:nvPicPr>
+        <p:blipFill>
+          <a:blip r:embed="rId2" cstate="print"/>
+          <a:stretch>
+            <a:fillRect/>
+          </a:stretch>
+        </p:blipFill>
+        <p:spPr>
+          <a:xfrm>
+            <a:off x="28641" y="1295400"/>
+            <a:ext cx="9086718" cy="5411191"/>
+          </a:xfrm>
+        </p:spPr>
+      </p:pic>
     </p:spTree>
   </p:cSld>
   <p:clrMapOvr>
@@ -5883,42 +5726,37 @@
         </p:nvSpPr>
         <p:spPr/>
         <p:txBody>
-          <a:bodyPr>
-            <a:normAutofit/>
-          </a:bodyPr>
+          <a:bodyPr/>
           <a:lstStyle/>
           <a:p>
             <a:r>
               <a:rPr lang="en-US" dirty="0" smtClean="0"/>
-              <a:t>Modules and Dependencies</a:t>
+              <a:t>Performance (lj1)</a:t>
             </a:r>
             <a:endParaRPr lang="en-US" dirty="0"/>
           </a:p>
         </p:txBody>
       </p:sp>
-      <p:pic>
-        <p:nvPicPr>
-          <p:cNvPr id="8" name="Content Placeholder 7" descr="component_dependencies.png"/>
-          <p:cNvPicPr>
-            <a:picLocks noGrp="1" noChangeAspect="1"/>
-          </p:cNvPicPr>
+      <p:graphicFrame>
+        <p:nvGraphicFramePr>
+          <p:cNvPr id="7" name="Content Placeholder 6"/>
+          <p:cNvGraphicFramePr>
+            <a:graphicFrameLocks noGrp="1"/>
+          </p:cNvGraphicFramePr>
           <p:nvPr>
             <p:ph idx="1"/>
           </p:nvPr>
-        </p:nvPicPr>
-        <p:blipFill>
-          <a:blip r:embed="rId2" cstate="print"/>
-          <a:stretch>
-            <a:fillRect/>
-          </a:stretch>
-        </p:blipFill>
-        <p:spPr>
-          <a:xfrm>
-            <a:off x="28641" y="1295400"/>
-            <a:ext cx="9086718" cy="5411191"/>
-          </a:xfrm>
-        </p:spPr>
-      </p:pic>
+        </p:nvGraphicFramePr>
+        <p:xfrm>
+          <a:off x="-320" y="1600200"/>
+          <a:ext cx="9144640" cy="5029200"/>
+        </p:xfrm>
+        <a:graphic>
+          <a:graphicData uri="http://schemas.openxmlformats.org/drawingml/2006/chart">
+            <c:chart xmlns:c="http://schemas.openxmlformats.org/drawingml/2006/chart" xmlns:r="http://schemas.openxmlformats.org/officeDocument/2006/relationships" r:id="rId3"/>
+          </a:graphicData>
+        </a:graphic>
+      </p:graphicFrame>
     </p:spTree>
   </p:cSld>
   <p:clrMapOvr>
@@ -5968,7 +5806,7 @@
           <a:p>
             <a:r>
               <a:rPr lang="en-US" dirty="0" smtClean="0"/>
-              <a:t>Performance (lj1)</a:t>
+              <a:t>Performance (lj2d1)</a:t>
             </a:r>
             <a:endParaRPr lang="en-US" dirty="0"/>
           </a:p>
@@ -5976,17 +5814,15 @@
       </p:sp>
       <p:graphicFrame>
         <p:nvGraphicFramePr>
-          <p:cNvPr id="7" name="Content Placeholder 6"/>
+          <p:cNvPr id="7" name="Content Placeholder 3"/>
           <p:cNvGraphicFramePr>
             <a:graphicFrameLocks noGrp="1"/>
           </p:cNvGraphicFramePr>
-          <p:nvPr>
-            <p:ph idx="1"/>
-          </p:nvPr>
+          <p:nvPr/>
         </p:nvGraphicFramePr>
         <p:xfrm>
-          <a:off x="-320" y="1600200"/>
-          <a:ext cx="9144640" cy="5029200"/>
+          <a:off x="0" y="1805957"/>
+          <a:ext cx="9186176" cy="5052043"/>
         </p:xfrm>
         <a:graphic>
           <a:graphicData uri="http://schemas.openxmlformats.org/drawingml/2006/chart">
@@ -6036,37 +5872,49 @@
             <p:ph type="title"/>
           </p:nvPr>
         </p:nvSpPr>
-        <p:spPr/>
-        <p:txBody>
-          <a:bodyPr/>
+        <p:spPr>
+          <a:xfrm>
+            <a:off x="457200" y="274638"/>
+            <a:ext cx="8229600" cy="563562"/>
+          </a:xfrm>
+        </p:spPr>
+        <p:txBody>
+          <a:bodyPr>
+            <a:normAutofit fontScale="90000"/>
+          </a:bodyPr>
           <a:lstStyle/>
           <a:p>
             <a:r>
               <a:rPr lang="en-US" dirty="0" smtClean="0"/>
-              <a:t>Performance (lj2d1)</a:t>
+              <a:t>Thread Block Cell Processor</a:t>
             </a:r>
             <a:endParaRPr lang="en-US" dirty="0"/>
           </a:p>
         </p:txBody>
       </p:sp>
-      <p:graphicFrame>
-        <p:nvGraphicFramePr>
-          <p:cNvPr id="7" name="Content Placeholder 3"/>
-          <p:cNvGraphicFramePr>
-            <a:graphicFrameLocks noGrp="1"/>
-          </p:cNvGraphicFramePr>
-          <p:nvPr/>
-        </p:nvGraphicFramePr>
-        <p:xfrm>
-          <a:off x="0" y="1805957"/>
-          <a:ext cx="9186176" cy="5052043"/>
-        </p:xfrm>
-        <a:graphic>
-          <a:graphicData uri="http://schemas.openxmlformats.org/drawingml/2006/chart">
-            <c:chart xmlns:c="http://schemas.openxmlformats.org/drawingml/2006/chart" xmlns:r="http://schemas.openxmlformats.org/officeDocument/2006/relationships" r:id="rId3"/>
-          </a:graphicData>
-        </a:graphic>
-      </p:graphicFrame>
+      <p:pic>
+        <p:nvPicPr>
+          <p:cNvPr id="4" name="Content Placeholder 3" descr="cellprocessor_block_iteration.png"/>
+          <p:cNvPicPr>
+            <a:picLocks noGrp="1" noChangeAspect="1"/>
+          </p:cNvPicPr>
+          <p:nvPr>
+            <p:ph idx="1"/>
+          </p:nvPr>
+        </p:nvPicPr>
+        <p:blipFill>
+          <a:blip r:embed="rId3" cstate="print"/>
+          <a:stretch>
+            <a:fillRect/>
+          </a:stretch>
+        </p:blipFill>
+        <p:spPr>
+          <a:xfrm>
+            <a:off x="1562100" y="815181"/>
+            <a:ext cx="6019800" cy="6019800"/>
+          </a:xfrm>
+        </p:spPr>
+      </p:pic>
     </p:spTree>
   </p:cSld>
   <p:clrMapOvr>
@@ -6109,49 +5957,65 @@
             <p:ph type="title"/>
           </p:nvPr>
         </p:nvSpPr>
-        <p:spPr>
-          <a:xfrm>
-            <a:off x="457200" y="274638"/>
-            <a:ext cx="8229600" cy="563562"/>
-          </a:xfrm>
-        </p:spPr>
-        <p:txBody>
-          <a:bodyPr>
-            <a:normAutofit fontScale="90000"/>
-          </a:bodyPr>
+        <p:spPr/>
+        <p:txBody>
+          <a:bodyPr/>
           <a:lstStyle/>
           <a:p>
             <a:r>
               <a:rPr lang="en-US" dirty="0" smtClean="0"/>
-              <a:t>Thread Block Cell Processor</a:t>
+              <a:t>Warp Block Cell Processor</a:t>
             </a:r>
             <a:endParaRPr lang="en-US" dirty="0"/>
           </a:p>
         </p:txBody>
       </p:sp>
-      <p:pic>
-        <p:nvPicPr>
-          <p:cNvPr id="4" name="Content Placeholder 3" descr="cellprocessor_block_iteration.png"/>
-          <p:cNvPicPr>
-            <a:picLocks noGrp="1" noChangeAspect="1"/>
-          </p:cNvPicPr>
+      <p:sp>
+        <p:nvSpPr>
+          <p:cNvPr id="3" name="Content Placeholder 2"/>
+          <p:cNvSpPr>
+            <a:spLocks noGrp="1"/>
+          </p:cNvSpPr>
           <p:nvPr>
             <p:ph idx="1"/>
           </p:nvPr>
-        </p:nvPicPr>
-        <p:blipFill>
-          <a:blip r:embed="rId3" cstate="print"/>
-          <a:stretch>
-            <a:fillRect/>
-          </a:stretch>
-        </p:blipFill>
-        <p:spPr>
-          <a:xfrm>
-            <a:off x="1562100" y="815181"/>
-            <a:ext cx="6019800" cy="6019800"/>
-          </a:xfrm>
-        </p:spPr>
-      </p:pic>
+        </p:nvSpPr>
+        <p:spPr/>
+        <p:txBody>
+          <a:bodyPr/>
+          <a:lstStyle/>
+          <a:p>
+            <a:r>
+              <a:rPr lang="en-US" dirty="0" smtClean="0"/>
+              <a:t>Dynamic scheduler</a:t>
+            </a:r>
+          </a:p>
+          <a:p>
+            <a:r>
+              <a:rPr lang="en-US" dirty="0" smtClean="0"/>
+              <a:t>Jobs queue</a:t>
+            </a:r>
+          </a:p>
+          <a:p>
+            <a:r>
+              <a:rPr lang="en-US" dirty="0" smtClean="0"/>
+              <a:t>No instruction-level synchronization</a:t>
+            </a:r>
+          </a:p>
+          <a:p>
+            <a:r>
+              <a:rPr lang="en-US" dirty="0" smtClean="0"/>
+              <a:t>Memory-level synchronization (via spin locks)</a:t>
+            </a:r>
+          </a:p>
+          <a:p>
+            <a:endParaRPr lang="en-US" dirty="0" smtClean="0"/>
+          </a:p>
+          <a:p>
+            <a:endParaRPr lang="en-US" dirty="0"/>
+          </a:p>
+        </p:txBody>
+      </p:sp>
     </p:spTree>
   </p:cSld>
   <p:clrMapOvr>
@@ -6201,7 +6065,7 @@
           <a:p>
             <a:r>
               <a:rPr lang="en-US" dirty="0" smtClean="0"/>
-              <a:t>Warp Block Cell Processor</a:t>
+              <a:t>Optimizations</a:t>
             </a:r>
             <a:endParaRPr lang="en-US" dirty="0"/>
           </a:p>
@@ -6224,29 +6088,20 @@
           <a:p>
             <a:r>
               <a:rPr lang="en-US" dirty="0" smtClean="0"/>
-              <a:t>Dynamic scheduler</a:t>
+              <a:t>Shared memory cache</a:t>
             </a:r>
           </a:p>
           <a:p>
             <a:r>
               <a:rPr lang="en-US" dirty="0" smtClean="0"/>
-              <a:t>Jobs queue</a:t>
-            </a:r>
-          </a:p>
-          <a:p>
-            <a:r>
-              <a:rPr lang="en-US" dirty="0" smtClean="0"/>
-              <a:t>No instruction-level synchronization</a:t>
-            </a:r>
-          </a:p>
-          <a:p>
-            <a:r>
-              <a:rPr lang="en-US" dirty="0" smtClean="0"/>
-              <a:t>Memory-level synchronization (via spin locks)</a:t>
-            </a:r>
-          </a:p>
-          <a:p>
-            <a:endParaRPr lang="en-US" dirty="0" smtClean="0"/>
+              <a:t>Constant memory</a:t>
+            </a:r>
+          </a:p>
+          <a:p>
+            <a:r>
+              <a:rPr lang="en-US" strike="sngStrike" dirty="0" smtClean="0"/>
+              <a:t>Non-interleaved storage</a:t>
+            </a:r>
           </a:p>
           <a:p>
             <a:endParaRPr lang="en-US" dirty="0"/>
@@ -6302,49 +6157,35 @@
           <a:p>
             <a:r>
               <a:rPr lang="en-US" dirty="0" smtClean="0"/>
-              <a:t>Optimizations</a:t>
+              <a:t>Architecture/Implementation</a:t>
             </a:r>
             <a:endParaRPr lang="en-US" dirty="0"/>
           </a:p>
         </p:txBody>
       </p:sp>
-      <p:sp>
-        <p:nvSpPr>
-          <p:cNvPr id="3" name="Content Placeholder 2"/>
-          <p:cNvSpPr>
-            <a:spLocks noGrp="1"/>
-          </p:cNvSpPr>
+      <p:pic>
+        <p:nvPicPr>
+          <p:cNvPr id="4" name="Content Placeholder 3" descr="component_architecture.png"/>
+          <p:cNvPicPr>
+            <a:picLocks noGrp="1" noChangeAspect="1"/>
+          </p:cNvPicPr>
           <p:nvPr>
             <p:ph idx="1"/>
           </p:nvPr>
-        </p:nvSpPr>
-        <p:spPr/>
-        <p:txBody>
-          <a:bodyPr/>
-          <a:lstStyle/>
-          <a:p>
-            <a:r>
-              <a:rPr lang="en-US" dirty="0" smtClean="0"/>
-              <a:t>Shared memory cache</a:t>
-            </a:r>
-          </a:p>
-          <a:p>
-            <a:r>
-              <a:rPr lang="en-US" dirty="0" smtClean="0"/>
-              <a:t>Constant memory</a:t>
-            </a:r>
-          </a:p>
-          <a:p>
-            <a:r>
-              <a:rPr lang="en-US" strike="sngStrike" dirty="0" smtClean="0"/>
-              <a:t>Non-interleaved storage</a:t>
-            </a:r>
-          </a:p>
-          <a:p>
-            <a:endParaRPr lang="en-US" dirty="0"/>
-          </a:p>
-        </p:txBody>
-      </p:sp>
+        </p:nvPicPr>
+        <p:blipFill>
+          <a:blip r:embed="rId3" cstate="print"/>
+          <a:stretch>
+            <a:fillRect/>
+          </a:stretch>
+        </p:blipFill>
+        <p:spPr>
+          <a:xfrm>
+            <a:off x="244608" y="2247900"/>
+            <a:ext cx="8654784" cy="2362200"/>
+          </a:xfrm>
+        </p:spPr>
+      </p:pic>
     </p:spTree>
   </p:cSld>
   <p:clrMapOvr>

</xml_diff>

<commit_message>
change my IDP presentation some more
git-svn-id: https://scm.projects.hlrs.de/svn/ls1/MarDyn/branches/AndreasKirsch@800 a63bd714-7e14-4b5e-94e7-302c8c8ff188
</commit_message>
<xml_diff>
--- a/paper/presentation.pptx
+++ b/paper/presentation.pptx
@@ -5,21 +5,23 @@
     <p:sldMasterId id="2147483666" r:id="rId1"/>
   </p:sldMasterIdLst>
   <p:notesMasterIdLst>
-    <p:notesMasterId r:id="rId14"/>
+    <p:notesMasterId r:id="rId16"/>
   </p:notesMasterIdLst>
   <p:sldIdLst>
     <p:sldId id="257" r:id="rId2"/>
     <p:sldId id="270" r:id="rId3"/>
     <p:sldId id="261" r:id="rId4"/>
-    <p:sldId id="260" r:id="rId5"/>
+    <p:sldId id="272" r:id="rId5"/>
     <p:sldId id="265" r:id="rId6"/>
-    <p:sldId id="262" r:id="rId7"/>
-    <p:sldId id="263" r:id="rId8"/>
-    <p:sldId id="264" r:id="rId9"/>
-    <p:sldId id="266" r:id="rId10"/>
-    <p:sldId id="267" r:id="rId11"/>
-    <p:sldId id="268" r:id="rId12"/>
-    <p:sldId id="269" r:id="rId13"/>
+    <p:sldId id="260" r:id="rId7"/>
+    <p:sldId id="262" r:id="rId8"/>
+    <p:sldId id="263" r:id="rId9"/>
+    <p:sldId id="275" r:id="rId10"/>
+    <p:sldId id="266" r:id="rId11"/>
+    <p:sldId id="267" r:id="rId12"/>
+    <p:sldId id="274" r:id="rId13"/>
+    <p:sldId id="271" r:id="rId14"/>
+    <p:sldId id="269" r:id="rId15"/>
   </p:sldIdLst>
   <p:sldSz cx="9144000" cy="6858000" type="screen4x3"/>
   <p:notesSz cx="6858000" cy="9144000"/>
@@ -124,7 +126,6 @@
 <file path=ppt/charts/chart1.xml><?xml version="1.0" encoding="utf-8"?>
 <c:chartSpace xmlns:c="http://schemas.openxmlformats.org/drawingml/2006/chart" xmlns:a="http://schemas.openxmlformats.org/drawingml/2006/main" xmlns:r="http://schemas.openxmlformats.org/officeDocument/2006/relationships">
   <c:lang val="en-US"/>
-  <c:style val="10"/>
   <c:chart>
     <c:plotArea>
       <c:layout/>
@@ -134,14 +135,14 @@
           <c:idx val="2"/>
           <c:order val="0"/>
           <c:tx>
-            <c:v>CPU A</c:v>
+            <c:v>CPU B</c:v>
           </c:tx>
           <c:xVal>
             <c:numRef>
-              <c:f>'No CUDA'!$C$2:$C$6</c:f>
+              <c:f>'No CUDA (Tesla)'!$C$8:$C$13</c:f>
               <c:numCache>
-                <c:formatCode>General</c:formatCode>
-                <c:ptCount val="5"/>
+                <c:formatCode>0</c:formatCode>
+                <c:ptCount val="6"/>
                 <c:pt idx="0">
                   <c:v>5</c:v>
                 </c:pt>
@@ -156,30 +157,98 @@
                 </c:pt>
                 <c:pt idx="4">
                   <c:v>30</c:v>
+                </c:pt>
+                <c:pt idx="5">
+                  <c:v>40</c:v>
                 </c:pt>
               </c:numCache>
             </c:numRef>
           </c:xVal>
           <c:yVal>
             <c:numRef>
-              <c:f>'No CUDA'!$D$2:$D$6</c:f>
+              <c:f>'No CUDA (Tesla)'!$D$8:$D$13</c:f>
               <c:numCache>
                 <c:formatCode>0.00</c:formatCode>
-                <c:ptCount val="5"/>
+                <c:ptCount val="6"/>
                 <c:pt idx="0">
-                  <c:v>7.3037380000000001</c:v>
+                  <c:v>4.986936</c:v>
                 </c:pt>
                 <c:pt idx="1">
-                  <c:v>57.03002</c:v>
+                  <c:v>35.123510000000017</c:v>
                 </c:pt>
                 <c:pt idx="2">
-                  <c:v>203.99020000000004</c:v>
+                  <c:v>121.80829999999999</c:v>
                 </c:pt>
                 <c:pt idx="3">
-                  <c:v>689.88759999999979</c:v>
+                  <c:v>413.29919999999976</c:v>
                 </c:pt>
                 <c:pt idx="4">
-                  <c:v>1828.002</c:v>
+                  <c:v>1358.2809999999999</c:v>
+                </c:pt>
+                <c:pt idx="5">
+                  <c:v>4439.1280000000024</c:v>
+                </c:pt>
+              </c:numCache>
+            </c:numRef>
+          </c:yVal>
+          <c:smooth val="1"/>
+        </c:ser>
+        <c:ser>
+          <c:idx val="0"/>
+          <c:order val="1"/>
+          <c:tx>
+            <c:v>Thread Block</c:v>
+          </c:tx>
+          <c:xVal>
+            <c:numRef>
+              <c:f>'Cell Density Tesla (lj3d1)'!$C$2:$C$7</c:f>
+              <c:numCache>
+                <c:formatCode>General</c:formatCode>
+                <c:ptCount val="6"/>
+                <c:pt idx="0">
+                  <c:v>5</c:v>
+                </c:pt>
+                <c:pt idx="1">
+                  <c:v>10</c:v>
+                </c:pt>
+                <c:pt idx="2">
+                  <c:v>15</c:v>
+                </c:pt>
+                <c:pt idx="3">
+                  <c:v>20</c:v>
+                </c:pt>
+                <c:pt idx="4">
+                  <c:v>30</c:v>
+                </c:pt>
+                <c:pt idx="5">
+                  <c:v>40</c:v>
+                </c:pt>
+              </c:numCache>
+            </c:numRef>
+          </c:xVal>
+          <c:yVal>
+            <c:numRef>
+              <c:f>'Cell Density Tesla (lj3d1)'!$D$2:$D$7</c:f>
+              <c:numCache>
+                <c:formatCode>0.00</c:formatCode>
+                <c:ptCount val="6"/>
+                <c:pt idx="0">
+                  <c:v>3.0719679999999991</c:v>
+                </c:pt>
+                <c:pt idx="1">
+                  <c:v>8.7376850000000008</c:v>
+                </c:pt>
+                <c:pt idx="2">
+                  <c:v>25.130849999999999</c:v>
+                </c:pt>
+                <c:pt idx="3">
+                  <c:v>74.436170000000004</c:v>
+                </c:pt>
+                <c:pt idx="4">
+                  <c:v>344.20729999999986</c:v>
+                </c:pt>
+                <c:pt idx="5">
+                  <c:v>1961.1189999999999</c:v>
                 </c:pt>
               </c:numCache>
             </c:numRef>
@@ -188,15 +257,15 @@
         </c:ser>
         <c:ser>
           <c:idx val="1"/>
-          <c:order val="1"/>
+          <c:order val="2"/>
           <c:tx>
-            <c:v>CPU B</c:v>
+            <c:v>Warp Block</c:v>
           </c:tx>
           <c:xVal>
             <c:numRef>
-              <c:f>'No CUDA (Tesla)'!$C$2:$C$7</c:f>
+              <c:f>'Cell Density Tesla (lj3d1)'!$C$8:$C$13</c:f>
               <c:numCache>
-                <c:formatCode>0</c:formatCode>
+                <c:formatCode>General</c:formatCode>
                 <c:ptCount val="6"/>
                 <c:pt idx="0">
                   <c:v>5</c:v>
@@ -221,307 +290,41 @@
           </c:xVal>
           <c:yVal>
             <c:numRef>
-              <c:f>'No CUDA (Tesla)'!$D$2:$D$7</c:f>
+              <c:f>'Cell Density Tesla (lj3d1)'!$D$8:$D$13</c:f>
               <c:numCache>
                 <c:formatCode>0.00</c:formatCode>
                 <c:ptCount val="6"/>
                 <c:pt idx="0">
-                  <c:v>7.650366</c:v>
+                  <c:v>5.5388809999999982</c:v>
                 </c:pt>
                 <c:pt idx="1">
-                  <c:v>59.026650000000011</c:v>
+                  <c:v>5.3609549999999961</c:v>
                 </c:pt>
                 <c:pt idx="2">
-                  <c:v>217.91130000000001</c:v>
+                  <c:v>14.401730000000002</c:v>
                 </c:pt>
                 <c:pt idx="3">
-                  <c:v>983.53049999999996</c:v>
+                  <c:v>37.649800000000006</c:v>
                 </c:pt>
                 <c:pt idx="4">
-                  <c:v>2640.7059999999997</c:v>
+                  <c:v>125.76660000000003</c:v>
                 </c:pt>
                 <c:pt idx="5">
-                  <c:v>9042.7459999999955</c:v>
+                  <c:v>417.81330000000003</c:v>
                 </c:pt>
               </c:numCache>
             </c:numRef>
           </c:yVal>
           <c:smooth val="1"/>
         </c:ser>
-        <c:ser>
-          <c:idx val="0"/>
-          <c:order val="2"/>
-          <c:tx>
-            <c:v>Thread Block 1 Warp</c:v>
-          </c:tx>
-          <c:xVal>
-            <c:numRef>
-              <c:f>'Cell Density Tesla'!$C$51:$C$57</c:f>
-              <c:numCache>
-                <c:formatCode>0.00E+00</c:formatCode>
-                <c:ptCount val="7"/>
-                <c:pt idx="0">
-                  <c:v>5</c:v>
-                </c:pt>
-                <c:pt idx="1">
-                  <c:v>10</c:v>
-                </c:pt>
-                <c:pt idx="2">
-                  <c:v>15</c:v>
-                </c:pt>
-                <c:pt idx="3">
-                  <c:v>20</c:v>
-                </c:pt>
-                <c:pt idx="4">
-                  <c:v>30</c:v>
-                </c:pt>
-                <c:pt idx="5">
-                  <c:v>40</c:v>
-                </c:pt>
-                <c:pt idx="6">
-                  <c:v>50</c:v>
-                </c:pt>
-              </c:numCache>
-            </c:numRef>
-          </c:xVal>
-          <c:yVal>
-            <c:numRef>
-              <c:f>'Cell Density Tesla'!$D$2:$D$7</c:f>
-              <c:numCache>
-                <c:formatCode>0.00E+00</c:formatCode>
-                <c:ptCount val="6"/>
-                <c:pt idx="0">
-                  <c:v>2.484998</c:v>
-                </c:pt>
-                <c:pt idx="1">
-                  <c:v>4.4110519999999998</c:v>
-                </c:pt>
-                <c:pt idx="2">
-                  <c:v>11.11429</c:v>
-                </c:pt>
-                <c:pt idx="3">
-                  <c:v>33.465260000000001</c:v>
-                </c:pt>
-                <c:pt idx="4">
-                  <c:v>144.94579999999999</c:v>
-                </c:pt>
-                <c:pt idx="5">
-                  <c:v>1092.6199999999999</c:v>
-                </c:pt>
-              </c:numCache>
-            </c:numRef>
-          </c:yVal>
-          <c:smooth val="1"/>
-        </c:ser>
-        <c:ser>
-          <c:idx val="3"/>
-          <c:order val="3"/>
-          <c:tx>
-            <c:v>Thread Block 8 Warps</c:v>
-          </c:tx>
-          <c:xVal>
-            <c:numRef>
-              <c:f>'Cell Density Tesla'!$C$51:$C$57</c:f>
-              <c:numCache>
-                <c:formatCode>0.00E+00</c:formatCode>
-                <c:ptCount val="7"/>
-                <c:pt idx="0">
-                  <c:v>5</c:v>
-                </c:pt>
-                <c:pt idx="1">
-                  <c:v>10</c:v>
-                </c:pt>
-                <c:pt idx="2">
-                  <c:v>15</c:v>
-                </c:pt>
-                <c:pt idx="3">
-                  <c:v>20</c:v>
-                </c:pt>
-                <c:pt idx="4">
-                  <c:v>30</c:v>
-                </c:pt>
-                <c:pt idx="5">
-                  <c:v>40</c:v>
-                </c:pt>
-                <c:pt idx="6">
-                  <c:v>50</c:v>
-                </c:pt>
-              </c:numCache>
-            </c:numRef>
-          </c:xVal>
-          <c:yVal>
-            <c:numRef>
-              <c:f>'Cell Density Tesla'!$D$20:$D$25</c:f>
-              <c:numCache>
-                <c:formatCode>0.00E+00</c:formatCode>
-                <c:ptCount val="6"/>
-                <c:pt idx="0">
-                  <c:v>4.9185359999999978</c:v>
-                </c:pt>
-                <c:pt idx="1">
-                  <c:v>5.7502640000000014</c:v>
-                </c:pt>
-                <c:pt idx="2">
-                  <c:v>12.989080000000003</c:v>
-                </c:pt>
-                <c:pt idx="3">
-                  <c:v>36.925960000000003</c:v>
-                </c:pt>
-                <c:pt idx="4">
-                  <c:v>103.60579999999997</c:v>
-                </c:pt>
-                <c:pt idx="5">
-                  <c:v>460.47829999999988</c:v>
-                </c:pt>
-              </c:numCache>
-            </c:numRef>
-          </c:yVal>
-          <c:smooth val="1"/>
-        </c:ser>
-        <c:ser>
-          <c:idx val="7"/>
-          <c:order val="4"/>
-          <c:tx>
-            <c:v>Warp Block 8 Warps</c:v>
-          </c:tx>
-          <c:xVal>
-            <c:numRef>
-              <c:f>'Cell Density Tesla'!$C$51:$C$57</c:f>
-              <c:numCache>
-                <c:formatCode>0.00E+00</c:formatCode>
-                <c:ptCount val="7"/>
-                <c:pt idx="0">
-                  <c:v>5</c:v>
-                </c:pt>
-                <c:pt idx="1">
-                  <c:v>10</c:v>
-                </c:pt>
-                <c:pt idx="2">
-                  <c:v>15</c:v>
-                </c:pt>
-                <c:pt idx="3">
-                  <c:v>20</c:v>
-                </c:pt>
-                <c:pt idx="4">
-                  <c:v>30</c:v>
-                </c:pt>
-                <c:pt idx="5">
-                  <c:v>40</c:v>
-                </c:pt>
-                <c:pt idx="6">
-                  <c:v>50</c:v>
-                </c:pt>
-              </c:numCache>
-            </c:numRef>
-          </c:xVal>
-          <c:yVal>
-            <c:numRef>
-              <c:f>'Cell Density Tesla'!$D$44:$D$50</c:f>
-              <c:numCache>
-                <c:formatCode>0.00E+00</c:formatCode>
-                <c:ptCount val="7"/>
-                <c:pt idx="0">
-                  <c:v>6.1424709999999978</c:v>
-                </c:pt>
-                <c:pt idx="1">
-                  <c:v>4.0530939999999998</c:v>
-                </c:pt>
-                <c:pt idx="2">
-                  <c:v>8.8355450000000051</c:v>
-                </c:pt>
-                <c:pt idx="3">
-                  <c:v>22.91724</c:v>
-                </c:pt>
-                <c:pt idx="4">
-                  <c:v>67.816019999999995</c:v>
-                </c:pt>
-                <c:pt idx="5">
-                  <c:v>245.54089999999999</c:v>
-                </c:pt>
-                <c:pt idx="6">
-                  <c:v>530.88779999999997</c:v>
-                </c:pt>
-              </c:numCache>
-            </c:numRef>
-          </c:yVal>
-          <c:smooth val="1"/>
-        </c:ser>
-        <c:ser>
-          <c:idx val="8"/>
-          <c:order val="5"/>
-          <c:tx>
-            <c:v>Warp Block 16 Warps</c:v>
-          </c:tx>
-          <c:xVal>
-            <c:numRef>
-              <c:f>'Cell Density Tesla'!$C$51:$C$57</c:f>
-              <c:numCache>
-                <c:formatCode>0.00E+00</c:formatCode>
-                <c:ptCount val="7"/>
-                <c:pt idx="0">
-                  <c:v>5</c:v>
-                </c:pt>
-                <c:pt idx="1">
-                  <c:v>10</c:v>
-                </c:pt>
-                <c:pt idx="2">
-                  <c:v>15</c:v>
-                </c:pt>
-                <c:pt idx="3">
-                  <c:v>20</c:v>
-                </c:pt>
-                <c:pt idx="4">
-                  <c:v>30</c:v>
-                </c:pt>
-                <c:pt idx="5">
-                  <c:v>40</c:v>
-                </c:pt>
-                <c:pt idx="6">
-                  <c:v>50</c:v>
-                </c:pt>
-              </c:numCache>
-            </c:numRef>
-          </c:xVal>
-          <c:yVal>
-            <c:numRef>
-              <c:f>'Cell Density Tesla'!$D$51:$D$57</c:f>
-              <c:numCache>
-                <c:formatCode>0.00E+00</c:formatCode>
-                <c:ptCount val="7"/>
-                <c:pt idx="0">
-                  <c:v>6.6487530000000001</c:v>
-                </c:pt>
-                <c:pt idx="1">
-                  <c:v>4.2233029999999996</c:v>
-                </c:pt>
-                <c:pt idx="2">
-                  <c:v>9.2224020000000007</c:v>
-                </c:pt>
-                <c:pt idx="3">
-                  <c:v>23.414729999999988</c:v>
-                </c:pt>
-                <c:pt idx="4">
-                  <c:v>71.597660000000047</c:v>
-                </c:pt>
-                <c:pt idx="5">
-                  <c:v>250.28730000000004</c:v>
-                </c:pt>
-                <c:pt idx="6">
-                  <c:v>465.14139999999986</c:v>
-                </c:pt>
-              </c:numCache>
-            </c:numRef>
-          </c:yVal>
-          <c:smooth val="1"/>
-        </c:ser>
-        <c:axId val="80163968"/>
-        <c:axId val="80165888"/>
+        <c:axId val="83623936"/>
+        <c:axId val="83625856"/>
       </c:scatterChart>
       <c:valAx>
-        <c:axId val="80163968"/>
+        <c:axId val="83623936"/>
         <c:scaling>
           <c:orientation val="minMax"/>
-          <c:max val="50"/>
+          <c:max val="40"/>
           <c:min val="5"/>
         </c:scaling>
         <c:axPos val="b"/>
@@ -545,13 +348,13 @@
         </c:title>
         <c:numFmt formatCode="General" sourceLinked="0"/>
         <c:tickLblPos val="nextTo"/>
-        <c:crossAx val="80165888"/>
+        <c:crossAx val="83625856"/>
         <c:crosses val="autoZero"/>
         <c:crossBetween val="midCat"/>
         <c:majorUnit val="5"/>
       </c:valAx>
       <c:valAx>
-        <c:axId val="80165888"/>
+        <c:axId val="83625856"/>
         <c:scaling>
           <c:logBase val="10"/>
           <c:orientation val="minMax"/>
@@ -579,7 +382,7 @@
         </c:title>
         <c:numFmt formatCode="General" sourceLinked="0"/>
         <c:tickLblPos val="nextTo"/>
-        <c:crossAx val="80163968"/>
+        <c:crossAx val="83623936"/>
         <c:crosses val="autoZero"/>
         <c:crossBetween val="midCat"/>
       </c:valAx>
@@ -607,6 +410,7 @@
 <file path=ppt/charts/chart2.xml><?xml version="1.0" encoding="utf-8"?>
 <c:chartSpace xmlns:c="http://schemas.openxmlformats.org/drawingml/2006/chart" xmlns:a="http://schemas.openxmlformats.org/drawingml/2006/main" xmlns:r="http://schemas.openxmlformats.org/officeDocument/2006/relationships">
   <c:lang val="en-US"/>
+  <c:style val="10"/>
   <c:chart>
     <c:plotArea>
       <c:layout/>
@@ -616,11 +420,67 @@
           <c:idx val="2"/>
           <c:order val="0"/>
           <c:tx>
+            <c:v>CPU A</c:v>
+          </c:tx>
+          <c:xVal>
+            <c:numRef>
+              <c:f>'No CUDA'!$C$2:$C$6</c:f>
+              <c:numCache>
+                <c:formatCode>General</c:formatCode>
+                <c:ptCount val="5"/>
+                <c:pt idx="0">
+                  <c:v>5</c:v>
+                </c:pt>
+                <c:pt idx="1">
+                  <c:v>10</c:v>
+                </c:pt>
+                <c:pt idx="2">
+                  <c:v>15</c:v>
+                </c:pt>
+                <c:pt idx="3">
+                  <c:v>20</c:v>
+                </c:pt>
+                <c:pt idx="4">
+                  <c:v>30</c:v>
+                </c:pt>
+              </c:numCache>
+            </c:numRef>
+          </c:xVal>
+          <c:yVal>
+            <c:numRef>
+              <c:f>'No CUDA'!$D$2:$D$6</c:f>
+              <c:numCache>
+                <c:formatCode>0.00</c:formatCode>
+                <c:ptCount val="5"/>
+                <c:pt idx="0">
+                  <c:v>7.3037380000000001</c:v>
+                </c:pt>
+                <c:pt idx="1">
+                  <c:v>57.03002</c:v>
+                </c:pt>
+                <c:pt idx="2">
+                  <c:v>203.99020000000004</c:v>
+                </c:pt>
+                <c:pt idx="3">
+                  <c:v>689.88759999999968</c:v>
+                </c:pt>
+                <c:pt idx="4">
+                  <c:v>1828.002</c:v>
+                </c:pt>
+              </c:numCache>
+            </c:numRef>
+          </c:yVal>
+          <c:smooth val="1"/>
+        </c:ser>
+        <c:ser>
+          <c:idx val="1"/>
+          <c:order val="1"/>
+          <c:tx>
             <c:v>CPU B</c:v>
           </c:tx>
           <c:xVal>
             <c:numRef>
-              <c:f>'No CUDA (Tesla)'!$C$8:$C$13</c:f>
+              <c:f>'No CUDA (Tesla)'!$C$2:$C$7</c:f>
               <c:numCache>
                 <c:formatCode>0</c:formatCode>
                 <c:ptCount val="6"/>
@@ -647,27 +507,27 @@
           </c:xVal>
           <c:yVal>
             <c:numRef>
-              <c:f>'No CUDA (Tesla)'!$D$8:$D$13</c:f>
+              <c:f>'No CUDA (Tesla)'!$D$2:$D$7</c:f>
               <c:numCache>
                 <c:formatCode>0.00</c:formatCode>
                 <c:ptCount val="6"/>
                 <c:pt idx="0">
-                  <c:v>4.986936</c:v>
+                  <c:v>7.650366</c:v>
                 </c:pt>
                 <c:pt idx="1">
-                  <c:v>35.12351000000001</c:v>
+                  <c:v>59.026650000000011</c:v>
                 </c:pt>
                 <c:pt idx="2">
-                  <c:v>121.80829999999999</c:v>
+                  <c:v>217.91130000000001</c:v>
                 </c:pt>
                 <c:pt idx="3">
-                  <c:v>413.29919999999987</c:v>
+                  <c:v>983.53049999999996</c:v>
                 </c:pt>
                 <c:pt idx="4">
-                  <c:v>1358.2809999999999</c:v>
+                  <c:v>2640.7059999999997</c:v>
                 </c:pt>
                 <c:pt idx="5">
-                  <c:v>4439.1280000000015</c:v>
+                  <c:v>9042.7459999999937</c:v>
                 </c:pt>
               </c:numCache>
             </c:numRef>
@@ -676,16 +536,16 @@
         </c:ser>
         <c:ser>
           <c:idx val="0"/>
-          <c:order val="1"/>
+          <c:order val="2"/>
           <c:tx>
-            <c:v>Thread Block</c:v>
+            <c:v>Thread Block 1 Warp</c:v>
           </c:tx>
           <c:xVal>
             <c:numRef>
-              <c:f>'Cell Density Tesla (lj3d1)'!$C$2:$C$7</c:f>
+              <c:f>'Cell Density Tesla'!$C$51:$C$57</c:f>
               <c:numCache>
-                <c:formatCode>General</c:formatCode>
-                <c:ptCount val="6"/>
+                <c:formatCode>0.00E+00</c:formatCode>
+                <c:ptCount val="7"/>
                 <c:pt idx="0">
                   <c:v>5</c:v>
                 </c:pt>
@@ -703,33 +563,36 @@
                 </c:pt>
                 <c:pt idx="5">
                   <c:v>40</c:v>
+                </c:pt>
+                <c:pt idx="6">
+                  <c:v>50</c:v>
                 </c:pt>
               </c:numCache>
             </c:numRef>
           </c:xVal>
           <c:yVal>
             <c:numRef>
-              <c:f>'Cell Density Tesla (lj3d1)'!$D$2:$D$7</c:f>
+              <c:f>'Cell Density Tesla'!$D$2:$D$7</c:f>
               <c:numCache>
-                <c:formatCode>0.00</c:formatCode>
+                <c:formatCode>0.00E+00</c:formatCode>
                 <c:ptCount val="6"/>
                 <c:pt idx="0">
-                  <c:v>3.0719679999999996</c:v>
+                  <c:v>2.484998</c:v>
                 </c:pt>
                 <c:pt idx="1">
-                  <c:v>8.737684999999999</c:v>
+                  <c:v>4.4110519999999998</c:v>
                 </c:pt>
                 <c:pt idx="2">
-                  <c:v>25.130849999999999</c:v>
+                  <c:v>11.114289999999999</c:v>
                 </c:pt>
                 <c:pt idx="3">
-                  <c:v>74.436170000000004</c:v>
+                  <c:v>33.465260000000001</c:v>
                 </c:pt>
                 <c:pt idx="4">
-                  <c:v>344.20729999999992</c:v>
+                  <c:v>144.94579999999999</c:v>
                 </c:pt>
                 <c:pt idx="5">
-                  <c:v>1961.1189999999999</c:v>
+                  <c:v>1092.6199999999999</c:v>
                 </c:pt>
               </c:numCache>
             </c:numRef>
@@ -737,17 +600,17 @@
           <c:smooth val="1"/>
         </c:ser>
         <c:ser>
-          <c:idx val="1"/>
-          <c:order val="2"/>
+          <c:idx val="3"/>
+          <c:order val="3"/>
           <c:tx>
-            <c:v>Warp Block</c:v>
+            <c:v>Thread Block 8 Warps</c:v>
           </c:tx>
           <c:xVal>
             <c:numRef>
-              <c:f>'Cell Density Tesla (lj3d1)'!$C$8:$C$13</c:f>
+              <c:f>'Cell Density Tesla'!$C$51:$C$57</c:f>
               <c:numCache>
-                <c:formatCode>General</c:formatCode>
-                <c:ptCount val="6"/>
+                <c:formatCode>0.00E+00</c:formatCode>
+                <c:ptCount val="7"/>
                 <c:pt idx="0">
                   <c:v>5</c:v>
                 </c:pt>
@@ -765,47 +628,186 @@
                 </c:pt>
                 <c:pt idx="5">
                   <c:v>40</c:v>
+                </c:pt>
+                <c:pt idx="6">
+                  <c:v>50</c:v>
                 </c:pt>
               </c:numCache>
             </c:numRef>
           </c:xVal>
           <c:yVal>
             <c:numRef>
-              <c:f>'Cell Density Tesla (lj3d1)'!$D$8:$D$13</c:f>
+              <c:f>'Cell Density Tesla'!$D$20:$D$25</c:f>
               <c:numCache>
-                <c:formatCode>0.00</c:formatCode>
+                <c:formatCode>0.00E+00</c:formatCode>
                 <c:ptCount val="6"/>
                 <c:pt idx="0">
-                  <c:v>5.5388809999999991</c:v>
+                  <c:v>4.9185359999999969</c:v>
                 </c:pt>
                 <c:pt idx="1">
-                  <c:v>5.3609549999999979</c:v>
+                  <c:v>5.7502640000000014</c:v>
                 </c:pt>
                 <c:pt idx="2">
-                  <c:v>14.401730000000002</c:v>
+                  <c:v>12.989080000000005</c:v>
                 </c:pt>
                 <c:pt idx="3">
-                  <c:v>37.649800000000006</c:v>
+                  <c:v>36.925960000000003</c:v>
                 </c:pt>
                 <c:pt idx="4">
-                  <c:v>125.76660000000001</c:v>
+                  <c:v>103.60579999999996</c:v>
                 </c:pt>
                 <c:pt idx="5">
-                  <c:v>417.81330000000003</c:v>
+                  <c:v>460.47829999999976</c:v>
                 </c:pt>
               </c:numCache>
             </c:numRef>
           </c:yVal>
           <c:smooth val="1"/>
         </c:ser>
-        <c:axId val="83752064"/>
-        <c:axId val="83753984"/>
+        <c:ser>
+          <c:idx val="7"/>
+          <c:order val="4"/>
+          <c:tx>
+            <c:v>Warp Block 8 Warps</c:v>
+          </c:tx>
+          <c:xVal>
+            <c:numRef>
+              <c:f>'Cell Density Tesla'!$C$51:$C$57</c:f>
+              <c:numCache>
+                <c:formatCode>0.00E+00</c:formatCode>
+                <c:ptCount val="7"/>
+                <c:pt idx="0">
+                  <c:v>5</c:v>
+                </c:pt>
+                <c:pt idx="1">
+                  <c:v>10</c:v>
+                </c:pt>
+                <c:pt idx="2">
+                  <c:v>15</c:v>
+                </c:pt>
+                <c:pt idx="3">
+                  <c:v>20</c:v>
+                </c:pt>
+                <c:pt idx="4">
+                  <c:v>30</c:v>
+                </c:pt>
+                <c:pt idx="5">
+                  <c:v>40</c:v>
+                </c:pt>
+                <c:pt idx="6">
+                  <c:v>50</c:v>
+                </c:pt>
+              </c:numCache>
+            </c:numRef>
+          </c:xVal>
+          <c:yVal>
+            <c:numRef>
+              <c:f>'Cell Density Tesla'!$D$44:$D$50</c:f>
+              <c:numCache>
+                <c:formatCode>0.00E+00</c:formatCode>
+                <c:ptCount val="7"/>
+                <c:pt idx="0">
+                  <c:v>6.1424709999999969</c:v>
+                </c:pt>
+                <c:pt idx="1">
+                  <c:v>4.0530939999999998</c:v>
+                </c:pt>
+                <c:pt idx="2">
+                  <c:v>8.8355450000000069</c:v>
+                </c:pt>
+                <c:pt idx="3">
+                  <c:v>22.91724</c:v>
+                </c:pt>
+                <c:pt idx="4">
+                  <c:v>67.816019999999995</c:v>
+                </c:pt>
+                <c:pt idx="5">
+                  <c:v>245.54089999999999</c:v>
+                </c:pt>
+                <c:pt idx="6">
+                  <c:v>530.88779999999997</c:v>
+                </c:pt>
+              </c:numCache>
+            </c:numRef>
+          </c:yVal>
+          <c:smooth val="1"/>
+        </c:ser>
+        <c:ser>
+          <c:idx val="8"/>
+          <c:order val="5"/>
+          <c:tx>
+            <c:v>Warp Block 16 Warps</c:v>
+          </c:tx>
+          <c:xVal>
+            <c:numRef>
+              <c:f>'Cell Density Tesla'!$C$51:$C$57</c:f>
+              <c:numCache>
+                <c:formatCode>0.00E+00</c:formatCode>
+                <c:ptCount val="7"/>
+                <c:pt idx="0">
+                  <c:v>5</c:v>
+                </c:pt>
+                <c:pt idx="1">
+                  <c:v>10</c:v>
+                </c:pt>
+                <c:pt idx="2">
+                  <c:v>15</c:v>
+                </c:pt>
+                <c:pt idx="3">
+                  <c:v>20</c:v>
+                </c:pt>
+                <c:pt idx="4">
+                  <c:v>30</c:v>
+                </c:pt>
+                <c:pt idx="5">
+                  <c:v>40</c:v>
+                </c:pt>
+                <c:pt idx="6">
+                  <c:v>50</c:v>
+                </c:pt>
+              </c:numCache>
+            </c:numRef>
+          </c:xVal>
+          <c:yVal>
+            <c:numRef>
+              <c:f>'Cell Density Tesla'!$D$51:$D$57</c:f>
+              <c:numCache>
+                <c:formatCode>0.00E+00</c:formatCode>
+                <c:ptCount val="7"/>
+                <c:pt idx="0">
+                  <c:v>6.6487530000000001</c:v>
+                </c:pt>
+                <c:pt idx="1">
+                  <c:v>4.2233029999999996</c:v>
+                </c:pt>
+                <c:pt idx="2">
+                  <c:v>9.2224020000000007</c:v>
+                </c:pt>
+                <c:pt idx="3">
+                  <c:v>23.414729999999984</c:v>
+                </c:pt>
+                <c:pt idx="4">
+                  <c:v>71.597660000000062</c:v>
+                </c:pt>
+                <c:pt idx="5">
+                  <c:v>250.28730000000004</c:v>
+                </c:pt>
+                <c:pt idx="6">
+                  <c:v>465.14139999999981</c:v>
+                </c:pt>
+              </c:numCache>
+            </c:numRef>
+          </c:yVal>
+          <c:smooth val="1"/>
+        </c:ser>
+        <c:axId val="84789120"/>
+        <c:axId val="84795392"/>
       </c:scatterChart>
       <c:valAx>
-        <c:axId val="83752064"/>
+        <c:axId val="84789120"/>
         <c:scaling>
           <c:orientation val="minMax"/>
-          <c:max val="40"/>
+          <c:max val="50"/>
           <c:min val="5"/>
         </c:scaling>
         <c:axPos val="b"/>
@@ -829,13 +831,13 @@
         </c:title>
         <c:numFmt formatCode="General" sourceLinked="0"/>
         <c:tickLblPos val="nextTo"/>
-        <c:crossAx val="83753984"/>
+        <c:crossAx val="84795392"/>
         <c:crosses val="autoZero"/>
         <c:crossBetween val="midCat"/>
         <c:majorUnit val="5"/>
       </c:valAx>
       <c:valAx>
-        <c:axId val="83753984"/>
+        <c:axId val="84795392"/>
         <c:scaling>
           <c:logBase val="10"/>
           <c:orientation val="minMax"/>
@@ -863,7 +865,7 @@
         </c:title>
         <c:numFmt formatCode="General" sourceLinked="0"/>
         <c:tickLblPos val="nextTo"/>
-        <c:crossAx val="83752064"/>
+        <c:crossAx val="84789120"/>
         <c:crosses val="autoZero"/>
         <c:crossBetween val="midCat"/>
       </c:valAx>
@@ -971,7 +973,7 @@
             <a:fld id="{26C85194-BF7C-41D1-8DE6-B0DE61E9F44C}" type="datetimeFigureOut">
               <a:rPr lang="en-US" smtClean="0"/>
               <a:pPr/>
-              <a:t>10/14/2011</a:t>
+              <a:t>10/17/2011</a:t>
             </a:fld>
             <a:endParaRPr lang="en-US"/>
           </a:p>
@@ -1410,6 +1412,259 @@
 </p:notes>
 </file>
 
+<file path=ppt/notesSlides/notesSlide10.xml><?xml version="1.0" encoding="utf-8"?>
+<p:notes xmlns:a="http://schemas.openxmlformats.org/drawingml/2006/main" xmlns:r="http://schemas.openxmlformats.org/officeDocument/2006/relationships" xmlns:p="http://schemas.openxmlformats.org/presentationml/2006/main">
+  <p:cSld>
+    <p:spTree>
+      <p:nvGrpSpPr>
+        <p:cNvPr id="1" name=""/>
+        <p:cNvGrpSpPr/>
+        <p:nvPr/>
+      </p:nvGrpSpPr>
+      <p:grpSpPr>
+        <a:xfrm>
+          <a:off x="0" y="0"/>
+          <a:ext cx="0" cy="0"/>
+          <a:chOff x="0" y="0"/>
+          <a:chExt cx="0" cy="0"/>
+        </a:xfrm>
+      </p:grpSpPr>
+      <p:sp>
+        <p:nvSpPr>
+          <p:cNvPr id="2" name="Slide Image Placeholder 1"/>
+          <p:cNvSpPr>
+            <a:spLocks noGrp="1" noRot="1" noChangeAspect="1"/>
+          </p:cNvSpPr>
+          <p:nvPr>
+            <p:ph type="sldImg"/>
+          </p:nvPr>
+        </p:nvSpPr>
+        <p:spPr/>
+      </p:sp>
+      <p:sp>
+        <p:nvSpPr>
+          <p:cNvPr id="3" name="Notes Placeholder 2"/>
+          <p:cNvSpPr>
+            <a:spLocks noGrp="1"/>
+          </p:cNvSpPr>
+          <p:nvPr>
+            <p:ph type="body" idx="1"/>
+          </p:nvPr>
+        </p:nvSpPr>
+        <p:spPr/>
+        <p:txBody>
+          <a:bodyPr>
+            <a:normAutofit/>
+          </a:bodyPr>
+          <a:lstStyle/>
+          <a:p>
+            <a:r>
+              <a:rPr lang="en-US" dirty="0" smtClean="0"/>
+              <a:t>Constructors can be evil (for shared memory objects)</a:t>
+            </a:r>
+          </a:p>
+          <a:p>
+            <a:r>
+              <a:rPr lang="en-US" dirty="0" smtClean="0"/>
+              <a:t>Too many nested, </a:t>
+            </a:r>
+            <a:r>
+              <a:rPr lang="en-US" dirty="0" err="1" smtClean="0"/>
+              <a:t>inlined</a:t>
+            </a:r>
+            <a:r>
+              <a:rPr lang="en-US" dirty="0" smtClean="0"/>
+              <a:t> loops confuse the compiler: __</a:t>
+            </a:r>
+            <a:r>
+              <a:rPr lang="en-US" dirty="0" err="1" smtClean="0"/>
+              <a:t>noinline</a:t>
+            </a:r>
+            <a:r>
+              <a:rPr lang="en-US" dirty="0" smtClean="0"/>
+              <a:t>__ to the rescue!</a:t>
+            </a:r>
+          </a:p>
+          <a:p>
+            <a:r>
+              <a:rPr lang="en-US" dirty="0" smtClean="0"/>
+              <a:t>__</a:t>
+            </a:r>
+            <a:r>
+              <a:rPr lang="en-US" dirty="0" err="1" smtClean="0"/>
+              <a:t>syncthreads</a:t>
+            </a:r>
+            <a:r>
+              <a:rPr lang="en-US" dirty="0" smtClean="0"/>
+              <a:t>() should be called __</a:t>
+            </a:r>
+            <a:r>
+              <a:rPr lang="en-US" dirty="0" err="1" smtClean="0"/>
+              <a:t>syncwarps</a:t>
+            </a:r>
+            <a:r>
+              <a:rPr lang="en-US" dirty="0" smtClean="0"/>
+              <a:t>()!</a:t>
+            </a:r>
+          </a:p>
+          <a:p>
+            <a:r>
+              <a:rPr lang="en-US" dirty="0" smtClean="0"/>
+              <a:t>PTX assembly has more “features”</a:t>
+            </a:r>
+          </a:p>
+          <a:p>
+            <a:endParaRPr lang="en-US" b="1" i="1" dirty="0" smtClean="0"/>
+          </a:p>
+          <a:p>
+            <a:r>
+              <a:rPr lang="en-US" b="1" i="1" dirty="0" smtClean="0"/>
+              <a:t>PTX </a:t>
+            </a:r>
+            <a:r>
+              <a:rPr lang="en-US" b="1" i="1" dirty="0" smtClean="0"/>
+              <a:t>reduction and enhanced</a:t>
+            </a:r>
+            <a:r>
+              <a:rPr lang="en-US" b="1" i="1" baseline="0" dirty="0" smtClean="0"/>
+              <a:t> synchronization instructions</a:t>
+            </a:r>
+            <a:endParaRPr lang="en-US" b="1" i="1" dirty="0"/>
+          </a:p>
+        </p:txBody>
+      </p:sp>
+      <p:sp>
+        <p:nvSpPr>
+          <p:cNvPr id="4" name="Slide Number Placeholder 3"/>
+          <p:cNvSpPr>
+            <a:spLocks noGrp="1"/>
+          </p:cNvSpPr>
+          <p:nvPr>
+            <p:ph type="sldNum" sz="quarter" idx="10"/>
+          </p:nvPr>
+        </p:nvSpPr>
+        <p:spPr/>
+        <p:txBody>
+          <a:bodyPr/>
+          <a:lstStyle/>
+          <a:p>
+            <a:fld id="{FDBF08A4-716A-4A7F-AEC8-1293D93B8B14}" type="slidenum">
+              <a:rPr lang="en-US" smtClean="0"/>
+              <a:pPr/>
+              <a:t>12</a:t>
+            </a:fld>
+            <a:endParaRPr lang="en-US"/>
+          </a:p>
+        </p:txBody>
+      </p:sp>
+    </p:spTree>
+  </p:cSld>
+  <p:clrMapOvr>
+    <a:masterClrMapping/>
+  </p:clrMapOvr>
+</p:notes>
+</file>
+
+<file path=ppt/notesSlides/notesSlide11.xml><?xml version="1.0" encoding="utf-8"?>
+<p:notes xmlns:a="http://schemas.openxmlformats.org/drawingml/2006/main" xmlns:r="http://schemas.openxmlformats.org/officeDocument/2006/relationships" xmlns:p="http://schemas.openxmlformats.org/presentationml/2006/main">
+  <p:cSld>
+    <p:spTree>
+      <p:nvGrpSpPr>
+        <p:cNvPr id="1" name=""/>
+        <p:cNvGrpSpPr/>
+        <p:nvPr/>
+      </p:nvGrpSpPr>
+      <p:grpSpPr>
+        <a:xfrm>
+          <a:off x="0" y="0"/>
+          <a:ext cx="0" cy="0"/>
+          <a:chOff x="0" y="0"/>
+          <a:chExt cx="0" cy="0"/>
+        </a:xfrm>
+      </p:grpSpPr>
+      <p:sp>
+        <p:nvSpPr>
+          <p:cNvPr id="2" name="Slide Image Placeholder 1"/>
+          <p:cNvSpPr>
+            <a:spLocks noGrp="1" noRot="1" noChangeAspect="1"/>
+          </p:cNvSpPr>
+          <p:nvPr>
+            <p:ph type="sldImg"/>
+          </p:nvPr>
+        </p:nvSpPr>
+        <p:spPr/>
+      </p:sp>
+      <p:sp>
+        <p:nvSpPr>
+          <p:cNvPr id="3" name="Notes Placeholder 2"/>
+          <p:cNvSpPr>
+            <a:spLocks noGrp="1"/>
+          </p:cNvSpPr>
+          <p:nvPr>
+            <p:ph type="body" idx="1"/>
+          </p:nvPr>
+        </p:nvSpPr>
+        <p:spPr/>
+        <p:txBody>
+          <a:bodyPr>
+            <a:normAutofit/>
+          </a:bodyPr>
+          <a:lstStyle/>
+          <a:p>
+            <a:r>
+              <a:rPr lang="en-US" dirty="0" smtClean="0"/>
+              <a:t>Benchmark early and benchmark often!</a:t>
+            </a:r>
+          </a:p>
+          <a:p>
+            <a:r>
+              <a:rPr lang="en-US" dirty="0" smtClean="0"/>
+              <a:t>Write down expectations and how to verify them before implementing anything</a:t>
+            </a:r>
+          </a:p>
+          <a:p>
+            <a:r>
+              <a:rPr lang="en-US" dirty="0" smtClean="0"/>
+              <a:t>Iterate multiple times and throw away old code</a:t>
+            </a:r>
+          </a:p>
+          <a:p>
+            <a:endParaRPr lang="en-US" dirty="0"/>
+          </a:p>
+        </p:txBody>
+      </p:sp>
+      <p:sp>
+        <p:nvSpPr>
+          <p:cNvPr id="4" name="Slide Number Placeholder 3"/>
+          <p:cNvSpPr>
+            <a:spLocks noGrp="1"/>
+          </p:cNvSpPr>
+          <p:nvPr>
+            <p:ph type="sldNum" sz="quarter" idx="10"/>
+          </p:nvPr>
+        </p:nvSpPr>
+        <p:spPr/>
+        <p:txBody>
+          <a:bodyPr/>
+          <a:lstStyle/>
+          <a:p>
+            <a:fld id="{FDBF08A4-716A-4A7F-AEC8-1293D93B8B14}" type="slidenum">
+              <a:rPr lang="en-US" smtClean="0"/>
+              <a:pPr/>
+              <a:t>13</a:t>
+            </a:fld>
+            <a:endParaRPr lang="en-US"/>
+          </a:p>
+        </p:txBody>
+      </p:sp>
+    </p:spTree>
+  </p:cSld>
+  <p:clrMapOvr>
+    <a:masterClrMapping/>
+  </p:clrMapOvr>
+</p:notes>
+</file>
+
 <file path=ppt/notesSlides/notesSlide2.xml><?xml version="1.0" encoding="utf-8"?>
 <p:notes xmlns:a="http://schemas.openxmlformats.org/drawingml/2006/main" xmlns:r="http://schemas.openxmlformats.org/officeDocument/2006/relationships" xmlns:p="http://schemas.openxmlformats.org/presentationml/2006/main">
   <p:cSld>
@@ -1458,12 +1713,58 @@
           <a:p>
             <a:r>
               <a:rPr lang="en-US" dirty="0" smtClean="0"/>
-              <a:t>Explain</a:t>
-            </a:r>
-            <a:r>
-              <a:rPr lang="en-US" baseline="0" dirty="0" smtClean="0"/>
-              <a:t> thread block and warp block processor</a:t>
-            </a:r>
+              <a:t>One molecule can be made up of multiple sites</a:t>
+            </a:r>
+          </a:p>
+          <a:p>
+            <a:r>
+              <a:rPr lang="en-US" dirty="0" smtClean="0"/>
+              <a:t>Different potentials possible for the sites: </a:t>
+            </a:r>
+            <a:r>
+              <a:rPr lang="en-US" b="1" dirty="0" err="1" smtClean="0"/>
+              <a:t>Lennard</a:t>
+            </a:r>
+            <a:r>
+              <a:rPr lang="en-US" b="1" dirty="0" smtClean="0"/>
+              <a:t>-Jones</a:t>
+            </a:r>
+            <a:r>
+              <a:rPr lang="en-US" dirty="0" smtClean="0"/>
+              <a:t>, </a:t>
+            </a:r>
+            <a:r>
+              <a:rPr lang="en-US" b="1" dirty="0" smtClean="0"/>
+              <a:t>Charges</a:t>
+            </a:r>
+            <a:r>
+              <a:rPr lang="en-US" dirty="0" smtClean="0"/>
+              <a:t>, </a:t>
+            </a:r>
+            <a:r>
+              <a:rPr lang="en-US" b="1" dirty="0" smtClean="0"/>
+              <a:t>Dipoles</a:t>
+            </a:r>
+          </a:p>
+          <a:p>
+            <a:r>
+              <a:rPr lang="en-US" dirty="0" smtClean="0"/>
+              <a:t>Interactions need to be calculated between all molecule pairs</a:t>
+            </a:r>
+          </a:p>
+          <a:p>
+            <a:r>
+              <a:rPr lang="en-US" dirty="0" smtClean="0"/>
+              <a:t>Simplification: use a cutoff radius to reduce the number of interactions</a:t>
+            </a:r>
+          </a:p>
+          <a:p>
+            <a:r>
+              <a:rPr lang="en-US" dirty="0" smtClean="0"/>
+              <a:t>Result: Linked Cell Algorithm</a:t>
+            </a:r>
+          </a:p>
+          <a:p>
             <a:endParaRPr lang="en-US" dirty="0"/>
           </a:p>
         </p:txBody>
@@ -1486,7 +1787,7 @@
             <a:fld id="{FDBF08A4-716A-4A7F-AEC8-1293D93B8B14}" type="slidenum">
               <a:rPr lang="en-US" smtClean="0"/>
               <a:pPr/>
-              <a:t>4</a:t>
+              <a:t>2</a:t>
             </a:fld>
             <a:endParaRPr lang="en-US"/>
           </a:p>
@@ -1546,6 +1847,33 @@
           </a:bodyPr>
           <a:lstStyle/>
           <a:p>
+            <a:pPr marL="0" marR="0" indent="0" algn="l" defTabSz="914400" rtl="0" eaLnBrk="1" fontAlgn="auto" latinLnBrk="0" hangingPunct="1">
+              <a:lnSpc>
+                <a:spcPct val="100000"/>
+              </a:lnSpc>
+              <a:spcBef>
+                <a:spcPts val="0"/>
+              </a:spcBef>
+              <a:spcAft>
+                <a:spcPts val="0"/>
+              </a:spcAft>
+              <a:buClrTx/>
+              <a:buSzTx/>
+              <a:buFontTx/>
+              <a:buNone/>
+              <a:tabLst/>
+              <a:defRPr/>
+            </a:pPr>
+            <a:r>
+              <a:rPr lang="en-US" b="1" i="1" dirty="0" smtClean="0"/>
+              <a:t>Draw a CUDA</a:t>
+            </a:r>
+            <a:r>
+              <a:rPr lang="en-US" b="1" i="1" baseline="0" dirty="0" smtClean="0"/>
+              <a:t> architecture diagram to explain thread blocks and warp blocks</a:t>
+            </a:r>
+          </a:p>
+          <a:p>
             <a:endParaRPr lang="en-US" dirty="0"/>
           </a:p>
         </p:txBody>
@@ -1568,7 +1896,7 @@
             <a:fld id="{FDBF08A4-716A-4A7F-AEC8-1293D93B8B14}" type="slidenum">
               <a:rPr lang="en-US" smtClean="0"/>
               <a:pPr/>
-              <a:t>5</a:t>
+              <a:t>4</a:t>
             </a:fld>
             <a:endParaRPr lang="en-US"/>
           </a:p>
@@ -1628,35 +1956,32 @@
           </a:bodyPr>
           <a:lstStyle/>
           <a:p>
-            <a:r>
-              <a:rPr lang="en-US" dirty="0" smtClean="0"/>
-              <a:t>Draw a CUDA</a:t>
-            </a:r>
-            <a:r>
-              <a:rPr lang="en-US" baseline="0" dirty="0" smtClean="0"/>
-              <a:t> architecture diagram to explain thread blocks and warp blocks</a:t>
-            </a:r>
-          </a:p>
-          <a:p>
-            <a:endParaRPr lang="en-US" baseline="0" dirty="0" smtClean="0"/>
-          </a:p>
-          <a:p>
-            <a:r>
-              <a:rPr lang="en-US" baseline="0" dirty="0" smtClean="0"/>
-              <a:t>Fixed thread block size for all cells -&gt; not good for sparse domains</a:t>
-            </a:r>
-          </a:p>
-          <a:p>
-            <a:r>
-              <a:rPr lang="en-US" baseline="0" dirty="0" smtClean="0"/>
-              <a:t>Only useful for high densities</a:t>
-            </a:r>
-          </a:p>
-          <a:p>
-            <a:endParaRPr lang="en-US" baseline="0" dirty="0" smtClean="0"/>
-          </a:p>
-          <a:p>
-            <a:endParaRPr lang="en-US" dirty="0"/>
+            <a:pPr marL="0" marR="0" indent="0" algn="l" defTabSz="914400" rtl="0" eaLnBrk="1" fontAlgn="auto" latinLnBrk="0" hangingPunct="1">
+              <a:lnSpc>
+                <a:spcPct val="100000"/>
+              </a:lnSpc>
+              <a:spcBef>
+                <a:spcPts val="0"/>
+              </a:spcBef>
+              <a:spcAft>
+                <a:spcPts val="0"/>
+              </a:spcAft>
+              <a:buClrTx/>
+              <a:buSzTx/>
+              <a:buFontTx/>
+              <a:buNone/>
+              <a:tabLst/>
+              <a:defRPr/>
+            </a:pPr>
+            <a:r>
+              <a:rPr lang="en-US" b="1" i="1" dirty="0" smtClean="0"/>
+              <a:t>Explain</a:t>
+            </a:r>
+            <a:r>
+              <a:rPr lang="en-US" b="1" i="1" baseline="0" dirty="0" smtClean="0"/>
+              <a:t> thread block and warp block processor</a:t>
+            </a:r>
+            <a:endParaRPr lang="en-US" b="1" i="1" dirty="0" smtClean="0"/>
           </a:p>
         </p:txBody>
       </p:sp>
@@ -1678,7 +2003,7 @@
             <a:fld id="{FDBF08A4-716A-4A7F-AEC8-1293D93B8B14}" type="slidenum">
               <a:rPr lang="en-US" smtClean="0"/>
               <a:pPr/>
-              <a:t>6</a:t>
+              <a:t>5</a:t>
             </a:fld>
             <a:endParaRPr lang="en-US"/>
           </a:p>
@@ -1738,23 +2063,7 @@
           </a:bodyPr>
           <a:lstStyle/>
           <a:p>
-            <a:r>
-              <a:rPr lang="en-US" dirty="0" smtClean="0"/>
-              <a:t>Draw diagram that shows how WBCP</a:t>
-            </a:r>
-            <a:r>
-              <a:rPr lang="en-US" baseline="0" dirty="0" smtClean="0"/>
-              <a:t> works</a:t>
-            </a:r>
-          </a:p>
-          <a:p>
-            <a:r>
-              <a:rPr lang="en-US" baseline="0" dirty="0" smtClean="0"/>
-              <a:t>Including dynamic job scheduling</a:t>
-            </a:r>
-          </a:p>
-          <a:p>
-            <a:endParaRPr lang="en-US" dirty="0"/>
+            <a:endParaRPr lang="en-US" b="1" i="1" dirty="0"/>
           </a:p>
         </p:txBody>
       </p:sp>
@@ -1776,7 +2085,7 @@
             <a:fld id="{FDBF08A4-716A-4A7F-AEC8-1293D93B8B14}" type="slidenum">
               <a:rPr lang="en-US" smtClean="0"/>
               <a:pPr/>
-              <a:t>7</a:t>
+              <a:t>6</a:t>
             </a:fld>
             <a:endParaRPr lang="en-US"/>
           </a:p>
@@ -1837,34 +2146,25 @@
           <a:lstStyle/>
           <a:p>
             <a:r>
-              <a:rPr lang="en-US" dirty="0" smtClean="0"/>
-              <a:t>Shared</a:t>
-            </a:r>
-            <a:r>
               <a:rPr lang="en-US" baseline="0" dirty="0" smtClean="0"/>
-              <a:t> memory results differ for TBCP and WBCP</a:t>
-            </a:r>
-          </a:p>
-          <a:p>
+              <a:t>Fixed </a:t>
+            </a:r>
             <a:r>
               <a:rPr lang="en-US" baseline="0" dirty="0" smtClean="0"/>
-              <a:t>Constant memory was a good idea</a:t>
+              <a:t>thread block size for all cells -&gt; not good for sparse domains</a:t>
             </a:r>
           </a:p>
           <a:p>
             <a:r>
               <a:rPr lang="en-US" baseline="0" dirty="0" smtClean="0"/>
-              <a:t>Non-interleaved storage failed because of temporarily sparse access patterns (more cache misses with non-interleaved data)</a:t>
+              <a:t>Only useful for high densities</a:t>
             </a:r>
           </a:p>
           <a:p>
             <a:endParaRPr lang="en-US" baseline="0" dirty="0" smtClean="0"/>
           </a:p>
           <a:p>
-            <a:r>
-              <a:rPr lang="en-US" b="1" baseline="0" dirty="0" smtClean="0"/>
-              <a:t>TODO: fully interleaved molecule storage</a:t>
-            </a:r>
+            <a:endParaRPr lang="en-US" dirty="0"/>
           </a:p>
         </p:txBody>
       </p:sp>
@@ -1886,7 +2186,7 @@
             <a:fld id="{FDBF08A4-716A-4A7F-AEC8-1293D93B8B14}" type="slidenum">
               <a:rPr lang="en-US" smtClean="0"/>
               <a:pPr/>
-              <a:t>8</a:t>
+              <a:t>7</a:t>
             </a:fld>
             <a:endParaRPr lang="en-US"/>
           </a:p>
@@ -1948,47 +2248,25 @@
           <a:p>
             <a:r>
               <a:rPr lang="en-US" dirty="0" smtClean="0"/>
-              <a:t>*Global </a:t>
-            </a:r>
-            <a:r>
-              <a:rPr lang="en-US" b="1" dirty="0" smtClean="0"/>
-              <a:t>constant</a:t>
-            </a:r>
-            <a:r>
-              <a:rPr lang="en-US" b="1" baseline="0" dirty="0" smtClean="0"/>
-              <a:t> </a:t>
-            </a:r>
-            <a:r>
-              <a:rPr lang="en-US" baseline="0" dirty="0" smtClean="0"/>
-              <a:t>variables to avoid kernel parameters</a:t>
-            </a:r>
-          </a:p>
-          <a:p>
-            <a:endParaRPr lang="en-US" baseline="0" dirty="0" smtClean="0"/>
-          </a:p>
-          <a:p>
-            <a:r>
-              <a:rPr lang="en-US" baseline="0" dirty="0" smtClean="0"/>
-              <a:t>*Heavy use of </a:t>
-            </a:r>
-            <a:r>
-              <a:rPr lang="en-US" b="1" baseline="0" dirty="0" smtClean="0"/>
-              <a:t>template</a:t>
-            </a:r>
-            <a:r>
-              <a:rPr lang="en-US" baseline="0" dirty="0" smtClean="0"/>
-              <a:t> parameters to link modules together and keep things </a:t>
-            </a:r>
-            <a:r>
-              <a:rPr lang="en-US" baseline="0" dirty="0" err="1" smtClean="0"/>
-              <a:t>interchangable</a:t>
-            </a:r>
-            <a:endParaRPr lang="en-US" baseline="0" dirty="0" smtClean="0"/>
-          </a:p>
-          <a:p>
-            <a:r>
-              <a:rPr lang="en-US" b="1" baseline="0" dirty="0" smtClean="0"/>
-              <a:t>----! CUDA/C++ still sucks for fast, modular code</a:t>
+              <a:t>Dynamic scheduler</a:t>
+            </a:r>
+          </a:p>
+          <a:p>
+            <a:r>
+              <a:rPr lang="en-US" dirty="0" smtClean="0"/>
+              <a:t>Jobs queue</a:t>
+            </a:r>
+          </a:p>
+          <a:p>
+            <a:r>
+              <a:rPr lang="en-US" dirty="0" smtClean="0"/>
+              <a:t>No instruction-level synchronization</a:t>
+            </a:r>
+          </a:p>
+          <a:p>
+            <a:r>
+              <a:rPr lang="en-US" dirty="0" smtClean="0"/>
+              <a:t>Memory-level synchronization (via spin locks)</a:t>
             </a:r>
           </a:p>
           <a:p>
@@ -1996,14 +2274,33 @@
           </a:p>
           <a:p>
             <a:r>
-              <a:rPr lang="en-US" dirty="0" smtClean="0"/>
-              <a:t>* 3</a:t>
-            </a:r>
-            <a:r>
-              <a:rPr lang="en-US" baseline="0" dirty="0" smtClean="0"/>
-              <a:t> source code iterations during the project</a:t>
-            </a:r>
-            <a:endParaRPr lang="en-US" dirty="0"/>
+              <a:rPr lang="en-US" b="1" i="1" dirty="0" smtClean="0"/>
+              <a:t>Draw </a:t>
+            </a:r>
+            <a:r>
+              <a:rPr lang="en-US" b="1" i="1" dirty="0" smtClean="0"/>
+              <a:t>diagram that shows how WBCP</a:t>
+            </a:r>
+            <a:r>
+              <a:rPr lang="en-US" b="1" i="1" baseline="0" dirty="0" smtClean="0"/>
+              <a:t> works</a:t>
+            </a:r>
+          </a:p>
+          <a:p>
+            <a:r>
+              <a:rPr lang="en-US" b="1" i="1" baseline="0" dirty="0" smtClean="0"/>
+              <a:t>(describe) dynamic </a:t>
+            </a:r>
+            <a:r>
+              <a:rPr lang="en-US" b="1" i="1" baseline="0" dirty="0" smtClean="0"/>
+              <a:t>job scheduling</a:t>
+            </a:r>
+          </a:p>
+          <a:p>
+            <a:endParaRPr lang="en-US" dirty="0" smtClean="0"/>
+          </a:p>
+          <a:p>
+            <a:endParaRPr lang="en-US" dirty="0" smtClean="0"/>
           </a:p>
         </p:txBody>
       </p:sp>
@@ -2025,7 +2322,7 @@
             <a:fld id="{FDBF08A4-716A-4A7F-AEC8-1293D93B8B14}" type="slidenum">
               <a:rPr lang="en-US" smtClean="0"/>
               <a:pPr/>
-              <a:t>9</a:t>
+              <a:t>8</a:t>
             </a:fld>
             <a:endParaRPr lang="en-US"/>
           </a:p>
@@ -2087,11 +2384,240 @@
           <a:p>
             <a:r>
               <a:rPr lang="en-US" dirty="0" smtClean="0"/>
-              <a:t>PTX reduction and enhanced</a:t>
+              <a:t>Shared memory cache</a:t>
+            </a:r>
+          </a:p>
+          <a:p>
+            <a:pPr marL="0" marR="0" indent="0" algn="l" defTabSz="914400" rtl="0" eaLnBrk="1" fontAlgn="auto" latinLnBrk="0" hangingPunct="1">
+              <a:lnSpc>
+                <a:spcPct val="100000"/>
+              </a:lnSpc>
+              <a:spcBef>
+                <a:spcPts val="0"/>
+              </a:spcBef>
+              <a:spcAft>
+                <a:spcPts val="0"/>
+              </a:spcAft>
+              <a:buClrTx/>
+              <a:buSzTx/>
+              <a:buFontTx/>
+              <a:buNone/>
+              <a:tabLst/>
+              <a:defRPr/>
+            </a:pPr>
+            <a:r>
+              <a:rPr lang="en-US" b="1" i="1" dirty="0" smtClean="0"/>
+              <a:t>Shared</a:t>
+            </a:r>
+            <a:r>
+              <a:rPr lang="en-US" b="1" i="1" baseline="0" dirty="0" smtClean="0"/>
+              <a:t> memory results differ for TBCP and WBCP</a:t>
+            </a:r>
+          </a:p>
+          <a:p>
+            <a:endParaRPr lang="en-US" dirty="0" smtClean="0"/>
+          </a:p>
+          <a:p>
+            <a:r>
+              <a:rPr lang="en-US" dirty="0" smtClean="0"/>
+              <a:t>Constant memory</a:t>
+            </a:r>
+          </a:p>
+          <a:p>
+            <a:pPr marL="0" marR="0" indent="0" algn="l" defTabSz="914400" rtl="0" eaLnBrk="1" fontAlgn="auto" latinLnBrk="0" hangingPunct="1">
+              <a:lnSpc>
+                <a:spcPct val="100000"/>
+              </a:lnSpc>
+              <a:spcBef>
+                <a:spcPts val="0"/>
+              </a:spcBef>
+              <a:spcAft>
+                <a:spcPts val="0"/>
+              </a:spcAft>
+              <a:buClrTx/>
+              <a:buSzTx/>
+              <a:buFontTx/>
+              <a:buNone/>
+              <a:tabLst/>
+              <a:defRPr/>
+            </a:pPr>
+            <a:r>
+              <a:rPr lang="en-US" b="1" i="1" baseline="0" dirty="0" smtClean="0"/>
+              <a:t>Constant memory was a good idea</a:t>
+            </a:r>
+          </a:p>
+          <a:p>
+            <a:endParaRPr lang="en-US" dirty="0" smtClean="0"/>
+          </a:p>
+          <a:p>
+            <a:r>
+              <a:rPr lang="en-US" strike="sngStrike" dirty="0" smtClean="0"/>
+              <a:t>Non-interleaved storage</a:t>
+            </a:r>
+          </a:p>
+          <a:p>
+            <a:r>
+              <a:rPr lang="en-US" b="1" i="1" baseline="0" dirty="0" smtClean="0"/>
+              <a:t>Non-interleaved </a:t>
+            </a:r>
+            <a:r>
+              <a:rPr lang="en-US" b="1" i="1" baseline="0" dirty="0" smtClean="0"/>
+              <a:t>storage failed because of temporarily sparse access patterns (more cache misses with non-interleaved data)</a:t>
+            </a:r>
+          </a:p>
+          <a:p>
+            <a:endParaRPr lang="en-US" b="1" i="1" baseline="0" dirty="0" smtClean="0"/>
+          </a:p>
+          <a:p>
+            <a:r>
+              <a:rPr lang="en-US" b="1" i="1" baseline="0" dirty="0" smtClean="0"/>
+              <a:t>TODO: fully interleaved molecule storage</a:t>
+            </a:r>
+          </a:p>
+        </p:txBody>
+      </p:sp>
+      <p:sp>
+        <p:nvSpPr>
+          <p:cNvPr id="4" name="Slide Number Placeholder 3"/>
+          <p:cNvSpPr>
+            <a:spLocks noGrp="1"/>
+          </p:cNvSpPr>
+          <p:nvPr>
+            <p:ph type="sldNum" sz="quarter" idx="10"/>
+          </p:nvPr>
+        </p:nvSpPr>
+        <p:spPr/>
+        <p:txBody>
+          <a:bodyPr/>
+          <a:lstStyle/>
+          <a:p>
+            <a:fld id="{FDBF08A4-716A-4A7F-AEC8-1293D93B8B14}" type="slidenum">
+              <a:rPr lang="en-US" smtClean="0"/>
+              <a:pPr/>
+              <a:t>9</a:t>
+            </a:fld>
+            <a:endParaRPr lang="en-US"/>
+          </a:p>
+        </p:txBody>
+      </p:sp>
+    </p:spTree>
+  </p:cSld>
+  <p:clrMapOvr>
+    <a:masterClrMapping/>
+  </p:clrMapOvr>
+</p:notes>
+</file>
+
+<file path=ppt/notesSlides/notesSlide9.xml><?xml version="1.0" encoding="utf-8"?>
+<p:notes xmlns:a="http://schemas.openxmlformats.org/drawingml/2006/main" xmlns:r="http://schemas.openxmlformats.org/officeDocument/2006/relationships" xmlns:p="http://schemas.openxmlformats.org/presentationml/2006/main">
+  <p:cSld>
+    <p:spTree>
+      <p:nvGrpSpPr>
+        <p:cNvPr id="1" name=""/>
+        <p:cNvGrpSpPr/>
+        <p:nvPr/>
+      </p:nvGrpSpPr>
+      <p:grpSpPr>
+        <a:xfrm>
+          <a:off x="0" y="0"/>
+          <a:ext cx="0" cy="0"/>
+          <a:chOff x="0" y="0"/>
+          <a:chExt cx="0" cy="0"/>
+        </a:xfrm>
+      </p:grpSpPr>
+      <p:sp>
+        <p:nvSpPr>
+          <p:cNvPr id="2" name="Slide Image Placeholder 1"/>
+          <p:cNvSpPr>
+            <a:spLocks noGrp="1" noRot="1" noChangeAspect="1"/>
+          </p:cNvSpPr>
+          <p:nvPr>
+            <p:ph type="sldImg"/>
+          </p:nvPr>
+        </p:nvSpPr>
+        <p:spPr/>
+      </p:sp>
+      <p:sp>
+        <p:nvSpPr>
+          <p:cNvPr id="3" name="Notes Placeholder 2"/>
+          <p:cNvSpPr>
+            <a:spLocks noGrp="1"/>
+          </p:cNvSpPr>
+          <p:nvPr>
+            <p:ph type="body" idx="1"/>
+          </p:nvPr>
+        </p:nvSpPr>
+        <p:spPr/>
+        <p:txBody>
+          <a:bodyPr>
+            <a:normAutofit/>
+          </a:bodyPr>
+          <a:lstStyle/>
+          <a:p>
+            <a:r>
+              <a:rPr lang="en-US" dirty="0" smtClean="0"/>
+              <a:t>Global </a:t>
+            </a:r>
+            <a:r>
+              <a:rPr lang="en-US" b="1" dirty="0" smtClean="0"/>
+              <a:t>constant</a:t>
+            </a:r>
+            <a:r>
+              <a:rPr lang="en-US" b="1" baseline="0" dirty="0" smtClean="0"/>
+              <a:t> </a:t>
             </a:r>
             <a:r>
               <a:rPr lang="en-US" baseline="0" dirty="0" smtClean="0"/>
-              <a:t> synchronization instructions</a:t>
+              <a:t>variables to avoid kernel parameters</a:t>
+            </a:r>
+          </a:p>
+          <a:p>
+            <a:endParaRPr lang="en-US" baseline="0" dirty="0" smtClean="0"/>
+          </a:p>
+          <a:p>
+            <a:r>
+              <a:rPr lang="en-US" baseline="0" dirty="0" smtClean="0"/>
+              <a:t>Heavy </a:t>
+            </a:r>
+            <a:r>
+              <a:rPr lang="en-US" baseline="0" dirty="0" smtClean="0"/>
+              <a:t>use of </a:t>
+            </a:r>
+            <a:r>
+              <a:rPr lang="en-US" b="1" baseline="0" dirty="0" smtClean="0"/>
+              <a:t>template</a:t>
+            </a:r>
+            <a:r>
+              <a:rPr lang="en-US" baseline="0" dirty="0" smtClean="0"/>
+              <a:t> parameters to link modules together and keep things </a:t>
+            </a:r>
+            <a:r>
+              <a:rPr lang="en-US" baseline="0" dirty="0" err="1" smtClean="0"/>
+              <a:t>interchangable</a:t>
+            </a:r>
+            <a:endParaRPr lang="en-US" baseline="0" dirty="0" smtClean="0"/>
+          </a:p>
+          <a:p>
+            <a:r>
+              <a:rPr lang="en-US" b="1" baseline="0" dirty="0" smtClean="0"/>
+              <a:t>----! CUDA/C++ still sucks for fast, modular code</a:t>
+            </a:r>
+          </a:p>
+          <a:p>
+            <a:endParaRPr lang="en-US" dirty="0" smtClean="0"/>
+          </a:p>
+          <a:p>
+            <a:r>
+              <a:rPr lang="en-US" dirty="0" smtClean="0"/>
+              <a:t>3</a:t>
+            </a:r>
+            <a:r>
+              <a:rPr lang="en-US" baseline="0" dirty="0" smtClean="0"/>
+              <a:t> </a:t>
+            </a:r>
+            <a:r>
+              <a:rPr lang="en-US" baseline="0" dirty="0" smtClean="0"/>
+              <a:t>source code iterations during the project</a:t>
             </a:r>
             <a:endParaRPr lang="en-US" dirty="0"/>
           </a:p>
@@ -2115,7 +2641,7 @@
             <a:fld id="{FDBF08A4-716A-4A7F-AEC8-1293D93B8B14}" type="slidenum">
               <a:rPr lang="en-US" smtClean="0"/>
               <a:pPr/>
-              <a:t>11</a:t>
+              <a:t>10</a:t>
             </a:fld>
             <a:endParaRPr lang="en-US"/>
           </a:p>
@@ -2311,7 +2837,7 @@
             <a:fld id="{F7CFEFCE-C008-4008-8B4E-1B013B42BB40}" type="datetimeFigureOut">
               <a:rPr lang="en-US" smtClean="0"/>
               <a:pPr/>
-              <a:t>10/14/2011</a:t>
+              <a:t>10/17/2011</a:t>
             </a:fld>
             <a:endParaRPr lang="en-US"/>
           </a:p>
@@ -2478,7 +3004,7 @@
             <a:fld id="{0346E2D4-4A27-4427-9990-87253EAA0275}" type="datetimeFigureOut">
               <a:rPr lang="en-US" smtClean="0"/>
               <a:pPr/>
-              <a:t>10/14/2011</a:t>
+              <a:t>10/17/2011</a:t>
             </a:fld>
             <a:endParaRPr lang="en-US"/>
           </a:p>
@@ -2655,7 +3181,7 @@
             <a:fld id="{0346E2D4-4A27-4427-9990-87253EAA0275}" type="datetimeFigureOut">
               <a:rPr lang="en-US" smtClean="0"/>
               <a:pPr/>
-              <a:t>10/14/2011</a:t>
+              <a:t>10/17/2011</a:t>
             </a:fld>
             <a:endParaRPr lang="en-US"/>
           </a:p>
@@ -2822,7 +3348,7 @@
             <a:fld id="{0346E2D4-4A27-4427-9990-87253EAA0275}" type="datetimeFigureOut">
               <a:rPr lang="en-US" smtClean="0"/>
               <a:pPr/>
-              <a:t>10/14/2011</a:t>
+              <a:t>10/17/2011</a:t>
             </a:fld>
             <a:endParaRPr lang="en-US"/>
           </a:p>
@@ -3065,7 +3591,7 @@
             <a:fld id="{0346E2D4-4A27-4427-9990-87253EAA0275}" type="datetimeFigureOut">
               <a:rPr lang="en-US" smtClean="0"/>
               <a:pPr/>
-              <a:t>10/14/2011</a:t>
+              <a:t>10/17/2011</a:t>
             </a:fld>
             <a:endParaRPr lang="en-US"/>
           </a:p>
@@ -3350,7 +3876,7 @@
             <a:fld id="{0346E2D4-4A27-4427-9990-87253EAA0275}" type="datetimeFigureOut">
               <a:rPr lang="en-US" smtClean="0"/>
               <a:pPr/>
-              <a:t>10/14/2011</a:t>
+              <a:t>10/17/2011</a:t>
             </a:fld>
             <a:endParaRPr lang="en-US"/>
           </a:p>
@@ -3769,7 +4295,7 @@
             <a:fld id="{0346E2D4-4A27-4427-9990-87253EAA0275}" type="datetimeFigureOut">
               <a:rPr lang="en-US" smtClean="0"/>
               <a:pPr/>
-              <a:t>10/14/2011</a:t>
+              <a:t>10/17/2011</a:t>
             </a:fld>
             <a:endParaRPr lang="en-US"/>
           </a:p>
@@ -3884,7 +4410,7 @@
             <a:fld id="{0346E2D4-4A27-4427-9990-87253EAA0275}" type="datetimeFigureOut">
               <a:rPr lang="en-US" smtClean="0"/>
               <a:pPr/>
-              <a:t>10/14/2011</a:t>
+              <a:t>10/17/2011</a:t>
             </a:fld>
             <a:endParaRPr lang="en-US"/>
           </a:p>
@@ -3976,7 +4502,7 @@
             <a:fld id="{0346E2D4-4A27-4427-9990-87253EAA0275}" type="datetimeFigureOut">
               <a:rPr lang="en-US" smtClean="0"/>
               <a:pPr/>
-              <a:t>10/14/2011</a:t>
+              <a:t>10/17/2011</a:t>
             </a:fld>
             <a:endParaRPr lang="en-US"/>
           </a:p>
@@ -4250,7 +4776,7 @@
             <a:fld id="{0346E2D4-4A27-4427-9990-87253EAA0275}" type="datetimeFigureOut">
               <a:rPr lang="en-US" smtClean="0"/>
               <a:pPr/>
-              <a:t>10/14/2011</a:t>
+              <a:t>10/17/2011</a:t>
             </a:fld>
             <a:endParaRPr lang="en-US"/>
           </a:p>
@@ -4500,7 +5026,7 @@
             <a:fld id="{0346E2D4-4A27-4427-9990-87253EAA0275}" type="datetimeFigureOut">
               <a:rPr lang="en-US" smtClean="0"/>
               <a:pPr/>
-              <a:t>10/14/2011</a:t>
+              <a:t>10/17/2011</a:t>
             </a:fld>
             <a:endParaRPr lang="en-US"/>
           </a:p>
@@ -4710,7 +5236,7 @@
             <a:fld id="{0346E2D4-4A27-4427-9990-87253EAA0275}" type="datetimeFigureOut">
               <a:rPr lang="en-US" smtClean="0"/>
               <a:pPr/>
-              <a:t>10/14/2011</a:t>
+              <a:t>10/17/2011</a:t>
             </a:fld>
             <a:endParaRPr lang="en-US"/>
           </a:p>
@@ -5182,105 +5708,40 @@
         </p:nvSpPr>
         <p:spPr/>
         <p:txBody>
-          <a:bodyPr>
-            <a:normAutofit/>
-          </a:bodyPr>
+          <a:bodyPr/>
           <a:lstStyle/>
           <a:p>
             <a:r>
               <a:rPr lang="en-US" dirty="0" smtClean="0"/>
-              <a:t>Interesting Papers</a:t>
+              <a:t>Implementation</a:t>
             </a:r>
             <a:endParaRPr lang="en-US" dirty="0"/>
           </a:p>
         </p:txBody>
       </p:sp>
-      <p:sp>
-        <p:nvSpPr>
-          <p:cNvPr id="3" name="Content Placeholder 2"/>
-          <p:cNvSpPr>
-            <a:spLocks noGrp="1"/>
-          </p:cNvSpPr>
+      <p:pic>
+        <p:nvPicPr>
+          <p:cNvPr id="4" name="Content Placeholder 3" descr="component_architecture.png"/>
+          <p:cNvPicPr>
+            <a:picLocks noGrp="1" noChangeAspect="1"/>
+          </p:cNvPicPr>
           <p:nvPr>
             <p:ph idx="1"/>
           </p:nvPr>
-        </p:nvSpPr>
-        <p:spPr/>
-        <p:txBody>
-          <a:bodyPr>
-            <a:normAutofit fontScale="92500" lnSpcReduction="10000"/>
-          </a:bodyPr>
-          <a:lstStyle/>
-          <a:p>
-            <a:r>
-              <a:rPr lang="en-US" dirty="0" smtClean="0"/>
-              <a:t>Better performance at lower occupancy</a:t>
-            </a:r>
-            <a:br>
-              <a:rPr lang="en-US" dirty="0" smtClean="0"/>
-            </a:br>
-            <a:r>
-              <a:rPr lang="en-US" dirty="0" smtClean="0">
-                <a:hlinkClick r:id="rId2"/>
-              </a:rPr>
-              <a:t>http://www.cs.berkeley.edu/~volkov/volkov10-GTC.pdf</a:t>
-            </a:r>
-            <a:endParaRPr lang="en-US" dirty="0" smtClean="0"/>
-          </a:p>
-          <a:p>
-            <a:r>
-              <a:rPr lang="en-US" dirty="0" smtClean="0"/>
-              <a:t>Demystifying GPU </a:t>
-            </a:r>
-            <a:r>
-              <a:rPr lang="en-US" dirty="0" err="1" smtClean="0"/>
-              <a:t>microarchitecture</a:t>
-            </a:r>
-            <a:r>
-              <a:rPr lang="en-US" dirty="0" smtClean="0"/>
-              <a:t> through </a:t>
-            </a:r>
-            <a:r>
-              <a:rPr lang="en-US" dirty="0" err="1" smtClean="0"/>
-              <a:t>microbenchmarking</a:t>
-            </a:r>
-            <a:r>
-              <a:rPr lang="en-US" dirty="0" smtClean="0"/>
-              <a:t/>
-            </a:r>
-            <a:br>
-              <a:rPr lang="en-US" dirty="0" smtClean="0"/>
-            </a:br>
-            <a:r>
-              <a:rPr lang="en-US" dirty="0" smtClean="0">
-                <a:hlinkClick r:id="rId3"/>
-              </a:rPr>
-              <a:t>http://www.stuffedcow.net/research/cudabmk</a:t>
-            </a:r>
-            <a:endParaRPr lang="en-US" dirty="0" smtClean="0"/>
-          </a:p>
-          <a:p>
-            <a:r>
-              <a:rPr lang="en-US" dirty="0" err="1" smtClean="0"/>
-              <a:t>CudaDMA</a:t>
-            </a:r>
-            <a:r>
-              <a:rPr lang="en-US" dirty="0" smtClean="0"/>
-              <a:t>: Optimizing GPU Memory Bandwidth via Warp Specialization</a:t>
-            </a:r>
-            <a:br>
-              <a:rPr lang="en-US" dirty="0" smtClean="0"/>
-            </a:br>
-            <a:r>
-              <a:rPr lang="en-US" dirty="0" smtClean="0">
-                <a:hlinkClick r:id="rId4"/>
-              </a:rPr>
-              <a:t>http://www.stanford.edu/~mebauer/pdfs/cudadma-sc11.pdf</a:t>
-            </a:r>
-            <a:endParaRPr lang="en-US" dirty="0"/>
-          </a:p>
-        </p:txBody>
-      </p:sp>
+        </p:nvPicPr>
+        <p:blipFill>
+          <a:blip r:embed="rId3" cstate="print"/>
+          <a:stretch>
+            <a:fillRect/>
+          </a:stretch>
+        </p:blipFill>
+        <p:spPr>
+          <a:xfrm>
+            <a:off x="244608" y="2247900"/>
+            <a:ext cx="8654784" cy="2362200"/>
+          </a:xfrm>
+        </p:spPr>
+      </p:pic>
     </p:spTree>
   </p:cSld>
   <p:clrMapOvr>
@@ -5325,12 +5786,14 @@
         </p:nvSpPr>
         <p:spPr/>
         <p:txBody>
-          <a:bodyPr/>
+          <a:bodyPr>
+            <a:normAutofit/>
+          </a:bodyPr>
           <a:lstStyle/>
           <a:p>
             <a:r>
               <a:rPr lang="en-US" dirty="0" smtClean="0"/>
-              <a:t>Interesting Bugs	 &amp; Facts</a:t>
+              <a:t>Interesting Papers</a:t>
             </a:r>
             <a:endParaRPr lang="en-US" dirty="0"/>
           </a:p>
@@ -5348,63 +5811,77 @@
         </p:nvSpPr>
         <p:spPr/>
         <p:txBody>
-          <a:bodyPr/>
+          <a:bodyPr>
+            <a:normAutofit fontScale="92500" lnSpcReduction="10000"/>
+          </a:bodyPr>
           <a:lstStyle/>
           <a:p>
             <a:r>
               <a:rPr lang="en-US" dirty="0" smtClean="0"/>
-              <a:t>Constructors can be evil (for shared memory objects)</a:t>
-            </a:r>
-          </a:p>
-          <a:p>
-            <a:r>
+              <a:t>Better performance at lower occupancy</a:t>
+            </a:r>
+            <a:br>
               <a:rPr lang="en-US" dirty="0" smtClean="0"/>
-              <a:t>Too many nested, </a:t>
+            </a:br>
+            <a:r>
+              <a:rPr lang="en-US" dirty="0" smtClean="0">
+                <a:hlinkClick r:id="rId2"/>
+              </a:rPr>
+              <a:t>http://www.cs.berkeley.edu/~volkov/volkov10-GTC.pdf</a:t>
+            </a:r>
+            <a:endParaRPr lang="en-US" dirty="0" smtClean="0"/>
+          </a:p>
+          <a:p>
+            <a:r>
+              <a:rPr lang="en-US" dirty="0" smtClean="0"/>
+              <a:t>Demystifying GPU </a:t>
             </a:r>
             <a:r>
               <a:rPr lang="en-US" dirty="0" err="1" smtClean="0"/>
-              <a:t>inlined</a:t>
+              <a:t>microarchitecture</a:t>
             </a:r>
             <a:r>
               <a:rPr lang="en-US" dirty="0" smtClean="0"/>
-              <a:t> loops confuse the compiler: __</a:t>
+              <a:t> through </a:t>
             </a:r>
             <a:r>
               <a:rPr lang="en-US" dirty="0" err="1" smtClean="0"/>
-              <a:t>noinline</a:t>
+              <a:t>microbenchmarking</a:t>
             </a:r>
             <a:r>
               <a:rPr lang="en-US" dirty="0" smtClean="0"/>
-              <a:t>__ to the rescue!</a:t>
-            </a:r>
-          </a:p>
-          <a:p>
-            <a:r>
+              <a:t/>
+            </a:r>
+            <a:br>
               <a:rPr lang="en-US" dirty="0" smtClean="0"/>
-              <a:t>__</a:t>
-            </a:r>
+            </a:br>
+            <a:r>
+              <a:rPr lang="en-US" dirty="0" smtClean="0">
+                <a:hlinkClick r:id="rId3"/>
+              </a:rPr>
+              <a:t>http://www.stuffedcow.net/research/cudabmk</a:t>
+            </a:r>
+            <a:endParaRPr lang="en-US" dirty="0" smtClean="0"/>
+          </a:p>
+          <a:p>
             <a:r>
               <a:rPr lang="en-US" dirty="0" err="1" smtClean="0"/>
-              <a:t>syncthreads</a:t>
+              <a:t>CudaDMA</a:t>
             </a:r>
             <a:r>
               <a:rPr lang="en-US" dirty="0" smtClean="0"/>
-              <a:t>() should be called __</a:t>
-            </a:r>
-            <a:r>
-              <a:rPr lang="en-US" dirty="0" err="1" smtClean="0"/>
-              <a:t>syncwarps</a:t>
-            </a:r>
-            <a:r>
+              <a:t>: Optimizing GPU Memory Bandwidth via Warp Specialization</a:t>
+            </a:r>
+            <a:br>
               <a:rPr lang="en-US" dirty="0" smtClean="0"/>
-              <a:t>()!</a:t>
-            </a:r>
-          </a:p>
-          <a:p>
-            <a:r>
-              <a:rPr lang="en-US" dirty="0" smtClean="0"/>
-              <a:t>PTX assembly has more “features”</a:t>
-            </a:r>
+            </a:br>
+            <a:r>
+              <a:rPr lang="en-US" dirty="0" smtClean="0">
+                <a:hlinkClick r:id="rId4"/>
+              </a:rPr>
+              <a:t>http://www.stanford.edu/~mebauer/pdfs/cudadma-sc11.pdf</a:t>
+            </a:r>
+            <a:endParaRPr lang="en-US" dirty="0"/>
           </a:p>
         </p:txBody>
       </p:sp>
@@ -5455,6 +5932,503 @@
           <a:bodyPr/>
           <a:lstStyle/>
           <a:p>
+            <a:r>
+              <a:rPr lang="en-US" dirty="0" smtClean="0"/>
+              <a:t>Interesting Bugs	 &amp; Facts</a:t>
+            </a:r>
+            <a:endParaRPr lang="en-US" dirty="0"/>
+          </a:p>
+        </p:txBody>
+      </p:sp>
+      <p:sp>
+        <p:nvSpPr>
+          <p:cNvPr id="4" name="Content Placeholder 2"/>
+          <p:cNvSpPr txBox="1">
+            <a:spLocks/>
+          </p:cNvSpPr>
+          <p:nvPr/>
+        </p:nvSpPr>
+        <p:spPr>
+          <a:xfrm>
+            <a:off x="457200" y="1600200"/>
+            <a:ext cx="8229600" cy="4525963"/>
+          </a:xfrm>
+          <a:prstGeom prst="rect">
+            <a:avLst/>
+          </a:prstGeom>
+        </p:spPr>
+        <p:txBody>
+          <a:bodyPr vert="horz" lIns="91440" tIns="45720" rIns="91440" bIns="45720" rtlCol="0" anchor="ctr">
+            <a:normAutofit/>
+          </a:bodyPr>
+          <a:lstStyle/>
+          <a:p>
+            <a:pPr marL="342900" marR="0" lvl="0" indent="-342900" algn="ctr" defTabSz="914400" rtl="0" eaLnBrk="1" fontAlgn="auto" latinLnBrk="0" hangingPunct="1">
+              <a:lnSpc>
+                <a:spcPct val="100000"/>
+              </a:lnSpc>
+              <a:spcBef>
+                <a:spcPct val="20000"/>
+              </a:spcBef>
+              <a:spcAft>
+                <a:spcPts val="0"/>
+              </a:spcAft>
+              <a:buClrTx/>
+              <a:buSzTx/>
+              <a:buFont typeface="Arial" pitchFamily="34" charset="0"/>
+              <a:buNone/>
+              <a:tabLst/>
+              <a:defRPr/>
+            </a:pPr>
+            <a:r>
+              <a:rPr kumimoji="0" lang="en-US" sz="3200" b="0" i="0" u="none" strike="noStrike" kern="1200" cap="none" spc="0" normalizeH="0" baseline="0" noProof="0" dirty="0" smtClean="0">
+                <a:ln>
+                  <a:noFill/>
+                </a:ln>
+                <a:solidFill>
+                  <a:schemeClr val="tx1"/>
+                </a:solidFill>
+                <a:effectLst/>
+                <a:uLnTx/>
+                <a:uFillTx/>
+                <a:latin typeface="+mn-lt"/>
+                <a:ea typeface="+mn-ea"/>
+                <a:cs typeface="+mn-cs"/>
+              </a:rPr>
+              <a:t>__</a:t>
+            </a:r>
+            <a:r>
+              <a:rPr kumimoji="0" lang="en-US" sz="3200" b="0" i="0" u="none" strike="noStrike" kern="1200" cap="none" spc="0" normalizeH="0" baseline="0" noProof="0" dirty="0" err="1" smtClean="0">
+                <a:ln>
+                  <a:noFill/>
+                </a:ln>
+                <a:solidFill>
+                  <a:schemeClr val="tx1"/>
+                </a:solidFill>
+                <a:effectLst/>
+                <a:uLnTx/>
+                <a:uFillTx/>
+                <a:latin typeface="+mn-lt"/>
+                <a:ea typeface="+mn-ea"/>
+                <a:cs typeface="+mn-cs"/>
+              </a:rPr>
+              <a:t>noinline</a:t>
+            </a:r>
+            <a:r>
+              <a:rPr kumimoji="0" lang="en-US" sz="3200" b="0" i="0" u="none" strike="noStrike" kern="1200" cap="none" spc="0" normalizeH="0" baseline="0" noProof="0" dirty="0" smtClean="0">
+                <a:ln>
+                  <a:noFill/>
+                </a:ln>
+                <a:solidFill>
+                  <a:schemeClr val="tx1"/>
+                </a:solidFill>
+                <a:effectLst/>
+                <a:uLnTx/>
+                <a:uFillTx/>
+                <a:latin typeface="+mn-lt"/>
+                <a:ea typeface="+mn-ea"/>
+                <a:cs typeface="+mn-cs"/>
+              </a:rPr>
+              <a:t>__</a:t>
+            </a:r>
+          </a:p>
+          <a:p>
+            <a:pPr marL="342900" marR="0" lvl="0" indent="-342900" algn="ctr" defTabSz="914400" rtl="0" eaLnBrk="1" fontAlgn="auto" latinLnBrk="0" hangingPunct="1">
+              <a:lnSpc>
+                <a:spcPct val="100000"/>
+              </a:lnSpc>
+              <a:spcBef>
+                <a:spcPct val="20000"/>
+              </a:spcBef>
+              <a:spcAft>
+                <a:spcPts val="0"/>
+              </a:spcAft>
+              <a:buClrTx/>
+              <a:buSzTx/>
+              <a:buFont typeface="Arial" pitchFamily="34" charset="0"/>
+              <a:buNone/>
+              <a:tabLst/>
+              <a:defRPr/>
+            </a:pPr>
+            <a:r>
+              <a:rPr lang="en-US" sz="3200" dirty="0" smtClean="0"/>
+              <a:t>__restrict__</a:t>
+            </a:r>
+            <a:endParaRPr kumimoji="0" lang="en-US" sz="3200" b="0" i="0" u="none" strike="noStrike" kern="1200" cap="none" spc="0" normalizeH="0" baseline="0" noProof="0" dirty="0" smtClean="0">
+              <a:ln>
+                <a:noFill/>
+              </a:ln>
+              <a:solidFill>
+                <a:schemeClr val="tx1"/>
+              </a:solidFill>
+              <a:effectLst/>
+              <a:uLnTx/>
+              <a:uFillTx/>
+              <a:latin typeface="+mn-lt"/>
+              <a:ea typeface="+mn-ea"/>
+              <a:cs typeface="+mn-cs"/>
+            </a:endParaRPr>
+          </a:p>
+          <a:p>
+            <a:pPr marL="342900" indent="-342900" algn="ctr">
+              <a:spcBef>
+                <a:spcPct val="20000"/>
+              </a:spcBef>
+            </a:pPr>
+            <a:r>
+              <a:rPr lang="en-US" sz="3200" dirty="0" smtClean="0"/>
+              <a:t>__</a:t>
+            </a:r>
+            <a:r>
+              <a:rPr lang="en-US" sz="3200" dirty="0" err="1" smtClean="0"/>
+              <a:t>syncthreads</a:t>
+            </a:r>
+            <a:r>
+              <a:rPr lang="en-US" sz="3200" dirty="0" smtClean="0"/>
+              <a:t>() should be called __</a:t>
+            </a:r>
+            <a:r>
+              <a:rPr lang="en-US" sz="3200" dirty="0" err="1" smtClean="0"/>
+              <a:t>syncwarps</a:t>
+            </a:r>
+            <a:r>
+              <a:rPr lang="en-US" sz="3200" dirty="0" smtClean="0"/>
+              <a:t>()</a:t>
+            </a:r>
+            <a:endParaRPr lang="en-US" sz="3200" dirty="0" smtClean="0"/>
+          </a:p>
+        </p:txBody>
+      </p:sp>
+    </p:spTree>
+  </p:cSld>
+  <p:clrMapOvr>
+    <a:masterClrMapping/>
+  </p:clrMapOvr>
+  <p:timing>
+    <p:tnLst>
+      <p:par>
+        <p:cTn id="1" dur="indefinite" restart="never" nodeType="tmRoot">
+          <p:childTnLst>
+            <p:seq concurrent="1" nextAc="seek">
+              <p:cTn id="2" dur="indefinite" nodeType="mainSeq">
+                <p:childTnLst>
+                  <p:par>
+                    <p:cTn id="3" fill="hold">
+                      <p:stCondLst>
+                        <p:cond delay="indefinite"/>
+                      </p:stCondLst>
+                      <p:childTnLst>
+                        <p:par>
+                          <p:cTn id="4" fill="hold">
+                            <p:stCondLst>
+                              <p:cond delay="0"/>
+                            </p:stCondLst>
+                            <p:childTnLst>
+                              <p:par>
+                                <p:cTn id="5" presetID="10" presetClass="entr" presetSubtype="0" fill="hold" grpId="0" nodeType="clickEffect">
+                                  <p:stCondLst>
+                                    <p:cond delay="0"/>
+                                  </p:stCondLst>
+                                  <p:childTnLst>
+                                    <p:set>
+                                      <p:cBhvr>
+                                        <p:cTn id="6" dur="1" fill="hold">
+                                          <p:stCondLst>
+                                            <p:cond delay="0"/>
+                                          </p:stCondLst>
+                                        </p:cTn>
+                                        <p:tgtEl>
+                                          <p:spTgt spid="4">
+                                            <p:txEl>
+                                              <p:pRg st="0" end="0"/>
+                                            </p:txEl>
+                                          </p:spTgt>
+                                        </p:tgtEl>
+                                        <p:attrNameLst>
+                                          <p:attrName>style.visibility</p:attrName>
+                                        </p:attrNameLst>
+                                      </p:cBhvr>
+                                      <p:to>
+                                        <p:strVal val="visible"/>
+                                      </p:to>
+                                    </p:set>
+                                    <p:animEffect transition="in" filter="fade">
+                                      <p:cBhvr>
+                                        <p:cTn id="7" dur="500"/>
+                                        <p:tgtEl>
+                                          <p:spTgt spid="4">
+                                            <p:txEl>
+                                              <p:pRg st="0" end="0"/>
+                                            </p:txEl>
+                                          </p:spTgt>
+                                        </p:tgtEl>
+                                      </p:cBhvr>
+                                    </p:animEffect>
+                                  </p:childTnLst>
+                                </p:cTn>
+                              </p:par>
+                            </p:childTnLst>
+                          </p:cTn>
+                        </p:par>
+                      </p:childTnLst>
+                    </p:cTn>
+                  </p:par>
+                  <p:par>
+                    <p:cTn id="8" fill="hold">
+                      <p:stCondLst>
+                        <p:cond delay="indefinite"/>
+                      </p:stCondLst>
+                      <p:childTnLst>
+                        <p:par>
+                          <p:cTn id="9" fill="hold">
+                            <p:stCondLst>
+                              <p:cond delay="0"/>
+                            </p:stCondLst>
+                            <p:childTnLst>
+                              <p:par>
+                                <p:cTn id="10" presetID="10" presetClass="entr" presetSubtype="0" fill="hold" grpId="0" nodeType="clickEffect">
+                                  <p:stCondLst>
+                                    <p:cond delay="0"/>
+                                  </p:stCondLst>
+                                  <p:childTnLst>
+                                    <p:set>
+                                      <p:cBhvr>
+                                        <p:cTn id="11" dur="1" fill="hold">
+                                          <p:stCondLst>
+                                            <p:cond delay="0"/>
+                                          </p:stCondLst>
+                                        </p:cTn>
+                                        <p:tgtEl>
+                                          <p:spTgt spid="4">
+                                            <p:txEl>
+                                              <p:pRg st="1" end="1"/>
+                                            </p:txEl>
+                                          </p:spTgt>
+                                        </p:tgtEl>
+                                        <p:attrNameLst>
+                                          <p:attrName>style.visibility</p:attrName>
+                                        </p:attrNameLst>
+                                      </p:cBhvr>
+                                      <p:to>
+                                        <p:strVal val="visible"/>
+                                      </p:to>
+                                    </p:set>
+                                    <p:animEffect transition="in" filter="fade">
+                                      <p:cBhvr>
+                                        <p:cTn id="12" dur="500"/>
+                                        <p:tgtEl>
+                                          <p:spTgt spid="4">
+                                            <p:txEl>
+                                              <p:pRg st="1" end="1"/>
+                                            </p:txEl>
+                                          </p:spTgt>
+                                        </p:tgtEl>
+                                      </p:cBhvr>
+                                    </p:animEffect>
+                                  </p:childTnLst>
+                                </p:cTn>
+                              </p:par>
+                            </p:childTnLst>
+                          </p:cTn>
+                        </p:par>
+                      </p:childTnLst>
+                    </p:cTn>
+                  </p:par>
+                  <p:par>
+                    <p:cTn id="13" fill="hold">
+                      <p:stCondLst>
+                        <p:cond delay="indefinite"/>
+                      </p:stCondLst>
+                      <p:childTnLst>
+                        <p:par>
+                          <p:cTn id="14" fill="hold">
+                            <p:stCondLst>
+                              <p:cond delay="0"/>
+                            </p:stCondLst>
+                            <p:childTnLst>
+                              <p:par>
+                                <p:cTn id="15" presetID="10" presetClass="entr" presetSubtype="0" fill="hold" grpId="0" nodeType="clickEffect">
+                                  <p:stCondLst>
+                                    <p:cond delay="0"/>
+                                  </p:stCondLst>
+                                  <p:childTnLst>
+                                    <p:set>
+                                      <p:cBhvr>
+                                        <p:cTn id="16" dur="1" fill="hold">
+                                          <p:stCondLst>
+                                            <p:cond delay="0"/>
+                                          </p:stCondLst>
+                                        </p:cTn>
+                                        <p:tgtEl>
+                                          <p:spTgt spid="4">
+                                            <p:txEl>
+                                              <p:pRg st="2" end="2"/>
+                                            </p:txEl>
+                                          </p:spTgt>
+                                        </p:tgtEl>
+                                        <p:attrNameLst>
+                                          <p:attrName>style.visibility</p:attrName>
+                                        </p:attrNameLst>
+                                      </p:cBhvr>
+                                      <p:to>
+                                        <p:strVal val="visible"/>
+                                      </p:to>
+                                    </p:set>
+                                    <p:animEffect transition="in" filter="fade">
+                                      <p:cBhvr>
+                                        <p:cTn id="17" dur="500"/>
+                                        <p:tgtEl>
+                                          <p:spTgt spid="4">
+                                            <p:txEl>
+                                              <p:pRg st="2" end="2"/>
+                                            </p:txEl>
+                                          </p:spTgt>
+                                        </p:tgtEl>
+                                      </p:cBhvr>
+                                    </p:animEffect>
+                                  </p:childTnLst>
+                                </p:cTn>
+                              </p:par>
+                            </p:childTnLst>
+                          </p:cTn>
+                        </p:par>
+                      </p:childTnLst>
+                    </p:cTn>
+                  </p:par>
+                </p:childTnLst>
+              </p:cTn>
+              <p:prevCondLst>
+                <p:cond evt="onPrev" delay="0">
+                  <p:tgtEl>
+                    <p:sldTgt/>
+                  </p:tgtEl>
+                </p:cond>
+              </p:prevCondLst>
+              <p:nextCondLst>
+                <p:cond evt="onNext" delay="0">
+                  <p:tgtEl>
+                    <p:sldTgt/>
+                  </p:tgtEl>
+                </p:cond>
+              </p:nextCondLst>
+            </p:seq>
+          </p:childTnLst>
+        </p:cTn>
+      </p:par>
+    </p:tnLst>
+    <p:bldLst>
+      <p:bldP spid="4" grpId="0" build="p"/>
+    </p:bldLst>
+  </p:timing>
+</p:sld>
+</file>
+
+<file path=ppt/slides/slide13.xml><?xml version="1.0" encoding="utf-8"?>
+<p:sld xmlns:a="http://schemas.openxmlformats.org/drawingml/2006/main" xmlns:r="http://schemas.openxmlformats.org/officeDocument/2006/relationships" xmlns:p="http://schemas.openxmlformats.org/presentationml/2006/main">
+  <p:cSld>
+    <p:spTree>
+      <p:nvGrpSpPr>
+        <p:cNvPr id="1" name=""/>
+        <p:cNvGrpSpPr/>
+        <p:nvPr/>
+      </p:nvGrpSpPr>
+      <p:grpSpPr>
+        <a:xfrm>
+          <a:off x="0" y="0"/>
+          <a:ext cx="0" cy="0"/>
+          <a:chOff x="0" y="0"/>
+          <a:chExt cx="0" cy="0"/>
+        </a:xfrm>
+      </p:grpSpPr>
+      <p:sp>
+        <p:nvSpPr>
+          <p:cNvPr id="2" name="Title 1"/>
+          <p:cNvSpPr>
+            <a:spLocks noGrp="1"/>
+          </p:cNvSpPr>
+          <p:nvPr>
+            <p:ph type="title"/>
+          </p:nvPr>
+        </p:nvSpPr>
+        <p:spPr/>
+        <p:txBody>
+          <a:bodyPr/>
+          <a:lstStyle/>
+          <a:p>
+            <a:r>
+              <a:rPr lang="en-US" dirty="0" smtClean="0"/>
+              <a:t>Lessons learned</a:t>
+            </a:r>
+            <a:endParaRPr lang="en-US" dirty="0"/>
+          </a:p>
+        </p:txBody>
+      </p:sp>
+      <p:sp>
+        <p:nvSpPr>
+          <p:cNvPr id="3" name="Content Placeholder 2"/>
+          <p:cNvSpPr>
+            <a:spLocks noGrp="1"/>
+          </p:cNvSpPr>
+          <p:nvPr>
+            <p:ph idx="1"/>
+          </p:nvPr>
+        </p:nvSpPr>
+        <p:spPr/>
+        <p:txBody>
+          <a:bodyPr/>
+          <a:lstStyle/>
+          <a:p>
+            <a:endParaRPr lang="en-US" dirty="0"/>
+          </a:p>
+        </p:txBody>
+      </p:sp>
+    </p:spTree>
+  </p:cSld>
+  <p:clrMapOvr>
+    <a:masterClrMapping/>
+  </p:clrMapOvr>
+  <p:timing>
+    <p:tnLst>
+      <p:par>
+        <p:cTn id="1" dur="indefinite" restart="never" nodeType="tmRoot"/>
+      </p:par>
+    </p:tnLst>
+  </p:timing>
+</p:sld>
+</file>
+
+<file path=ppt/slides/slide14.xml><?xml version="1.0" encoding="utf-8"?>
+<p:sld xmlns:a="http://schemas.openxmlformats.org/drawingml/2006/main" xmlns:r="http://schemas.openxmlformats.org/officeDocument/2006/relationships" xmlns:p="http://schemas.openxmlformats.org/presentationml/2006/main">
+  <p:cSld>
+    <p:spTree>
+      <p:nvGrpSpPr>
+        <p:cNvPr id="1" name=""/>
+        <p:cNvGrpSpPr/>
+        <p:nvPr/>
+      </p:nvGrpSpPr>
+      <p:grpSpPr>
+        <a:xfrm>
+          <a:off x="0" y="0"/>
+          <a:ext cx="0" cy="0"/>
+          <a:chOff x="0" y="0"/>
+          <a:chExt cx="0" cy="0"/>
+        </a:xfrm>
+      </p:grpSpPr>
+      <p:sp>
+        <p:nvSpPr>
+          <p:cNvPr id="2" name="Title 1"/>
+          <p:cNvSpPr>
+            <a:spLocks noGrp="1"/>
+          </p:cNvSpPr>
+          <p:nvPr>
+            <p:ph type="title"/>
+          </p:nvPr>
+        </p:nvSpPr>
+        <p:spPr/>
+        <p:txBody>
+          <a:bodyPr/>
+          <a:lstStyle/>
+          <a:p>
             <a:endParaRPr lang="en-US" dirty="0"/>
           </a:p>
         </p:txBody>
@@ -5560,47 +6534,9 @@
         <p:spPr/>
         <p:txBody>
           <a:bodyPr>
-            <a:normAutofit lnSpcReduction="10000"/>
+            <a:normAutofit/>
           </a:bodyPr>
           <a:lstStyle/>
-          <a:p>
-            <a:r>
-              <a:rPr lang="en-US" dirty="0" smtClean="0"/>
-              <a:t>One molecule can be made up of multiple sites</a:t>
-            </a:r>
-          </a:p>
-          <a:p>
-            <a:r>
-              <a:rPr lang="en-US" dirty="0" smtClean="0"/>
-              <a:t>Different potentials possible for the sites: </a:t>
-            </a:r>
-            <a:r>
-              <a:rPr lang="en-US" dirty="0" err="1" smtClean="0"/>
-              <a:t>Lennard</a:t>
-            </a:r>
-            <a:r>
-              <a:rPr lang="en-US" dirty="0" smtClean="0"/>
-              <a:t>-Jones, Charges, Dipoles</a:t>
-            </a:r>
-          </a:p>
-          <a:p>
-            <a:r>
-              <a:rPr lang="en-US" dirty="0" smtClean="0"/>
-              <a:t>Interactions need to be calculated between all molecule pairs</a:t>
-            </a:r>
-          </a:p>
-          <a:p>
-            <a:r>
-              <a:rPr lang="en-US" dirty="0" smtClean="0"/>
-              <a:t>Simplification: use a cutoff radius to reduce the number of interactions</a:t>
-            </a:r>
-          </a:p>
-          <a:p>
-            <a:r>
-              <a:rPr lang="en-US" dirty="0" smtClean="0"/>
-              <a:t>Result: Linked Cell Algorithm</a:t>
-            </a:r>
-          </a:p>
           <a:p>
             <a:endParaRPr lang="en-US" dirty="0" smtClean="0"/>
           </a:p>
@@ -5614,6 +6550,13 @@
   <p:clrMapOvr>
     <a:masterClrMapping/>
   </p:clrMapOvr>
+  <p:timing>
+    <p:tnLst>
+      <p:par>
+        <p:cTn id="1" dur="indefinite" restart="never" nodeType="tmRoot"/>
+      </p:par>
+    </p:tnLst>
+  </p:timing>
 </p:sld>
 </file>
 
@@ -5731,32 +6674,31 @@
           <a:p>
             <a:r>
               <a:rPr lang="en-US" dirty="0" smtClean="0"/>
-              <a:t>Performance (lj1)</a:t>
+              <a:t>CUDA Architecture</a:t>
             </a:r>
             <a:endParaRPr lang="en-US" dirty="0"/>
           </a:p>
         </p:txBody>
       </p:sp>
-      <p:graphicFrame>
-        <p:nvGraphicFramePr>
-          <p:cNvPr id="7" name="Content Placeholder 6"/>
-          <p:cNvGraphicFramePr>
-            <a:graphicFrameLocks noGrp="1"/>
-          </p:cNvGraphicFramePr>
+      <p:sp>
+        <p:nvSpPr>
+          <p:cNvPr id="3" name="Content Placeholder 2"/>
+          <p:cNvSpPr>
+            <a:spLocks noGrp="1"/>
+          </p:cNvSpPr>
           <p:nvPr>
             <p:ph idx="1"/>
           </p:nvPr>
-        </p:nvGraphicFramePr>
-        <p:xfrm>
-          <a:off x="-320" y="1600200"/>
-          <a:ext cx="9144640" cy="5029200"/>
-        </p:xfrm>
-        <a:graphic>
-          <a:graphicData uri="http://schemas.openxmlformats.org/drawingml/2006/chart">
-            <c:chart xmlns:c="http://schemas.openxmlformats.org/drawingml/2006/chart" xmlns:r="http://schemas.openxmlformats.org/officeDocument/2006/relationships" r:id="rId3"/>
-          </a:graphicData>
-        </a:graphic>
-      </p:graphicFrame>
+        </p:nvSpPr>
+        <p:spPr/>
+        <p:txBody>
+          <a:bodyPr/>
+          <a:lstStyle/>
+          <a:p>
+            <a:endParaRPr lang="en-US"/>
+          </a:p>
+        </p:txBody>
+      </p:sp>
     </p:spTree>
   </p:cSld>
   <p:clrMapOvr>
@@ -5872,49 +6814,39 @@
             <p:ph type="title"/>
           </p:nvPr>
         </p:nvSpPr>
-        <p:spPr>
-          <a:xfrm>
-            <a:off x="457200" y="274638"/>
-            <a:ext cx="8229600" cy="563562"/>
-          </a:xfrm>
-        </p:spPr>
-        <p:txBody>
-          <a:bodyPr>
-            <a:normAutofit fontScale="90000"/>
-          </a:bodyPr>
+        <p:spPr/>
+        <p:txBody>
+          <a:bodyPr/>
           <a:lstStyle/>
           <a:p>
             <a:r>
               <a:rPr lang="en-US" dirty="0" smtClean="0"/>
-              <a:t>Thread Block Cell Processor</a:t>
+              <a:t>Performance (lj1)</a:t>
             </a:r>
             <a:endParaRPr lang="en-US" dirty="0"/>
           </a:p>
         </p:txBody>
       </p:sp>
-      <p:pic>
-        <p:nvPicPr>
-          <p:cNvPr id="4" name="Content Placeholder 3" descr="cellprocessor_block_iteration.png"/>
-          <p:cNvPicPr>
-            <a:picLocks noGrp="1" noChangeAspect="1"/>
-          </p:cNvPicPr>
+      <p:graphicFrame>
+        <p:nvGraphicFramePr>
+          <p:cNvPr id="7" name="Content Placeholder 6"/>
+          <p:cNvGraphicFramePr>
+            <a:graphicFrameLocks noGrp="1"/>
+          </p:cNvGraphicFramePr>
           <p:nvPr>
             <p:ph idx="1"/>
           </p:nvPr>
-        </p:nvPicPr>
-        <p:blipFill>
-          <a:blip r:embed="rId3" cstate="print"/>
-          <a:stretch>
-            <a:fillRect/>
-          </a:stretch>
-        </p:blipFill>
-        <p:spPr>
-          <a:xfrm>
-            <a:off x="1562100" y="815181"/>
-            <a:ext cx="6019800" cy="6019800"/>
-          </a:xfrm>
-        </p:spPr>
-      </p:pic>
+        </p:nvGraphicFramePr>
+        <p:xfrm>
+          <a:off x="-320" y="1600200"/>
+          <a:ext cx="9144640" cy="5029200"/>
+        </p:xfrm>
+        <a:graphic>
+          <a:graphicData uri="http://schemas.openxmlformats.org/drawingml/2006/chart">
+            <c:chart xmlns:c="http://schemas.openxmlformats.org/drawingml/2006/chart" xmlns:r="http://schemas.openxmlformats.org/officeDocument/2006/relationships" r:id="rId3"/>
+          </a:graphicData>
+        </a:graphic>
+      </p:graphicFrame>
     </p:spTree>
   </p:cSld>
   <p:clrMapOvr>
@@ -5957,65 +6889,49 @@
             <p:ph type="title"/>
           </p:nvPr>
         </p:nvSpPr>
-        <p:spPr/>
-        <p:txBody>
-          <a:bodyPr/>
+        <p:spPr>
+          <a:xfrm>
+            <a:off x="457200" y="274638"/>
+            <a:ext cx="8229600" cy="563562"/>
+          </a:xfrm>
+        </p:spPr>
+        <p:txBody>
+          <a:bodyPr>
+            <a:normAutofit fontScale="90000"/>
+          </a:bodyPr>
           <a:lstStyle/>
           <a:p>
             <a:r>
               <a:rPr lang="en-US" dirty="0" smtClean="0"/>
-              <a:t>Warp Block Cell Processor</a:t>
+              <a:t>Thread Block Cell Processor</a:t>
             </a:r>
             <a:endParaRPr lang="en-US" dirty="0"/>
           </a:p>
         </p:txBody>
       </p:sp>
-      <p:sp>
-        <p:nvSpPr>
-          <p:cNvPr id="3" name="Content Placeholder 2"/>
-          <p:cNvSpPr>
-            <a:spLocks noGrp="1"/>
-          </p:cNvSpPr>
+      <p:pic>
+        <p:nvPicPr>
+          <p:cNvPr id="4" name="Content Placeholder 3" descr="cellprocessor_block_iteration.png"/>
+          <p:cNvPicPr>
+            <a:picLocks noGrp="1" noChangeAspect="1"/>
+          </p:cNvPicPr>
           <p:nvPr>
             <p:ph idx="1"/>
           </p:nvPr>
-        </p:nvSpPr>
-        <p:spPr/>
-        <p:txBody>
-          <a:bodyPr/>
-          <a:lstStyle/>
-          <a:p>
-            <a:r>
-              <a:rPr lang="en-US" dirty="0" smtClean="0"/>
-              <a:t>Dynamic scheduler</a:t>
-            </a:r>
-          </a:p>
-          <a:p>
-            <a:r>
-              <a:rPr lang="en-US" dirty="0" smtClean="0"/>
-              <a:t>Jobs queue</a:t>
-            </a:r>
-          </a:p>
-          <a:p>
-            <a:r>
-              <a:rPr lang="en-US" dirty="0" smtClean="0"/>
-              <a:t>No instruction-level synchronization</a:t>
-            </a:r>
-          </a:p>
-          <a:p>
-            <a:r>
-              <a:rPr lang="en-US" dirty="0" smtClean="0"/>
-              <a:t>Memory-level synchronization (via spin locks)</a:t>
-            </a:r>
-          </a:p>
-          <a:p>
-            <a:endParaRPr lang="en-US" dirty="0" smtClean="0"/>
-          </a:p>
-          <a:p>
-            <a:endParaRPr lang="en-US" dirty="0"/>
-          </a:p>
-        </p:txBody>
-      </p:sp>
+        </p:nvPicPr>
+        <p:blipFill>
+          <a:blip r:embed="rId3" cstate="print"/>
+          <a:stretch>
+            <a:fillRect/>
+          </a:stretch>
+        </p:blipFill>
+        <p:spPr>
+          <a:xfrm>
+            <a:off x="1562100" y="815181"/>
+            <a:ext cx="6019800" cy="6019800"/>
+          </a:xfrm>
+        </p:spPr>
+      </p:pic>
     </p:spTree>
   </p:cSld>
   <p:clrMapOvr>
@@ -6065,7 +6981,7 @@
           <a:p>
             <a:r>
               <a:rPr lang="en-US" dirty="0" smtClean="0"/>
-              <a:t>Optimizations</a:t>
+              <a:t>Warp Block Cell Processor</a:t>
             </a:r>
             <a:endParaRPr lang="en-US" dirty="0"/>
           </a:p>
@@ -6086,22 +7002,7 @@
           <a:bodyPr/>
           <a:lstStyle/>
           <a:p>
-            <a:r>
-              <a:rPr lang="en-US" dirty="0" smtClean="0"/>
-              <a:t>Shared memory cache</a:t>
-            </a:r>
-          </a:p>
-          <a:p>
-            <a:r>
-              <a:rPr lang="en-US" dirty="0" smtClean="0"/>
-              <a:t>Constant memory</a:t>
-            </a:r>
-          </a:p>
-          <a:p>
-            <a:r>
-              <a:rPr lang="en-US" strike="sngStrike" dirty="0" smtClean="0"/>
-              <a:t>Non-interleaved storage</a:t>
-            </a:r>
+            <a:endParaRPr lang="en-US" dirty="0" smtClean="0"/>
           </a:p>
           <a:p>
             <a:endParaRPr lang="en-US" dirty="0"/>
@@ -6157,7 +7058,7 @@
           <a:p>
             <a:r>
               <a:rPr lang="en-US" dirty="0" smtClean="0"/>
-              <a:t>Architecture/Implementation</a:t>
+              <a:t>Optimizations</a:t>
             </a:r>
             <a:endParaRPr lang="en-US" dirty="0"/>
           </a:p>
@@ -6165,25 +7066,34 @@
       </p:sp>
       <p:pic>
         <p:nvPicPr>
-          <p:cNvPr id="4" name="Content Placeholder 3" descr="component_architecture.png"/>
+          <p:cNvPr id="1026" name="Picture 2"/>
           <p:cNvPicPr>
-            <a:picLocks noGrp="1" noChangeAspect="1"/>
+            <a:picLocks noChangeAspect="1" noChangeArrowheads="1"/>
           </p:cNvPicPr>
-          <p:nvPr>
-            <p:ph idx="1"/>
-          </p:nvPr>
+          <p:nvPr/>
         </p:nvPicPr>
         <p:blipFill>
           <a:blip r:embed="rId3" cstate="print"/>
+          <a:srcRect r="14496" b="2381"/>
           <a:stretch>
             <a:fillRect/>
           </a:stretch>
         </p:blipFill>
-        <p:spPr>
+        <p:spPr bwMode="auto">
           <a:xfrm>
-            <a:off x="244608" y="2247900"/>
-            <a:ext cx="8654784" cy="2362200"/>
+            <a:off x="457200" y="1866900"/>
+            <a:ext cx="8229600" cy="3124200"/>
           </a:xfrm>
+          <a:prstGeom prst="rect">
+            <a:avLst/>
+          </a:prstGeom>
+          <a:noFill/>
+          <a:ln w="9525">
+            <a:noFill/>
+            <a:miter lim="800000"/>
+            <a:headEnd/>
+            <a:tailEnd/>
+          </a:ln>
         </p:spPr>
       </p:pic>
     </p:spTree>
@@ -6194,7 +7104,83 @@
   <p:timing>
     <p:tnLst>
       <p:par>
-        <p:cTn id="1" dur="indefinite" restart="never" nodeType="tmRoot"/>
+        <p:cTn id="1" dur="indefinite" restart="never" nodeType="tmRoot">
+          <p:childTnLst>
+            <p:seq concurrent="1" nextAc="seek">
+              <p:cTn id="2" dur="indefinite" nodeType="mainSeq">
+                <p:childTnLst>
+                  <p:par>
+                    <p:cTn id="3" fill="hold">
+                      <p:stCondLst>
+                        <p:cond delay="indefinite"/>
+                      </p:stCondLst>
+                      <p:childTnLst>
+                        <p:par>
+                          <p:cTn id="4" fill="hold">
+                            <p:stCondLst>
+                              <p:cond delay="0"/>
+                            </p:stCondLst>
+                            <p:childTnLst>
+                              <p:par>
+                                <p:cTn id="5" presetID="10" presetClass="entr" presetSubtype="0" fill="hold" nodeType="clickEffect">
+                                  <p:stCondLst>
+                                    <p:cond delay="0"/>
+                                  </p:stCondLst>
+                                  <p:childTnLst>
+                                    <p:set>
+                                      <p:cBhvr>
+                                        <p:cTn id="6" dur="1" fill="hold">
+                                          <p:stCondLst>
+                                            <p:cond delay="0"/>
+                                          </p:stCondLst>
+                                        </p:cTn>
+                                        <p:tgtEl>
+                                          <p:spTgt spid="1026"/>
+                                        </p:tgtEl>
+                                        <p:attrNameLst>
+                                          <p:attrName>style.visibility</p:attrName>
+                                        </p:attrNameLst>
+                                      </p:cBhvr>
+                                      <p:to>
+                                        <p:strVal val="visible"/>
+                                      </p:to>
+                                    </p:set>
+                                    <p:animEffect transition="in" filter="fade">
+                                      <p:cBhvr>
+                                        <p:cTn id="7" dur="500"/>
+                                        <p:tgtEl>
+                                          <p:spTgt spid="1026"/>
+                                        </p:tgtEl>
+                                      </p:cBhvr>
+                                    </p:animEffect>
+                                  </p:childTnLst>
+                                </p:cTn>
+                              </p:par>
+                            </p:childTnLst>
+                          </p:cTn>
+                        </p:par>
+                      </p:childTnLst>
+                    </p:cTn>
+                  </p:par>
+                </p:childTnLst>
+              </p:cTn>
+              <p:prevCondLst>
+                <p:cond evt="onPrev" delay="0">
+                  <p:tgtEl>
+                    <p:sldTgt/>
+                  </p:tgtEl>
+                </p:cond>
+              </p:prevCondLst>
+              <p:nextCondLst>
+                <p:cond evt="onNext" delay="0">
+                  <p:tgtEl>
+                    <p:sldTgt/>
+                  </p:tgtEl>
+                </p:cond>
+              </p:nextCondLst>
+            </p:seq>
+          </p:childTnLst>
+        </p:cTn>
       </p:par>
     </p:tnLst>
   </p:timing>

</xml_diff>

<commit_message>
update the presentation one last time (move all the text back into the slides).
git-svn-id: https://scm.projects.hlrs.de/svn/ls1/MarDyn/branches/AndreasKirsch@801 a63bd714-7e14-4b5e-94e7-302c8c8ff188
</commit_message>
<xml_diff>
--- a/paper/presentation.pptx
+++ b/paper/presentation.pptx
@@ -5,7 +5,7 @@
     <p:sldMasterId id="2147483666" r:id="rId1"/>
   </p:sldMasterIdLst>
   <p:notesMasterIdLst>
-    <p:notesMasterId r:id="rId16"/>
+    <p:notesMasterId r:id="rId18"/>
   </p:notesMasterIdLst>
   <p:sldIdLst>
     <p:sldId id="257" r:id="rId2"/>
@@ -17,11 +17,13 @@
     <p:sldId id="262" r:id="rId8"/>
     <p:sldId id="263" r:id="rId9"/>
     <p:sldId id="275" r:id="rId10"/>
-    <p:sldId id="266" r:id="rId11"/>
-    <p:sldId id="267" r:id="rId12"/>
-    <p:sldId id="274" r:id="rId13"/>
-    <p:sldId id="271" r:id="rId14"/>
-    <p:sldId id="269" r:id="rId15"/>
+    <p:sldId id="276" r:id="rId11"/>
+    <p:sldId id="266" r:id="rId12"/>
+    <p:sldId id="277" r:id="rId13"/>
+    <p:sldId id="267" r:id="rId14"/>
+    <p:sldId id="274" r:id="rId15"/>
+    <p:sldId id="271" r:id="rId16"/>
+    <p:sldId id="269" r:id="rId17"/>
   </p:sldIdLst>
   <p:sldSz cx="9144000" cy="6858000" type="screen4x3"/>
   <p:notesSz cx="6858000" cy="9144000"/>
@@ -174,13 +176,13 @@
                   <c:v>4.986936</c:v>
                 </c:pt>
                 <c:pt idx="1">
-                  <c:v>35.123510000000017</c:v>
+                  <c:v>35.123510000000024</c:v>
                 </c:pt>
                 <c:pt idx="2">
                   <c:v>121.80829999999999</c:v>
                 </c:pt>
                 <c:pt idx="3">
-                  <c:v>413.29919999999976</c:v>
+                  <c:v>413.29919999999964</c:v>
                 </c:pt>
                 <c:pt idx="4">
                   <c:v>1358.2809999999999</c:v>
@@ -233,10 +235,10 @@
                 <c:formatCode>0.00</c:formatCode>
                 <c:ptCount val="6"/>
                 <c:pt idx="0">
-                  <c:v>3.0719679999999991</c:v>
+                  <c:v>3.0719679999999987</c:v>
                 </c:pt>
                 <c:pt idx="1">
-                  <c:v>8.7376850000000008</c:v>
+                  <c:v>8.737684999999999</c:v>
                 </c:pt>
                 <c:pt idx="2">
                   <c:v>25.130849999999999</c:v>
@@ -245,7 +247,7 @@
                   <c:v>74.436170000000004</c:v>
                 </c:pt>
                 <c:pt idx="4">
-                  <c:v>344.20729999999986</c:v>
+                  <c:v>344.2072999999998</c:v>
                 </c:pt>
                 <c:pt idx="5">
                   <c:v>1961.1189999999999</c:v>
@@ -295,10 +297,10 @@
                 <c:formatCode>0.00</c:formatCode>
                 <c:ptCount val="6"/>
                 <c:pt idx="0">
-                  <c:v>5.5388809999999982</c:v>
+                  <c:v>5.5388809999999973</c:v>
                 </c:pt>
                 <c:pt idx="1">
-                  <c:v>5.3609549999999961</c:v>
+                  <c:v>5.3609549999999944</c:v>
                 </c:pt>
                 <c:pt idx="2">
                   <c:v>14.401730000000002</c:v>
@@ -307,7 +309,7 @@
                   <c:v>37.649800000000006</c:v>
                 </c:pt>
                 <c:pt idx="4">
-                  <c:v>125.76660000000003</c:v>
+                  <c:v>125.76660000000004</c:v>
                 </c:pt>
                 <c:pt idx="5">
                   <c:v>417.81330000000003</c:v>
@@ -317,11 +319,11 @@
           </c:yVal>
           <c:smooth val="1"/>
         </c:ser>
-        <c:axId val="83623936"/>
-        <c:axId val="83625856"/>
+        <c:axId val="84146048"/>
+        <c:axId val="84746240"/>
       </c:scatterChart>
       <c:valAx>
-        <c:axId val="83623936"/>
+        <c:axId val="84146048"/>
         <c:scaling>
           <c:orientation val="minMax"/>
           <c:max val="40"/>
@@ -348,13 +350,13 @@
         </c:title>
         <c:numFmt formatCode="General" sourceLinked="0"/>
         <c:tickLblPos val="nextTo"/>
-        <c:crossAx val="83625856"/>
+        <c:crossAx val="84746240"/>
         <c:crosses val="autoZero"/>
         <c:crossBetween val="midCat"/>
         <c:majorUnit val="5"/>
       </c:valAx>
       <c:valAx>
-        <c:axId val="83625856"/>
+        <c:axId val="84746240"/>
         <c:scaling>
           <c:logBase val="10"/>
           <c:orientation val="minMax"/>
@@ -382,7 +384,7 @@
         </c:title>
         <c:numFmt formatCode="General" sourceLinked="0"/>
         <c:tickLblPos val="nextTo"/>
-        <c:crossAx val="83623936"/>
+        <c:crossAx val="84146048"/>
         <c:crosses val="autoZero"/>
         <c:crossBetween val="midCat"/>
       </c:valAx>
@@ -409,6 +411,7 @@
 
 <file path=ppt/charts/chart2.xml><?xml version="1.0" encoding="utf-8"?>
 <c:chartSpace xmlns:c="http://schemas.openxmlformats.org/drawingml/2006/chart" xmlns:a="http://schemas.openxmlformats.org/drawingml/2006/main" xmlns:r="http://schemas.openxmlformats.org/officeDocument/2006/relationships">
+  <c:date1904 val="1"/>
   <c:lang val="en-US"/>
   <c:style val="10"/>
   <c:chart>
@@ -462,7 +465,7 @@
                   <c:v>203.99020000000004</c:v>
                 </c:pt>
                 <c:pt idx="3">
-                  <c:v>689.88759999999968</c:v>
+                  <c:v>689.88759999999957</c:v>
                 </c:pt>
                 <c:pt idx="4">
                   <c:v>1828.002</c:v>
@@ -527,7 +530,7 @@
                   <c:v>2640.7059999999997</c:v>
                 </c:pt>
                 <c:pt idx="5">
-                  <c:v>9042.7459999999937</c:v>
+                  <c:v>9042.7459999999919</c:v>
                 </c:pt>
               </c:numCache>
             </c:numRef>
@@ -583,7 +586,7 @@
                   <c:v>4.4110519999999998</c:v>
                 </c:pt>
                 <c:pt idx="2">
-                  <c:v>11.114289999999999</c:v>
+                  <c:v>11.11429</c:v>
                 </c:pt>
                 <c:pt idx="3">
                   <c:v>33.465260000000001</c:v>
@@ -642,22 +645,22 @@
                 <c:formatCode>0.00E+00</c:formatCode>
                 <c:ptCount val="6"/>
                 <c:pt idx="0">
-                  <c:v>4.9185359999999969</c:v>
+                  <c:v>4.918535999999996</c:v>
                 </c:pt>
                 <c:pt idx="1">
                   <c:v>5.7502640000000014</c:v>
                 </c:pt>
                 <c:pt idx="2">
-                  <c:v>12.989080000000005</c:v>
+                  <c:v>12.989080000000007</c:v>
                 </c:pt>
                 <c:pt idx="3">
                   <c:v>36.925960000000003</c:v>
                 </c:pt>
                 <c:pt idx="4">
-                  <c:v>103.60579999999996</c:v>
+                  <c:v>103.60579999999995</c:v>
                 </c:pt>
                 <c:pt idx="5">
-                  <c:v>460.47829999999976</c:v>
+                  <c:v>460.47829999999965</c:v>
                 </c:pt>
               </c:numCache>
             </c:numRef>
@@ -707,13 +710,13 @@
                 <c:formatCode>0.00E+00</c:formatCode>
                 <c:ptCount val="7"/>
                 <c:pt idx="0">
-                  <c:v>6.1424709999999969</c:v>
+                  <c:v>6.142470999999996</c:v>
                 </c:pt>
                 <c:pt idx="1">
                   <c:v>4.0530939999999998</c:v>
                 </c:pt>
                 <c:pt idx="2">
-                  <c:v>8.8355450000000069</c:v>
+                  <c:v>8.8355450000000086</c:v>
                 </c:pt>
                 <c:pt idx="3">
                   <c:v>22.91724</c:v>
@@ -784,27 +787,27 @@
                   <c:v>9.2224020000000007</c:v>
                 </c:pt>
                 <c:pt idx="3">
-                  <c:v>23.414729999999984</c:v>
+                  <c:v>23.414729999999981</c:v>
                 </c:pt>
                 <c:pt idx="4">
-                  <c:v>71.597660000000062</c:v>
+                  <c:v>71.597660000000076</c:v>
                 </c:pt>
                 <c:pt idx="5">
                   <c:v>250.28730000000004</c:v>
                 </c:pt>
                 <c:pt idx="6">
-                  <c:v>465.14139999999981</c:v>
+                  <c:v>465.14139999999975</c:v>
                 </c:pt>
               </c:numCache>
             </c:numRef>
           </c:yVal>
           <c:smooth val="1"/>
         </c:ser>
-        <c:axId val="84789120"/>
-        <c:axId val="84795392"/>
+        <c:axId val="92237824"/>
+        <c:axId val="92239744"/>
       </c:scatterChart>
       <c:valAx>
-        <c:axId val="84789120"/>
+        <c:axId val="92237824"/>
         <c:scaling>
           <c:orientation val="minMax"/>
           <c:max val="50"/>
@@ -831,13 +834,13 @@
         </c:title>
         <c:numFmt formatCode="General" sourceLinked="0"/>
         <c:tickLblPos val="nextTo"/>
-        <c:crossAx val="84795392"/>
+        <c:crossAx val="92239744"/>
         <c:crosses val="autoZero"/>
         <c:crossBetween val="midCat"/>
         <c:majorUnit val="5"/>
       </c:valAx>
       <c:valAx>
-        <c:axId val="84795392"/>
+        <c:axId val="92239744"/>
         <c:scaling>
           <c:logBase val="10"/>
           <c:orientation val="minMax"/>
@@ -865,7 +868,7 @@
         </c:title>
         <c:numFmt formatCode="General" sourceLinked="0"/>
         <c:tickLblPos val="nextTo"/>
-        <c:crossAx val="84789120"/>
+        <c:crossAx val="92237824"/>
         <c:crosses val="autoZero"/>
         <c:crossBetween val="midCat"/>
       </c:valAx>
@@ -973,7 +976,7 @@
             <a:fld id="{26C85194-BF7C-41D1-8DE6-B0DE61E9F44C}" type="datetimeFigureOut">
               <a:rPr lang="en-US" smtClean="0"/>
               <a:pPr/>
-              <a:t>10/17/2011</a:t>
+              <a:t>10/21/2011</a:t>
             </a:fld>
             <a:endParaRPr lang="en-US"/>
           </a:p>
@@ -1460,76 +1463,62 @@
           <a:p>
             <a:r>
               <a:rPr lang="en-US" dirty="0" smtClean="0"/>
-              <a:t>Constructors can be evil (for shared memory objects)</a:t>
-            </a:r>
+              <a:t>Global </a:t>
+            </a:r>
+            <a:r>
+              <a:rPr lang="en-US" b="1" dirty="0" smtClean="0"/>
+              <a:t>constant</a:t>
+            </a:r>
+            <a:r>
+              <a:rPr lang="en-US" b="1" baseline="0" dirty="0" smtClean="0"/>
+              <a:t> </a:t>
+            </a:r>
+            <a:r>
+              <a:rPr lang="en-US" baseline="0" dirty="0" smtClean="0"/>
+              <a:t>variables to avoid kernel parameters</a:t>
+            </a:r>
+          </a:p>
+          <a:p>
+            <a:endParaRPr lang="en-US" baseline="0" dirty="0" smtClean="0"/>
+          </a:p>
+          <a:p>
+            <a:r>
+              <a:rPr lang="en-US" baseline="0" dirty="0" smtClean="0"/>
+              <a:t>Heavy use of </a:t>
+            </a:r>
+            <a:r>
+              <a:rPr lang="en-US" b="1" baseline="0" dirty="0" smtClean="0"/>
+              <a:t>template</a:t>
+            </a:r>
+            <a:r>
+              <a:rPr lang="en-US" baseline="0" dirty="0" smtClean="0"/>
+              <a:t> parameters to link modules together and keep things </a:t>
+            </a:r>
+            <a:r>
+              <a:rPr lang="en-US" baseline="0" dirty="0" err="1" smtClean="0"/>
+              <a:t>interchangable</a:t>
+            </a:r>
+            <a:endParaRPr lang="en-US" baseline="0" dirty="0" smtClean="0"/>
+          </a:p>
+          <a:p>
+            <a:r>
+              <a:rPr lang="en-US" b="1" baseline="0" dirty="0" smtClean="0"/>
+              <a:t>----! CUDA/C++ still sucks for fast, modular code</a:t>
+            </a:r>
+          </a:p>
+          <a:p>
+            <a:endParaRPr lang="en-US" dirty="0" smtClean="0"/>
           </a:p>
           <a:p>
             <a:r>
               <a:rPr lang="en-US" dirty="0" smtClean="0"/>
-              <a:t>Too many nested, </a:t>
-            </a:r>
-            <a:r>
-              <a:rPr lang="en-US" dirty="0" err="1" smtClean="0"/>
-              <a:t>inlined</a:t>
-            </a:r>
-            <a:r>
-              <a:rPr lang="en-US" dirty="0" smtClean="0"/>
-              <a:t> loops confuse the compiler: __</a:t>
-            </a:r>
-            <a:r>
-              <a:rPr lang="en-US" dirty="0" err="1" smtClean="0"/>
-              <a:t>noinline</a:t>
-            </a:r>
-            <a:r>
-              <a:rPr lang="en-US" dirty="0" smtClean="0"/>
-              <a:t>__ to the rescue!</a:t>
-            </a:r>
-          </a:p>
-          <a:p>
-            <a:r>
-              <a:rPr lang="en-US" dirty="0" smtClean="0"/>
-              <a:t>__</a:t>
-            </a:r>
-            <a:r>
-              <a:rPr lang="en-US" dirty="0" err="1" smtClean="0"/>
-              <a:t>syncthreads</a:t>
-            </a:r>
-            <a:r>
-              <a:rPr lang="en-US" dirty="0" smtClean="0"/>
-              <a:t>() should be called __</a:t>
-            </a:r>
-            <a:r>
-              <a:rPr lang="en-US" dirty="0" err="1" smtClean="0"/>
-              <a:t>syncwarps</a:t>
-            </a:r>
-            <a:r>
-              <a:rPr lang="en-US" dirty="0" smtClean="0"/>
-              <a:t>()!</a:t>
-            </a:r>
-          </a:p>
-          <a:p>
-            <a:r>
-              <a:rPr lang="en-US" dirty="0" smtClean="0"/>
-              <a:t>PTX assembly has more “features”</a:t>
-            </a:r>
-          </a:p>
-          <a:p>
-            <a:endParaRPr lang="en-US" b="1" i="1" dirty="0" smtClean="0"/>
-          </a:p>
-          <a:p>
-            <a:r>
-              <a:rPr lang="en-US" b="1" i="1" dirty="0" smtClean="0"/>
-              <a:t>PTX </a:t>
-            </a:r>
-            <a:r>
-              <a:rPr lang="en-US" b="1" i="1" dirty="0" smtClean="0"/>
-              <a:t>reduction and enhanced</a:t>
-            </a:r>
-            <a:r>
-              <a:rPr lang="en-US" b="1" i="1" baseline="0" dirty="0" smtClean="0"/>
-              <a:t> synchronization instructions</a:t>
-            </a:r>
-            <a:endParaRPr lang="en-US" b="1" i="1" dirty="0"/>
+              <a:t>3</a:t>
+            </a:r>
+            <a:r>
+              <a:rPr lang="en-US" baseline="0" dirty="0" smtClean="0"/>
+              <a:t> source code iterations during the project</a:t>
+            </a:r>
+            <a:endParaRPr lang="en-US" dirty="0"/>
           </a:p>
         </p:txBody>
       </p:sp>
@@ -1551,7 +1540,7 @@
             <a:fld id="{FDBF08A4-716A-4A7F-AEC8-1293D93B8B14}" type="slidenum">
               <a:rPr lang="en-US" smtClean="0"/>
               <a:pPr/>
-              <a:t>12</a:t>
+              <a:t>11</a:t>
             </a:fld>
             <a:endParaRPr lang="en-US"/>
           </a:p>
@@ -1611,24 +1600,6 @@
           </a:bodyPr>
           <a:lstStyle/>
           <a:p>
-            <a:r>
-              <a:rPr lang="en-US" dirty="0" smtClean="0"/>
-              <a:t>Benchmark early and benchmark often!</a:t>
-            </a:r>
-          </a:p>
-          <a:p>
-            <a:r>
-              <a:rPr lang="en-US" dirty="0" smtClean="0"/>
-              <a:t>Write down expectations and how to verify them before implementing anything</a:t>
-            </a:r>
-          </a:p>
-          <a:p>
-            <a:r>
-              <a:rPr lang="en-US" dirty="0" smtClean="0"/>
-              <a:t>Iterate multiple times and throw away old code</a:t>
-            </a:r>
-          </a:p>
-          <a:p>
             <a:endParaRPr lang="en-US" dirty="0"/>
           </a:p>
         </p:txBody>
@@ -1651,7 +1622,182 @@
             <a:fld id="{FDBF08A4-716A-4A7F-AEC8-1293D93B8B14}" type="slidenum">
               <a:rPr lang="en-US" smtClean="0"/>
               <a:pPr/>
-              <a:t>13</a:t>
+              <a:t>12</a:t>
+            </a:fld>
+            <a:endParaRPr lang="en-US"/>
+          </a:p>
+        </p:txBody>
+      </p:sp>
+    </p:spTree>
+  </p:cSld>
+  <p:clrMapOvr>
+    <a:masterClrMapping/>
+  </p:clrMapOvr>
+</p:notes>
+</file>
+
+<file path=ppt/notesSlides/notesSlide12.xml><?xml version="1.0" encoding="utf-8"?>
+<p:notes xmlns:a="http://schemas.openxmlformats.org/drawingml/2006/main" xmlns:r="http://schemas.openxmlformats.org/officeDocument/2006/relationships" xmlns:p="http://schemas.openxmlformats.org/presentationml/2006/main">
+  <p:cSld>
+    <p:spTree>
+      <p:nvGrpSpPr>
+        <p:cNvPr id="1" name=""/>
+        <p:cNvGrpSpPr/>
+        <p:nvPr/>
+      </p:nvGrpSpPr>
+      <p:grpSpPr>
+        <a:xfrm>
+          <a:off x="0" y="0"/>
+          <a:ext cx="0" cy="0"/>
+          <a:chOff x="0" y="0"/>
+          <a:chExt cx="0" cy="0"/>
+        </a:xfrm>
+      </p:grpSpPr>
+      <p:sp>
+        <p:nvSpPr>
+          <p:cNvPr id="2" name="Slide Image Placeholder 1"/>
+          <p:cNvSpPr>
+            <a:spLocks noGrp="1" noRot="1" noChangeAspect="1"/>
+          </p:cNvSpPr>
+          <p:nvPr>
+            <p:ph type="sldImg"/>
+          </p:nvPr>
+        </p:nvSpPr>
+        <p:spPr/>
+      </p:sp>
+      <p:sp>
+        <p:nvSpPr>
+          <p:cNvPr id="3" name="Notes Placeholder 2"/>
+          <p:cNvSpPr>
+            <a:spLocks noGrp="1"/>
+          </p:cNvSpPr>
+          <p:nvPr>
+            <p:ph type="body" idx="1"/>
+          </p:nvPr>
+        </p:nvSpPr>
+        <p:spPr/>
+        <p:txBody>
+          <a:bodyPr>
+            <a:normAutofit/>
+          </a:bodyPr>
+          <a:lstStyle/>
+          <a:p>
+            <a:endParaRPr lang="en-US" b="1" i="1" dirty="0" smtClean="0"/>
+          </a:p>
+          <a:p>
+            <a:r>
+              <a:rPr lang="en-US" b="1" i="1" dirty="0" smtClean="0"/>
+              <a:t>PTX reduction and enhanced</a:t>
+            </a:r>
+            <a:r>
+              <a:rPr lang="en-US" b="1" i="1" baseline="0" dirty="0" smtClean="0"/>
+              <a:t> synchronization instructions</a:t>
+            </a:r>
+            <a:endParaRPr lang="en-US" b="1" i="1" dirty="0"/>
+          </a:p>
+        </p:txBody>
+      </p:sp>
+      <p:sp>
+        <p:nvSpPr>
+          <p:cNvPr id="4" name="Slide Number Placeholder 3"/>
+          <p:cNvSpPr>
+            <a:spLocks noGrp="1"/>
+          </p:cNvSpPr>
+          <p:nvPr>
+            <p:ph type="sldNum" sz="quarter" idx="10"/>
+          </p:nvPr>
+        </p:nvSpPr>
+        <p:spPr/>
+        <p:txBody>
+          <a:bodyPr/>
+          <a:lstStyle/>
+          <a:p>
+            <a:fld id="{FDBF08A4-716A-4A7F-AEC8-1293D93B8B14}" type="slidenum">
+              <a:rPr lang="en-US" smtClean="0"/>
+              <a:pPr/>
+              <a:t>14</a:t>
+            </a:fld>
+            <a:endParaRPr lang="en-US"/>
+          </a:p>
+        </p:txBody>
+      </p:sp>
+    </p:spTree>
+  </p:cSld>
+  <p:clrMapOvr>
+    <a:masterClrMapping/>
+  </p:clrMapOvr>
+</p:notes>
+</file>
+
+<file path=ppt/notesSlides/notesSlide13.xml><?xml version="1.0" encoding="utf-8"?>
+<p:notes xmlns:a="http://schemas.openxmlformats.org/drawingml/2006/main" xmlns:r="http://schemas.openxmlformats.org/officeDocument/2006/relationships" xmlns:p="http://schemas.openxmlformats.org/presentationml/2006/main">
+  <p:cSld>
+    <p:spTree>
+      <p:nvGrpSpPr>
+        <p:cNvPr id="1" name=""/>
+        <p:cNvGrpSpPr/>
+        <p:nvPr/>
+      </p:nvGrpSpPr>
+      <p:grpSpPr>
+        <a:xfrm>
+          <a:off x="0" y="0"/>
+          <a:ext cx="0" cy="0"/>
+          <a:chOff x="0" y="0"/>
+          <a:chExt cx="0" cy="0"/>
+        </a:xfrm>
+      </p:grpSpPr>
+      <p:sp>
+        <p:nvSpPr>
+          <p:cNvPr id="2" name="Slide Image Placeholder 1"/>
+          <p:cNvSpPr>
+            <a:spLocks noGrp="1" noRot="1" noChangeAspect="1"/>
+          </p:cNvSpPr>
+          <p:nvPr>
+            <p:ph type="sldImg"/>
+          </p:nvPr>
+        </p:nvSpPr>
+        <p:spPr/>
+      </p:sp>
+      <p:sp>
+        <p:nvSpPr>
+          <p:cNvPr id="3" name="Notes Placeholder 2"/>
+          <p:cNvSpPr>
+            <a:spLocks noGrp="1"/>
+          </p:cNvSpPr>
+          <p:nvPr>
+            <p:ph type="body" idx="1"/>
+          </p:nvPr>
+        </p:nvSpPr>
+        <p:spPr/>
+        <p:txBody>
+          <a:bodyPr>
+            <a:normAutofit/>
+          </a:bodyPr>
+          <a:lstStyle/>
+          <a:p>
+            <a:endParaRPr lang="en-US" dirty="0"/>
+          </a:p>
+        </p:txBody>
+      </p:sp>
+      <p:sp>
+        <p:nvSpPr>
+          <p:cNvPr id="4" name="Slide Number Placeholder 3"/>
+          <p:cNvSpPr>
+            <a:spLocks noGrp="1"/>
+          </p:cNvSpPr>
+          <p:nvPr>
+            <p:ph type="sldNum" sz="quarter" idx="10"/>
+          </p:nvPr>
+        </p:nvSpPr>
+        <p:spPr/>
+        <p:txBody>
+          <a:bodyPr/>
+          <a:lstStyle/>
+          <a:p>
+            <a:fld id="{FDBF08A4-716A-4A7F-AEC8-1293D93B8B14}" type="slidenum">
+              <a:rPr lang="en-US" smtClean="0"/>
+              <a:pPr/>
+              <a:t>15</a:t>
             </a:fld>
             <a:endParaRPr lang="en-US"/>
           </a:p>
@@ -1711,60 +1857,6 @@
           </a:bodyPr>
           <a:lstStyle/>
           <a:p>
-            <a:r>
-              <a:rPr lang="en-US" dirty="0" smtClean="0"/>
-              <a:t>One molecule can be made up of multiple sites</a:t>
-            </a:r>
-          </a:p>
-          <a:p>
-            <a:r>
-              <a:rPr lang="en-US" dirty="0" smtClean="0"/>
-              <a:t>Different potentials possible for the sites: </a:t>
-            </a:r>
-            <a:r>
-              <a:rPr lang="en-US" b="1" dirty="0" err="1" smtClean="0"/>
-              <a:t>Lennard</a:t>
-            </a:r>
-            <a:r>
-              <a:rPr lang="en-US" b="1" dirty="0" smtClean="0"/>
-              <a:t>-Jones</a:t>
-            </a:r>
-            <a:r>
-              <a:rPr lang="en-US" dirty="0" smtClean="0"/>
-              <a:t>, </a:t>
-            </a:r>
-            <a:r>
-              <a:rPr lang="en-US" b="1" dirty="0" smtClean="0"/>
-              <a:t>Charges</a:t>
-            </a:r>
-            <a:r>
-              <a:rPr lang="en-US" dirty="0" smtClean="0"/>
-              <a:t>, </a:t>
-            </a:r>
-            <a:r>
-              <a:rPr lang="en-US" b="1" dirty="0" smtClean="0"/>
-              <a:t>Dipoles</a:t>
-            </a:r>
-          </a:p>
-          <a:p>
-            <a:r>
-              <a:rPr lang="en-US" dirty="0" smtClean="0"/>
-              <a:t>Interactions need to be calculated between all molecule pairs</a:t>
-            </a:r>
-          </a:p>
-          <a:p>
-            <a:r>
-              <a:rPr lang="en-US" dirty="0" smtClean="0"/>
-              <a:t>Simplification: use a cutoff radius to reduce the number of interactions</a:t>
-            </a:r>
-          </a:p>
-          <a:p>
-            <a:r>
-              <a:rPr lang="en-US" dirty="0" smtClean="0"/>
-              <a:t>Result: Linked Cell Algorithm</a:t>
-            </a:r>
-          </a:p>
-          <a:p>
             <a:endParaRPr lang="en-US" dirty="0"/>
           </a:p>
         </p:txBody>
@@ -2147,11 +2239,7 @@
           <a:p>
             <a:r>
               <a:rPr lang="en-US" baseline="0" dirty="0" smtClean="0"/>
-              <a:t>Fixed </a:t>
-            </a:r>
-            <a:r>
-              <a:rPr lang="en-US" baseline="0" dirty="0" smtClean="0"/>
-              <a:t>thread block size for all cells -&gt; not good for sparse domains</a:t>
+              <a:t>Fixed thread block size for all cells -&gt; not good for sparse domains</a:t>
             </a:r>
           </a:p>
           <a:p>
@@ -2247,33 +2335,6 @@
           <a:lstStyle/>
           <a:p>
             <a:r>
-              <a:rPr lang="en-US" dirty="0" smtClean="0"/>
-              <a:t>Dynamic scheduler</a:t>
-            </a:r>
-          </a:p>
-          <a:p>
-            <a:r>
-              <a:rPr lang="en-US" dirty="0" smtClean="0"/>
-              <a:t>Jobs queue</a:t>
-            </a:r>
-          </a:p>
-          <a:p>
-            <a:r>
-              <a:rPr lang="en-US" dirty="0" smtClean="0"/>
-              <a:t>No instruction-level synchronization</a:t>
-            </a:r>
-          </a:p>
-          <a:p>
-            <a:r>
-              <a:rPr lang="en-US" dirty="0" smtClean="0"/>
-              <a:t>Memory-level synchronization (via spin locks)</a:t>
-            </a:r>
-          </a:p>
-          <a:p>
-            <a:endParaRPr lang="en-US" dirty="0" smtClean="0"/>
-          </a:p>
-          <a:p>
-            <a:r>
               <a:rPr lang="en-US" b="1" i="1" dirty="0" smtClean="0"/>
               <a:t>Draw </a:t>
             </a:r>
@@ -2289,11 +2350,7 @@
           <a:p>
             <a:r>
               <a:rPr lang="en-US" b="1" i="1" baseline="0" dirty="0" smtClean="0"/>
-              <a:t>(describe) dynamic </a:t>
-            </a:r>
-            <a:r>
-              <a:rPr lang="en-US" b="1" i="1" baseline="0" dirty="0" smtClean="0"/>
-              <a:t>job scheduling</a:t>
+              <a:t>(describe) dynamic job scheduling</a:t>
             </a:r>
           </a:p>
           <a:p>
@@ -2458,11 +2515,7 @@
           <a:p>
             <a:r>
               <a:rPr lang="en-US" b="1" i="1" baseline="0" dirty="0" smtClean="0"/>
-              <a:t>Non-interleaved </a:t>
-            </a:r>
-            <a:r>
-              <a:rPr lang="en-US" b="1" i="1" baseline="0" dirty="0" smtClean="0"/>
-              <a:t>storage failed because of temporarily sparse access patterns (more cache misses with non-interleaved data)</a:t>
+              <a:t>Non-interleaved storage failed because of temporarily sparse access patterns (more cache misses with non-interleaved data)</a:t>
             </a:r>
           </a:p>
           <a:p>
@@ -2556,51 +2609,34 @@
           <a:p>
             <a:r>
               <a:rPr lang="en-US" dirty="0" smtClean="0"/>
-              <a:t>Global </a:t>
-            </a:r>
-            <a:r>
-              <a:rPr lang="en-US" b="1" dirty="0" smtClean="0"/>
-              <a:t>constant</a:t>
-            </a:r>
-            <a:r>
-              <a:rPr lang="en-US" b="1" baseline="0" dirty="0" smtClean="0"/>
-              <a:t> </a:t>
-            </a:r>
-            <a:r>
-              <a:rPr lang="en-US" baseline="0" dirty="0" smtClean="0"/>
-              <a:t>variables to avoid kernel parameters</a:t>
-            </a:r>
-          </a:p>
-          <a:p>
-            <a:endParaRPr lang="en-US" baseline="0" dirty="0" smtClean="0"/>
-          </a:p>
-          <a:p>
-            <a:r>
-              <a:rPr lang="en-US" baseline="0" dirty="0" smtClean="0"/>
-              <a:t>Heavy </a:t>
-            </a:r>
-            <a:r>
-              <a:rPr lang="en-US" baseline="0" dirty="0" smtClean="0"/>
-              <a:t>use of </a:t>
-            </a:r>
-            <a:r>
-              <a:rPr lang="en-US" b="1" baseline="0" dirty="0" smtClean="0"/>
-              <a:t>template</a:t>
-            </a:r>
-            <a:r>
-              <a:rPr lang="en-US" baseline="0" dirty="0" smtClean="0"/>
-              <a:t> parameters to link modules together and keep things </a:t>
-            </a:r>
-            <a:r>
-              <a:rPr lang="en-US" baseline="0" dirty="0" err="1" smtClean="0"/>
-              <a:t>interchangable</a:t>
-            </a:r>
-            <a:endParaRPr lang="en-US" baseline="0" dirty="0" smtClean="0"/>
-          </a:p>
-          <a:p>
-            <a:r>
-              <a:rPr lang="en-US" b="1" baseline="0" dirty="0" smtClean="0"/>
-              <a:t>----! CUDA/C++ still sucks for fast, modular code</a:t>
+              <a:t>Shared memory cache</a:t>
+            </a:r>
+          </a:p>
+          <a:p>
+            <a:pPr marL="0" marR="0" indent="0" algn="l" defTabSz="914400" rtl="0" eaLnBrk="1" fontAlgn="auto" latinLnBrk="0" hangingPunct="1">
+              <a:lnSpc>
+                <a:spcPct val="100000"/>
+              </a:lnSpc>
+              <a:spcBef>
+                <a:spcPts val="0"/>
+              </a:spcBef>
+              <a:spcAft>
+                <a:spcPts val="0"/>
+              </a:spcAft>
+              <a:buClrTx/>
+              <a:buSzTx/>
+              <a:buFontTx/>
+              <a:buNone/>
+              <a:tabLst/>
+              <a:defRPr/>
+            </a:pPr>
+            <a:r>
+              <a:rPr lang="en-US" b="1" i="1" dirty="0" smtClean="0"/>
+              <a:t>Shared</a:t>
+            </a:r>
+            <a:r>
+              <a:rPr lang="en-US" b="1" i="1" baseline="0" dirty="0" smtClean="0"/>
+              <a:t> memory results differ for TBCP and WBCP</a:t>
             </a:r>
           </a:p>
           <a:p>
@@ -2609,17 +2645,55 @@
           <a:p>
             <a:r>
               <a:rPr lang="en-US" dirty="0" smtClean="0"/>
-              <a:t>3</a:t>
-            </a:r>
-            <a:r>
-              <a:rPr lang="en-US" baseline="0" dirty="0" smtClean="0"/>
-              <a:t> </a:t>
-            </a:r>
-            <a:r>
-              <a:rPr lang="en-US" baseline="0" dirty="0" smtClean="0"/>
-              <a:t>source code iterations during the project</a:t>
-            </a:r>
-            <a:endParaRPr lang="en-US" dirty="0"/>
+              <a:t>Constant memory</a:t>
+            </a:r>
+          </a:p>
+          <a:p>
+            <a:pPr marL="0" marR="0" indent="0" algn="l" defTabSz="914400" rtl="0" eaLnBrk="1" fontAlgn="auto" latinLnBrk="0" hangingPunct="1">
+              <a:lnSpc>
+                <a:spcPct val="100000"/>
+              </a:lnSpc>
+              <a:spcBef>
+                <a:spcPts val="0"/>
+              </a:spcBef>
+              <a:spcAft>
+                <a:spcPts val="0"/>
+              </a:spcAft>
+              <a:buClrTx/>
+              <a:buSzTx/>
+              <a:buFontTx/>
+              <a:buNone/>
+              <a:tabLst/>
+              <a:defRPr/>
+            </a:pPr>
+            <a:r>
+              <a:rPr lang="en-US" b="1" i="1" baseline="0" dirty="0" smtClean="0"/>
+              <a:t>Constant memory was a good idea</a:t>
+            </a:r>
+          </a:p>
+          <a:p>
+            <a:endParaRPr lang="en-US" dirty="0" smtClean="0"/>
+          </a:p>
+          <a:p>
+            <a:r>
+              <a:rPr lang="en-US" strike="sngStrike" dirty="0" smtClean="0"/>
+              <a:t>Non-interleaved storage</a:t>
+            </a:r>
+          </a:p>
+          <a:p>
+            <a:r>
+              <a:rPr lang="en-US" b="1" i="1" baseline="0" dirty="0" smtClean="0"/>
+              <a:t>Non-interleaved storage failed because of temporarily sparse access patterns (more cache misses with non-interleaved data)</a:t>
+            </a:r>
+          </a:p>
+          <a:p>
+            <a:endParaRPr lang="en-US" b="1" i="1" baseline="0" dirty="0" smtClean="0"/>
+          </a:p>
+          <a:p>
+            <a:r>
+              <a:rPr lang="en-US" b="1" i="1" baseline="0" dirty="0" smtClean="0"/>
+              <a:t>TODO: fully interleaved molecule storage</a:t>
+            </a:r>
           </a:p>
         </p:txBody>
       </p:sp>
@@ -2837,7 +2911,7 @@
             <a:fld id="{F7CFEFCE-C008-4008-8B4E-1B013B42BB40}" type="datetimeFigureOut">
               <a:rPr lang="en-US" smtClean="0"/>
               <a:pPr/>
-              <a:t>10/17/2011</a:t>
+              <a:t>10/21/2011</a:t>
             </a:fld>
             <a:endParaRPr lang="en-US"/>
           </a:p>
@@ -3004,7 +3078,7 @@
             <a:fld id="{0346E2D4-4A27-4427-9990-87253EAA0275}" type="datetimeFigureOut">
               <a:rPr lang="en-US" smtClean="0"/>
               <a:pPr/>
-              <a:t>10/17/2011</a:t>
+              <a:t>10/21/2011</a:t>
             </a:fld>
             <a:endParaRPr lang="en-US"/>
           </a:p>
@@ -3181,7 +3255,7 @@
             <a:fld id="{0346E2D4-4A27-4427-9990-87253EAA0275}" type="datetimeFigureOut">
               <a:rPr lang="en-US" smtClean="0"/>
               <a:pPr/>
-              <a:t>10/17/2011</a:t>
+              <a:t>10/21/2011</a:t>
             </a:fld>
             <a:endParaRPr lang="en-US"/>
           </a:p>
@@ -3348,7 +3422,7 @@
             <a:fld id="{0346E2D4-4A27-4427-9990-87253EAA0275}" type="datetimeFigureOut">
               <a:rPr lang="en-US" smtClean="0"/>
               <a:pPr/>
-              <a:t>10/17/2011</a:t>
+              <a:t>10/21/2011</a:t>
             </a:fld>
             <a:endParaRPr lang="en-US"/>
           </a:p>
@@ -3591,7 +3665,7 @@
             <a:fld id="{0346E2D4-4A27-4427-9990-87253EAA0275}" type="datetimeFigureOut">
               <a:rPr lang="en-US" smtClean="0"/>
               <a:pPr/>
-              <a:t>10/17/2011</a:t>
+              <a:t>10/21/2011</a:t>
             </a:fld>
             <a:endParaRPr lang="en-US"/>
           </a:p>
@@ -3876,7 +3950,7 @@
             <a:fld id="{0346E2D4-4A27-4427-9990-87253EAA0275}" type="datetimeFigureOut">
               <a:rPr lang="en-US" smtClean="0"/>
               <a:pPr/>
-              <a:t>10/17/2011</a:t>
+              <a:t>10/21/2011</a:t>
             </a:fld>
             <a:endParaRPr lang="en-US"/>
           </a:p>
@@ -4295,7 +4369,7 @@
             <a:fld id="{0346E2D4-4A27-4427-9990-87253EAA0275}" type="datetimeFigureOut">
               <a:rPr lang="en-US" smtClean="0"/>
               <a:pPr/>
-              <a:t>10/17/2011</a:t>
+              <a:t>10/21/2011</a:t>
             </a:fld>
             <a:endParaRPr lang="en-US"/>
           </a:p>
@@ -4410,7 +4484,7 @@
             <a:fld id="{0346E2D4-4A27-4427-9990-87253EAA0275}" type="datetimeFigureOut">
               <a:rPr lang="en-US" smtClean="0"/>
               <a:pPr/>
-              <a:t>10/17/2011</a:t>
+              <a:t>10/21/2011</a:t>
             </a:fld>
             <a:endParaRPr lang="en-US"/>
           </a:p>
@@ -4502,7 +4576,7 @@
             <a:fld id="{0346E2D4-4A27-4427-9990-87253EAA0275}" type="datetimeFigureOut">
               <a:rPr lang="en-US" smtClean="0"/>
               <a:pPr/>
-              <a:t>10/17/2011</a:t>
+              <a:t>10/21/2011</a:t>
             </a:fld>
             <a:endParaRPr lang="en-US"/>
           </a:p>
@@ -4776,7 +4850,7 @@
             <a:fld id="{0346E2D4-4A27-4427-9990-87253EAA0275}" type="datetimeFigureOut">
               <a:rPr lang="en-US" smtClean="0"/>
               <a:pPr/>
-              <a:t>10/17/2011</a:t>
+              <a:t>10/21/2011</a:t>
             </a:fld>
             <a:endParaRPr lang="en-US"/>
           </a:p>
@@ -5026,7 +5100,7 @@
             <a:fld id="{0346E2D4-4A27-4427-9990-87253EAA0275}" type="datetimeFigureOut">
               <a:rPr lang="en-US" smtClean="0"/>
               <a:pPr/>
-              <a:t>10/17/2011</a:t>
+              <a:t>10/21/2011</a:t>
             </a:fld>
             <a:endParaRPr lang="en-US"/>
           </a:p>
@@ -5236,7 +5310,7 @@
             <a:fld id="{0346E2D4-4A27-4427-9990-87253EAA0275}" type="datetimeFigureOut">
               <a:rPr lang="en-US" smtClean="0"/>
               <a:pPr/>
-              <a:t>10/17/2011</a:t>
+              <a:t>10/21/2011</a:t>
             </a:fld>
             <a:endParaRPr lang="en-US"/>
           </a:p>
@@ -5713,1351 +5787,6 @@
           <a:p>
             <a:r>
               <a:rPr lang="en-US" dirty="0" smtClean="0"/>
-              <a:t>Implementation</a:t>
-            </a:r>
-            <a:endParaRPr lang="en-US" dirty="0"/>
-          </a:p>
-        </p:txBody>
-      </p:sp>
-      <p:pic>
-        <p:nvPicPr>
-          <p:cNvPr id="4" name="Content Placeholder 3" descr="component_architecture.png"/>
-          <p:cNvPicPr>
-            <a:picLocks noGrp="1" noChangeAspect="1"/>
-          </p:cNvPicPr>
-          <p:nvPr>
-            <p:ph idx="1"/>
-          </p:nvPr>
-        </p:nvPicPr>
-        <p:blipFill>
-          <a:blip r:embed="rId3" cstate="print"/>
-          <a:stretch>
-            <a:fillRect/>
-          </a:stretch>
-        </p:blipFill>
-        <p:spPr>
-          <a:xfrm>
-            <a:off x="244608" y="2247900"/>
-            <a:ext cx="8654784" cy="2362200"/>
-          </a:xfrm>
-        </p:spPr>
-      </p:pic>
-    </p:spTree>
-  </p:cSld>
-  <p:clrMapOvr>
-    <a:masterClrMapping/>
-  </p:clrMapOvr>
-  <p:timing>
-    <p:tnLst>
-      <p:par>
-        <p:cTn id="1" dur="indefinite" restart="never" nodeType="tmRoot"/>
-      </p:par>
-    </p:tnLst>
-  </p:timing>
-</p:sld>
-</file>
-
-<file path=ppt/slides/slide11.xml><?xml version="1.0" encoding="utf-8"?>
-<p:sld xmlns:a="http://schemas.openxmlformats.org/drawingml/2006/main" xmlns:r="http://schemas.openxmlformats.org/officeDocument/2006/relationships" xmlns:p="http://schemas.openxmlformats.org/presentationml/2006/main">
-  <p:cSld>
-    <p:spTree>
-      <p:nvGrpSpPr>
-        <p:cNvPr id="1" name=""/>
-        <p:cNvGrpSpPr/>
-        <p:nvPr/>
-      </p:nvGrpSpPr>
-      <p:grpSpPr>
-        <a:xfrm>
-          <a:off x="0" y="0"/>
-          <a:ext cx="0" cy="0"/>
-          <a:chOff x="0" y="0"/>
-          <a:chExt cx="0" cy="0"/>
-        </a:xfrm>
-      </p:grpSpPr>
-      <p:sp>
-        <p:nvSpPr>
-          <p:cNvPr id="2" name="Title 1"/>
-          <p:cNvSpPr>
-            <a:spLocks noGrp="1"/>
-          </p:cNvSpPr>
-          <p:nvPr>
-            <p:ph type="title"/>
-          </p:nvPr>
-        </p:nvSpPr>
-        <p:spPr/>
-        <p:txBody>
-          <a:bodyPr>
-            <a:normAutofit/>
-          </a:bodyPr>
-          <a:lstStyle/>
-          <a:p>
-            <a:r>
-              <a:rPr lang="en-US" dirty="0" smtClean="0"/>
-              <a:t>Interesting Papers</a:t>
-            </a:r>
-            <a:endParaRPr lang="en-US" dirty="0"/>
-          </a:p>
-        </p:txBody>
-      </p:sp>
-      <p:sp>
-        <p:nvSpPr>
-          <p:cNvPr id="3" name="Content Placeholder 2"/>
-          <p:cNvSpPr>
-            <a:spLocks noGrp="1"/>
-          </p:cNvSpPr>
-          <p:nvPr>
-            <p:ph idx="1"/>
-          </p:nvPr>
-        </p:nvSpPr>
-        <p:spPr/>
-        <p:txBody>
-          <a:bodyPr>
-            <a:normAutofit fontScale="92500" lnSpcReduction="10000"/>
-          </a:bodyPr>
-          <a:lstStyle/>
-          <a:p>
-            <a:r>
-              <a:rPr lang="en-US" dirty="0" smtClean="0"/>
-              <a:t>Better performance at lower occupancy</a:t>
-            </a:r>
-            <a:br>
-              <a:rPr lang="en-US" dirty="0" smtClean="0"/>
-            </a:br>
-            <a:r>
-              <a:rPr lang="en-US" dirty="0" smtClean="0">
-                <a:hlinkClick r:id="rId2"/>
-              </a:rPr>
-              <a:t>http://www.cs.berkeley.edu/~volkov/volkov10-GTC.pdf</a:t>
-            </a:r>
-            <a:endParaRPr lang="en-US" dirty="0" smtClean="0"/>
-          </a:p>
-          <a:p>
-            <a:r>
-              <a:rPr lang="en-US" dirty="0" smtClean="0"/>
-              <a:t>Demystifying GPU </a:t>
-            </a:r>
-            <a:r>
-              <a:rPr lang="en-US" dirty="0" err="1" smtClean="0"/>
-              <a:t>microarchitecture</a:t>
-            </a:r>
-            <a:r>
-              <a:rPr lang="en-US" dirty="0" smtClean="0"/>
-              <a:t> through </a:t>
-            </a:r>
-            <a:r>
-              <a:rPr lang="en-US" dirty="0" err="1" smtClean="0"/>
-              <a:t>microbenchmarking</a:t>
-            </a:r>
-            <a:r>
-              <a:rPr lang="en-US" dirty="0" smtClean="0"/>
-              <a:t/>
-            </a:r>
-            <a:br>
-              <a:rPr lang="en-US" dirty="0" smtClean="0"/>
-            </a:br>
-            <a:r>
-              <a:rPr lang="en-US" dirty="0" smtClean="0">
-                <a:hlinkClick r:id="rId3"/>
-              </a:rPr>
-              <a:t>http://www.stuffedcow.net/research/cudabmk</a:t>
-            </a:r>
-            <a:endParaRPr lang="en-US" dirty="0" smtClean="0"/>
-          </a:p>
-          <a:p>
-            <a:r>
-              <a:rPr lang="en-US" dirty="0" err="1" smtClean="0"/>
-              <a:t>CudaDMA</a:t>
-            </a:r>
-            <a:r>
-              <a:rPr lang="en-US" dirty="0" smtClean="0"/>
-              <a:t>: Optimizing GPU Memory Bandwidth via Warp Specialization</a:t>
-            </a:r>
-            <a:br>
-              <a:rPr lang="en-US" dirty="0" smtClean="0"/>
-            </a:br>
-            <a:r>
-              <a:rPr lang="en-US" dirty="0" smtClean="0">
-                <a:hlinkClick r:id="rId4"/>
-              </a:rPr>
-              <a:t>http://www.stanford.edu/~mebauer/pdfs/cudadma-sc11.pdf</a:t>
-            </a:r>
-            <a:endParaRPr lang="en-US" dirty="0"/>
-          </a:p>
-        </p:txBody>
-      </p:sp>
-    </p:spTree>
-  </p:cSld>
-  <p:clrMapOvr>
-    <a:masterClrMapping/>
-  </p:clrMapOvr>
-  <p:timing>
-    <p:tnLst>
-      <p:par>
-        <p:cTn id="1" dur="indefinite" restart="never" nodeType="tmRoot"/>
-      </p:par>
-    </p:tnLst>
-  </p:timing>
-</p:sld>
-</file>
-
-<file path=ppt/slides/slide12.xml><?xml version="1.0" encoding="utf-8"?>
-<p:sld xmlns:a="http://schemas.openxmlformats.org/drawingml/2006/main" xmlns:r="http://schemas.openxmlformats.org/officeDocument/2006/relationships" xmlns:p="http://schemas.openxmlformats.org/presentationml/2006/main">
-  <p:cSld>
-    <p:spTree>
-      <p:nvGrpSpPr>
-        <p:cNvPr id="1" name=""/>
-        <p:cNvGrpSpPr/>
-        <p:nvPr/>
-      </p:nvGrpSpPr>
-      <p:grpSpPr>
-        <a:xfrm>
-          <a:off x="0" y="0"/>
-          <a:ext cx="0" cy="0"/>
-          <a:chOff x="0" y="0"/>
-          <a:chExt cx="0" cy="0"/>
-        </a:xfrm>
-      </p:grpSpPr>
-      <p:sp>
-        <p:nvSpPr>
-          <p:cNvPr id="2" name="Title 1"/>
-          <p:cNvSpPr>
-            <a:spLocks noGrp="1"/>
-          </p:cNvSpPr>
-          <p:nvPr>
-            <p:ph type="title"/>
-          </p:nvPr>
-        </p:nvSpPr>
-        <p:spPr/>
-        <p:txBody>
-          <a:bodyPr/>
-          <a:lstStyle/>
-          <a:p>
-            <a:r>
-              <a:rPr lang="en-US" dirty="0" smtClean="0"/>
-              <a:t>Interesting Bugs	 &amp; Facts</a:t>
-            </a:r>
-            <a:endParaRPr lang="en-US" dirty="0"/>
-          </a:p>
-        </p:txBody>
-      </p:sp>
-      <p:sp>
-        <p:nvSpPr>
-          <p:cNvPr id="4" name="Content Placeholder 2"/>
-          <p:cNvSpPr txBox="1">
-            <a:spLocks/>
-          </p:cNvSpPr>
-          <p:nvPr/>
-        </p:nvSpPr>
-        <p:spPr>
-          <a:xfrm>
-            <a:off x="457200" y="1600200"/>
-            <a:ext cx="8229600" cy="4525963"/>
-          </a:xfrm>
-          <a:prstGeom prst="rect">
-            <a:avLst/>
-          </a:prstGeom>
-        </p:spPr>
-        <p:txBody>
-          <a:bodyPr vert="horz" lIns="91440" tIns="45720" rIns="91440" bIns="45720" rtlCol="0" anchor="ctr">
-            <a:normAutofit/>
-          </a:bodyPr>
-          <a:lstStyle/>
-          <a:p>
-            <a:pPr marL="342900" marR="0" lvl="0" indent="-342900" algn="ctr" defTabSz="914400" rtl="0" eaLnBrk="1" fontAlgn="auto" latinLnBrk="0" hangingPunct="1">
-              <a:lnSpc>
-                <a:spcPct val="100000"/>
-              </a:lnSpc>
-              <a:spcBef>
-                <a:spcPct val="20000"/>
-              </a:spcBef>
-              <a:spcAft>
-                <a:spcPts val="0"/>
-              </a:spcAft>
-              <a:buClrTx/>
-              <a:buSzTx/>
-              <a:buFont typeface="Arial" pitchFamily="34" charset="0"/>
-              <a:buNone/>
-              <a:tabLst/>
-              <a:defRPr/>
-            </a:pPr>
-            <a:r>
-              <a:rPr kumimoji="0" lang="en-US" sz="3200" b="0" i="0" u="none" strike="noStrike" kern="1200" cap="none" spc="0" normalizeH="0" baseline="0" noProof="0" dirty="0" smtClean="0">
-                <a:ln>
-                  <a:noFill/>
-                </a:ln>
-                <a:solidFill>
-                  <a:schemeClr val="tx1"/>
-                </a:solidFill>
-                <a:effectLst/>
-                <a:uLnTx/>
-                <a:uFillTx/>
-                <a:latin typeface="+mn-lt"/>
-                <a:ea typeface="+mn-ea"/>
-                <a:cs typeface="+mn-cs"/>
-              </a:rPr>
-              <a:t>__</a:t>
-            </a:r>
-            <a:r>
-              <a:rPr kumimoji="0" lang="en-US" sz="3200" b="0" i="0" u="none" strike="noStrike" kern="1200" cap="none" spc="0" normalizeH="0" baseline="0" noProof="0" dirty="0" err="1" smtClean="0">
-                <a:ln>
-                  <a:noFill/>
-                </a:ln>
-                <a:solidFill>
-                  <a:schemeClr val="tx1"/>
-                </a:solidFill>
-                <a:effectLst/>
-                <a:uLnTx/>
-                <a:uFillTx/>
-                <a:latin typeface="+mn-lt"/>
-                <a:ea typeface="+mn-ea"/>
-                <a:cs typeface="+mn-cs"/>
-              </a:rPr>
-              <a:t>noinline</a:t>
-            </a:r>
-            <a:r>
-              <a:rPr kumimoji="0" lang="en-US" sz="3200" b="0" i="0" u="none" strike="noStrike" kern="1200" cap="none" spc="0" normalizeH="0" baseline="0" noProof="0" dirty="0" smtClean="0">
-                <a:ln>
-                  <a:noFill/>
-                </a:ln>
-                <a:solidFill>
-                  <a:schemeClr val="tx1"/>
-                </a:solidFill>
-                <a:effectLst/>
-                <a:uLnTx/>
-                <a:uFillTx/>
-                <a:latin typeface="+mn-lt"/>
-                <a:ea typeface="+mn-ea"/>
-                <a:cs typeface="+mn-cs"/>
-              </a:rPr>
-              <a:t>__</a:t>
-            </a:r>
-          </a:p>
-          <a:p>
-            <a:pPr marL="342900" marR="0" lvl="0" indent="-342900" algn="ctr" defTabSz="914400" rtl="0" eaLnBrk="1" fontAlgn="auto" latinLnBrk="0" hangingPunct="1">
-              <a:lnSpc>
-                <a:spcPct val="100000"/>
-              </a:lnSpc>
-              <a:spcBef>
-                <a:spcPct val="20000"/>
-              </a:spcBef>
-              <a:spcAft>
-                <a:spcPts val="0"/>
-              </a:spcAft>
-              <a:buClrTx/>
-              <a:buSzTx/>
-              <a:buFont typeface="Arial" pitchFamily="34" charset="0"/>
-              <a:buNone/>
-              <a:tabLst/>
-              <a:defRPr/>
-            </a:pPr>
-            <a:r>
-              <a:rPr lang="en-US" sz="3200" dirty="0" smtClean="0"/>
-              <a:t>__restrict__</a:t>
-            </a:r>
-            <a:endParaRPr kumimoji="0" lang="en-US" sz="3200" b="0" i="0" u="none" strike="noStrike" kern="1200" cap="none" spc="0" normalizeH="0" baseline="0" noProof="0" dirty="0" smtClean="0">
-              <a:ln>
-                <a:noFill/>
-              </a:ln>
-              <a:solidFill>
-                <a:schemeClr val="tx1"/>
-              </a:solidFill>
-              <a:effectLst/>
-              <a:uLnTx/>
-              <a:uFillTx/>
-              <a:latin typeface="+mn-lt"/>
-              <a:ea typeface="+mn-ea"/>
-              <a:cs typeface="+mn-cs"/>
-            </a:endParaRPr>
-          </a:p>
-          <a:p>
-            <a:pPr marL="342900" indent="-342900" algn="ctr">
-              <a:spcBef>
-                <a:spcPct val="20000"/>
-              </a:spcBef>
-            </a:pPr>
-            <a:r>
-              <a:rPr lang="en-US" sz="3200" dirty="0" smtClean="0"/>
-              <a:t>__</a:t>
-            </a:r>
-            <a:r>
-              <a:rPr lang="en-US" sz="3200" dirty="0" err="1" smtClean="0"/>
-              <a:t>syncthreads</a:t>
-            </a:r>
-            <a:r>
-              <a:rPr lang="en-US" sz="3200" dirty="0" smtClean="0"/>
-              <a:t>() should be called __</a:t>
-            </a:r>
-            <a:r>
-              <a:rPr lang="en-US" sz="3200" dirty="0" err="1" smtClean="0"/>
-              <a:t>syncwarps</a:t>
-            </a:r>
-            <a:r>
-              <a:rPr lang="en-US" sz="3200" dirty="0" smtClean="0"/>
-              <a:t>()</a:t>
-            </a:r>
-            <a:endParaRPr lang="en-US" sz="3200" dirty="0" smtClean="0"/>
-          </a:p>
-        </p:txBody>
-      </p:sp>
-    </p:spTree>
-  </p:cSld>
-  <p:clrMapOvr>
-    <a:masterClrMapping/>
-  </p:clrMapOvr>
-  <p:timing>
-    <p:tnLst>
-      <p:par>
-        <p:cTn id="1" dur="indefinite" restart="never" nodeType="tmRoot">
-          <p:childTnLst>
-            <p:seq concurrent="1" nextAc="seek">
-              <p:cTn id="2" dur="indefinite" nodeType="mainSeq">
-                <p:childTnLst>
-                  <p:par>
-                    <p:cTn id="3" fill="hold">
-                      <p:stCondLst>
-                        <p:cond delay="indefinite"/>
-                      </p:stCondLst>
-                      <p:childTnLst>
-                        <p:par>
-                          <p:cTn id="4" fill="hold">
-                            <p:stCondLst>
-                              <p:cond delay="0"/>
-                            </p:stCondLst>
-                            <p:childTnLst>
-                              <p:par>
-                                <p:cTn id="5" presetID="10" presetClass="entr" presetSubtype="0" fill="hold" grpId="0" nodeType="clickEffect">
-                                  <p:stCondLst>
-                                    <p:cond delay="0"/>
-                                  </p:stCondLst>
-                                  <p:childTnLst>
-                                    <p:set>
-                                      <p:cBhvr>
-                                        <p:cTn id="6" dur="1" fill="hold">
-                                          <p:stCondLst>
-                                            <p:cond delay="0"/>
-                                          </p:stCondLst>
-                                        </p:cTn>
-                                        <p:tgtEl>
-                                          <p:spTgt spid="4">
-                                            <p:txEl>
-                                              <p:pRg st="0" end="0"/>
-                                            </p:txEl>
-                                          </p:spTgt>
-                                        </p:tgtEl>
-                                        <p:attrNameLst>
-                                          <p:attrName>style.visibility</p:attrName>
-                                        </p:attrNameLst>
-                                      </p:cBhvr>
-                                      <p:to>
-                                        <p:strVal val="visible"/>
-                                      </p:to>
-                                    </p:set>
-                                    <p:animEffect transition="in" filter="fade">
-                                      <p:cBhvr>
-                                        <p:cTn id="7" dur="500"/>
-                                        <p:tgtEl>
-                                          <p:spTgt spid="4">
-                                            <p:txEl>
-                                              <p:pRg st="0" end="0"/>
-                                            </p:txEl>
-                                          </p:spTgt>
-                                        </p:tgtEl>
-                                      </p:cBhvr>
-                                    </p:animEffect>
-                                  </p:childTnLst>
-                                </p:cTn>
-                              </p:par>
-                            </p:childTnLst>
-                          </p:cTn>
-                        </p:par>
-                      </p:childTnLst>
-                    </p:cTn>
-                  </p:par>
-                  <p:par>
-                    <p:cTn id="8" fill="hold">
-                      <p:stCondLst>
-                        <p:cond delay="indefinite"/>
-                      </p:stCondLst>
-                      <p:childTnLst>
-                        <p:par>
-                          <p:cTn id="9" fill="hold">
-                            <p:stCondLst>
-                              <p:cond delay="0"/>
-                            </p:stCondLst>
-                            <p:childTnLst>
-                              <p:par>
-                                <p:cTn id="10" presetID="10" presetClass="entr" presetSubtype="0" fill="hold" grpId="0" nodeType="clickEffect">
-                                  <p:stCondLst>
-                                    <p:cond delay="0"/>
-                                  </p:stCondLst>
-                                  <p:childTnLst>
-                                    <p:set>
-                                      <p:cBhvr>
-                                        <p:cTn id="11" dur="1" fill="hold">
-                                          <p:stCondLst>
-                                            <p:cond delay="0"/>
-                                          </p:stCondLst>
-                                        </p:cTn>
-                                        <p:tgtEl>
-                                          <p:spTgt spid="4">
-                                            <p:txEl>
-                                              <p:pRg st="1" end="1"/>
-                                            </p:txEl>
-                                          </p:spTgt>
-                                        </p:tgtEl>
-                                        <p:attrNameLst>
-                                          <p:attrName>style.visibility</p:attrName>
-                                        </p:attrNameLst>
-                                      </p:cBhvr>
-                                      <p:to>
-                                        <p:strVal val="visible"/>
-                                      </p:to>
-                                    </p:set>
-                                    <p:animEffect transition="in" filter="fade">
-                                      <p:cBhvr>
-                                        <p:cTn id="12" dur="500"/>
-                                        <p:tgtEl>
-                                          <p:spTgt spid="4">
-                                            <p:txEl>
-                                              <p:pRg st="1" end="1"/>
-                                            </p:txEl>
-                                          </p:spTgt>
-                                        </p:tgtEl>
-                                      </p:cBhvr>
-                                    </p:animEffect>
-                                  </p:childTnLst>
-                                </p:cTn>
-                              </p:par>
-                            </p:childTnLst>
-                          </p:cTn>
-                        </p:par>
-                      </p:childTnLst>
-                    </p:cTn>
-                  </p:par>
-                  <p:par>
-                    <p:cTn id="13" fill="hold">
-                      <p:stCondLst>
-                        <p:cond delay="indefinite"/>
-                      </p:stCondLst>
-                      <p:childTnLst>
-                        <p:par>
-                          <p:cTn id="14" fill="hold">
-                            <p:stCondLst>
-                              <p:cond delay="0"/>
-                            </p:stCondLst>
-                            <p:childTnLst>
-                              <p:par>
-                                <p:cTn id="15" presetID="10" presetClass="entr" presetSubtype="0" fill="hold" grpId="0" nodeType="clickEffect">
-                                  <p:stCondLst>
-                                    <p:cond delay="0"/>
-                                  </p:stCondLst>
-                                  <p:childTnLst>
-                                    <p:set>
-                                      <p:cBhvr>
-                                        <p:cTn id="16" dur="1" fill="hold">
-                                          <p:stCondLst>
-                                            <p:cond delay="0"/>
-                                          </p:stCondLst>
-                                        </p:cTn>
-                                        <p:tgtEl>
-                                          <p:spTgt spid="4">
-                                            <p:txEl>
-                                              <p:pRg st="2" end="2"/>
-                                            </p:txEl>
-                                          </p:spTgt>
-                                        </p:tgtEl>
-                                        <p:attrNameLst>
-                                          <p:attrName>style.visibility</p:attrName>
-                                        </p:attrNameLst>
-                                      </p:cBhvr>
-                                      <p:to>
-                                        <p:strVal val="visible"/>
-                                      </p:to>
-                                    </p:set>
-                                    <p:animEffect transition="in" filter="fade">
-                                      <p:cBhvr>
-                                        <p:cTn id="17" dur="500"/>
-                                        <p:tgtEl>
-                                          <p:spTgt spid="4">
-                                            <p:txEl>
-                                              <p:pRg st="2" end="2"/>
-                                            </p:txEl>
-                                          </p:spTgt>
-                                        </p:tgtEl>
-                                      </p:cBhvr>
-                                    </p:animEffect>
-                                  </p:childTnLst>
-                                </p:cTn>
-                              </p:par>
-                            </p:childTnLst>
-                          </p:cTn>
-                        </p:par>
-                      </p:childTnLst>
-                    </p:cTn>
-                  </p:par>
-                </p:childTnLst>
-              </p:cTn>
-              <p:prevCondLst>
-                <p:cond evt="onPrev" delay="0">
-                  <p:tgtEl>
-                    <p:sldTgt/>
-                  </p:tgtEl>
-                </p:cond>
-              </p:prevCondLst>
-              <p:nextCondLst>
-                <p:cond evt="onNext" delay="0">
-                  <p:tgtEl>
-                    <p:sldTgt/>
-                  </p:tgtEl>
-                </p:cond>
-              </p:nextCondLst>
-            </p:seq>
-          </p:childTnLst>
-        </p:cTn>
-      </p:par>
-    </p:tnLst>
-    <p:bldLst>
-      <p:bldP spid="4" grpId="0" build="p"/>
-    </p:bldLst>
-  </p:timing>
-</p:sld>
-</file>
-
-<file path=ppt/slides/slide13.xml><?xml version="1.0" encoding="utf-8"?>
-<p:sld xmlns:a="http://schemas.openxmlformats.org/drawingml/2006/main" xmlns:r="http://schemas.openxmlformats.org/officeDocument/2006/relationships" xmlns:p="http://schemas.openxmlformats.org/presentationml/2006/main">
-  <p:cSld>
-    <p:spTree>
-      <p:nvGrpSpPr>
-        <p:cNvPr id="1" name=""/>
-        <p:cNvGrpSpPr/>
-        <p:nvPr/>
-      </p:nvGrpSpPr>
-      <p:grpSpPr>
-        <a:xfrm>
-          <a:off x="0" y="0"/>
-          <a:ext cx="0" cy="0"/>
-          <a:chOff x="0" y="0"/>
-          <a:chExt cx="0" cy="0"/>
-        </a:xfrm>
-      </p:grpSpPr>
-      <p:sp>
-        <p:nvSpPr>
-          <p:cNvPr id="2" name="Title 1"/>
-          <p:cNvSpPr>
-            <a:spLocks noGrp="1"/>
-          </p:cNvSpPr>
-          <p:nvPr>
-            <p:ph type="title"/>
-          </p:nvPr>
-        </p:nvSpPr>
-        <p:spPr/>
-        <p:txBody>
-          <a:bodyPr/>
-          <a:lstStyle/>
-          <a:p>
-            <a:r>
-              <a:rPr lang="en-US" dirty="0" smtClean="0"/>
-              <a:t>Lessons learned</a:t>
-            </a:r>
-            <a:endParaRPr lang="en-US" dirty="0"/>
-          </a:p>
-        </p:txBody>
-      </p:sp>
-      <p:sp>
-        <p:nvSpPr>
-          <p:cNvPr id="3" name="Content Placeholder 2"/>
-          <p:cNvSpPr>
-            <a:spLocks noGrp="1"/>
-          </p:cNvSpPr>
-          <p:nvPr>
-            <p:ph idx="1"/>
-          </p:nvPr>
-        </p:nvSpPr>
-        <p:spPr/>
-        <p:txBody>
-          <a:bodyPr/>
-          <a:lstStyle/>
-          <a:p>
-            <a:endParaRPr lang="en-US" dirty="0"/>
-          </a:p>
-        </p:txBody>
-      </p:sp>
-    </p:spTree>
-  </p:cSld>
-  <p:clrMapOvr>
-    <a:masterClrMapping/>
-  </p:clrMapOvr>
-  <p:timing>
-    <p:tnLst>
-      <p:par>
-        <p:cTn id="1" dur="indefinite" restart="never" nodeType="tmRoot"/>
-      </p:par>
-    </p:tnLst>
-  </p:timing>
-</p:sld>
-</file>
-
-<file path=ppt/slides/slide14.xml><?xml version="1.0" encoding="utf-8"?>
-<p:sld xmlns:a="http://schemas.openxmlformats.org/drawingml/2006/main" xmlns:r="http://schemas.openxmlformats.org/officeDocument/2006/relationships" xmlns:p="http://schemas.openxmlformats.org/presentationml/2006/main">
-  <p:cSld>
-    <p:spTree>
-      <p:nvGrpSpPr>
-        <p:cNvPr id="1" name=""/>
-        <p:cNvGrpSpPr/>
-        <p:nvPr/>
-      </p:nvGrpSpPr>
-      <p:grpSpPr>
-        <a:xfrm>
-          <a:off x="0" y="0"/>
-          <a:ext cx="0" cy="0"/>
-          <a:chOff x="0" y="0"/>
-          <a:chExt cx="0" cy="0"/>
-        </a:xfrm>
-      </p:grpSpPr>
-      <p:sp>
-        <p:nvSpPr>
-          <p:cNvPr id="2" name="Title 1"/>
-          <p:cNvSpPr>
-            <a:spLocks noGrp="1"/>
-          </p:cNvSpPr>
-          <p:nvPr>
-            <p:ph type="title"/>
-          </p:nvPr>
-        </p:nvSpPr>
-        <p:spPr/>
-        <p:txBody>
-          <a:bodyPr/>
-          <a:lstStyle/>
-          <a:p>
-            <a:endParaRPr lang="en-US" dirty="0"/>
-          </a:p>
-        </p:txBody>
-      </p:sp>
-      <p:sp>
-        <p:nvSpPr>
-          <p:cNvPr id="3" name="Content Placeholder 2"/>
-          <p:cNvSpPr>
-            <a:spLocks noGrp="1"/>
-          </p:cNvSpPr>
-          <p:nvPr>
-            <p:ph idx="1"/>
-          </p:nvPr>
-        </p:nvSpPr>
-        <p:spPr>
-          <a:xfrm>
-            <a:off x="457200" y="1600200"/>
-            <a:ext cx="8229600" cy="4525963"/>
-          </a:xfrm>
-        </p:spPr>
-        <p:txBody>
-          <a:bodyPr anchor="ctr">
-            <a:normAutofit/>
-          </a:bodyPr>
-          <a:lstStyle/>
-          <a:p>
-            <a:pPr algn="ctr">
-              <a:buNone/>
-            </a:pPr>
-            <a:r>
-              <a:rPr lang="en-US" sz="6000" dirty="0" smtClean="0"/>
-              <a:t>Thank You!</a:t>
-            </a:r>
-            <a:endParaRPr lang="en-US" sz="6000" dirty="0"/>
-          </a:p>
-        </p:txBody>
-      </p:sp>
-    </p:spTree>
-  </p:cSld>
-  <p:clrMapOvr>
-    <a:masterClrMapping/>
-  </p:clrMapOvr>
-  <p:timing>
-    <p:tnLst>
-      <p:par>
-        <p:cTn id="1" dur="indefinite" restart="never" nodeType="tmRoot"/>
-      </p:par>
-    </p:tnLst>
-  </p:timing>
-</p:sld>
-</file>
-
-<file path=ppt/slides/slide2.xml><?xml version="1.0" encoding="utf-8"?>
-<p:sld xmlns:a="http://schemas.openxmlformats.org/drawingml/2006/main" xmlns:r="http://schemas.openxmlformats.org/officeDocument/2006/relationships" xmlns:p="http://schemas.openxmlformats.org/presentationml/2006/main">
-  <p:cSld>
-    <p:spTree>
-      <p:nvGrpSpPr>
-        <p:cNvPr id="1" name=""/>
-        <p:cNvGrpSpPr/>
-        <p:nvPr/>
-      </p:nvGrpSpPr>
-      <p:grpSpPr>
-        <a:xfrm>
-          <a:off x="0" y="0"/>
-          <a:ext cx="0" cy="0"/>
-          <a:chOff x="0" y="0"/>
-          <a:chExt cx="0" cy="0"/>
-        </a:xfrm>
-      </p:grpSpPr>
-      <p:sp>
-        <p:nvSpPr>
-          <p:cNvPr id="2" name="Title 1"/>
-          <p:cNvSpPr>
-            <a:spLocks noGrp="1"/>
-          </p:cNvSpPr>
-          <p:nvPr>
-            <p:ph type="title"/>
-          </p:nvPr>
-        </p:nvSpPr>
-        <p:spPr/>
-        <p:txBody>
-          <a:bodyPr/>
-          <a:lstStyle/>
-          <a:p>
-            <a:r>
-              <a:rPr lang="en-US" dirty="0" smtClean="0"/>
-              <a:t>Molecule Interactions</a:t>
-            </a:r>
-            <a:endParaRPr lang="en-US" dirty="0"/>
-          </a:p>
-        </p:txBody>
-      </p:sp>
-      <p:sp>
-        <p:nvSpPr>
-          <p:cNvPr id="3" name="Content Placeholder 2"/>
-          <p:cNvSpPr>
-            <a:spLocks noGrp="1"/>
-          </p:cNvSpPr>
-          <p:nvPr>
-            <p:ph idx="1"/>
-          </p:nvPr>
-        </p:nvSpPr>
-        <p:spPr/>
-        <p:txBody>
-          <a:bodyPr>
-            <a:normAutofit/>
-          </a:bodyPr>
-          <a:lstStyle/>
-          <a:p>
-            <a:endParaRPr lang="en-US" dirty="0" smtClean="0"/>
-          </a:p>
-          <a:p>
-            <a:endParaRPr lang="en-US" dirty="0"/>
-          </a:p>
-        </p:txBody>
-      </p:sp>
-    </p:spTree>
-  </p:cSld>
-  <p:clrMapOvr>
-    <a:masterClrMapping/>
-  </p:clrMapOvr>
-  <p:timing>
-    <p:tnLst>
-      <p:par>
-        <p:cTn id="1" dur="indefinite" restart="never" nodeType="tmRoot"/>
-      </p:par>
-    </p:tnLst>
-  </p:timing>
-</p:sld>
-</file>
-
-<file path=ppt/slides/slide3.xml><?xml version="1.0" encoding="utf-8"?>
-<p:sld xmlns:a="http://schemas.openxmlformats.org/drawingml/2006/main" xmlns:r="http://schemas.openxmlformats.org/officeDocument/2006/relationships" xmlns:p="http://schemas.openxmlformats.org/presentationml/2006/main">
-  <p:cSld>
-    <p:spTree>
-      <p:nvGrpSpPr>
-        <p:cNvPr id="1" name=""/>
-        <p:cNvGrpSpPr/>
-        <p:nvPr/>
-      </p:nvGrpSpPr>
-      <p:grpSpPr>
-        <a:xfrm>
-          <a:off x="0" y="0"/>
-          <a:ext cx="0" cy="0"/>
-          <a:chOff x="0" y="0"/>
-          <a:chExt cx="0" cy="0"/>
-        </a:xfrm>
-      </p:grpSpPr>
-      <p:sp>
-        <p:nvSpPr>
-          <p:cNvPr id="2" name="Title 1"/>
-          <p:cNvSpPr>
-            <a:spLocks noGrp="1"/>
-          </p:cNvSpPr>
-          <p:nvPr>
-            <p:ph type="title"/>
-          </p:nvPr>
-        </p:nvSpPr>
-        <p:spPr/>
-        <p:txBody>
-          <a:bodyPr>
-            <a:normAutofit/>
-          </a:bodyPr>
-          <a:lstStyle/>
-          <a:p>
-            <a:r>
-              <a:rPr lang="en-US" dirty="0" smtClean="0"/>
-              <a:t>Modules and Dependencies</a:t>
-            </a:r>
-            <a:endParaRPr lang="en-US" dirty="0"/>
-          </a:p>
-        </p:txBody>
-      </p:sp>
-      <p:pic>
-        <p:nvPicPr>
-          <p:cNvPr id="8" name="Content Placeholder 7" descr="component_dependencies.png"/>
-          <p:cNvPicPr>
-            <a:picLocks noGrp="1" noChangeAspect="1"/>
-          </p:cNvPicPr>
-          <p:nvPr>
-            <p:ph idx="1"/>
-          </p:nvPr>
-        </p:nvPicPr>
-        <p:blipFill>
-          <a:blip r:embed="rId2" cstate="print"/>
-          <a:stretch>
-            <a:fillRect/>
-          </a:stretch>
-        </p:blipFill>
-        <p:spPr>
-          <a:xfrm>
-            <a:off x="28641" y="1295400"/>
-            <a:ext cx="9086718" cy="5411191"/>
-          </a:xfrm>
-        </p:spPr>
-      </p:pic>
-    </p:spTree>
-  </p:cSld>
-  <p:clrMapOvr>
-    <a:masterClrMapping/>
-  </p:clrMapOvr>
-  <p:timing>
-    <p:tnLst>
-      <p:par>
-        <p:cTn id="1" dur="indefinite" restart="never" nodeType="tmRoot"/>
-      </p:par>
-    </p:tnLst>
-  </p:timing>
-</p:sld>
-</file>
-
-<file path=ppt/slides/slide4.xml><?xml version="1.0" encoding="utf-8"?>
-<p:sld xmlns:a="http://schemas.openxmlformats.org/drawingml/2006/main" xmlns:r="http://schemas.openxmlformats.org/officeDocument/2006/relationships" xmlns:p="http://schemas.openxmlformats.org/presentationml/2006/main">
-  <p:cSld>
-    <p:spTree>
-      <p:nvGrpSpPr>
-        <p:cNvPr id="1" name=""/>
-        <p:cNvGrpSpPr/>
-        <p:nvPr/>
-      </p:nvGrpSpPr>
-      <p:grpSpPr>
-        <a:xfrm>
-          <a:off x="0" y="0"/>
-          <a:ext cx="0" cy="0"/>
-          <a:chOff x="0" y="0"/>
-          <a:chExt cx="0" cy="0"/>
-        </a:xfrm>
-      </p:grpSpPr>
-      <p:sp>
-        <p:nvSpPr>
-          <p:cNvPr id="2" name="Title 1"/>
-          <p:cNvSpPr>
-            <a:spLocks noGrp="1"/>
-          </p:cNvSpPr>
-          <p:nvPr>
-            <p:ph type="title"/>
-          </p:nvPr>
-        </p:nvSpPr>
-        <p:spPr/>
-        <p:txBody>
-          <a:bodyPr/>
-          <a:lstStyle/>
-          <a:p>
-            <a:r>
-              <a:rPr lang="en-US" dirty="0" smtClean="0"/>
-              <a:t>CUDA Architecture</a:t>
-            </a:r>
-            <a:endParaRPr lang="en-US" dirty="0"/>
-          </a:p>
-        </p:txBody>
-      </p:sp>
-      <p:sp>
-        <p:nvSpPr>
-          <p:cNvPr id="3" name="Content Placeholder 2"/>
-          <p:cNvSpPr>
-            <a:spLocks noGrp="1"/>
-          </p:cNvSpPr>
-          <p:nvPr>
-            <p:ph idx="1"/>
-          </p:nvPr>
-        </p:nvSpPr>
-        <p:spPr/>
-        <p:txBody>
-          <a:bodyPr/>
-          <a:lstStyle/>
-          <a:p>
-            <a:endParaRPr lang="en-US"/>
-          </a:p>
-        </p:txBody>
-      </p:sp>
-    </p:spTree>
-  </p:cSld>
-  <p:clrMapOvr>
-    <a:masterClrMapping/>
-  </p:clrMapOvr>
-  <p:timing>
-    <p:tnLst>
-      <p:par>
-        <p:cTn id="1" dur="indefinite" restart="never" nodeType="tmRoot"/>
-      </p:par>
-    </p:tnLst>
-  </p:timing>
-</p:sld>
-</file>
-
-<file path=ppt/slides/slide5.xml><?xml version="1.0" encoding="utf-8"?>
-<p:sld xmlns:a="http://schemas.openxmlformats.org/drawingml/2006/main" xmlns:r="http://schemas.openxmlformats.org/officeDocument/2006/relationships" xmlns:p="http://schemas.openxmlformats.org/presentationml/2006/main">
-  <p:cSld>
-    <p:spTree>
-      <p:nvGrpSpPr>
-        <p:cNvPr id="1" name=""/>
-        <p:cNvGrpSpPr/>
-        <p:nvPr/>
-      </p:nvGrpSpPr>
-      <p:grpSpPr>
-        <a:xfrm>
-          <a:off x="0" y="0"/>
-          <a:ext cx="0" cy="0"/>
-          <a:chOff x="0" y="0"/>
-          <a:chExt cx="0" cy="0"/>
-        </a:xfrm>
-      </p:grpSpPr>
-      <p:sp>
-        <p:nvSpPr>
-          <p:cNvPr id="2" name="Title 1"/>
-          <p:cNvSpPr>
-            <a:spLocks noGrp="1"/>
-          </p:cNvSpPr>
-          <p:nvPr>
-            <p:ph type="title"/>
-          </p:nvPr>
-        </p:nvSpPr>
-        <p:spPr/>
-        <p:txBody>
-          <a:bodyPr/>
-          <a:lstStyle/>
-          <a:p>
-            <a:r>
-              <a:rPr lang="en-US" dirty="0" smtClean="0"/>
-              <a:t>Performance (lj2d1)</a:t>
-            </a:r>
-            <a:endParaRPr lang="en-US" dirty="0"/>
-          </a:p>
-        </p:txBody>
-      </p:sp>
-      <p:graphicFrame>
-        <p:nvGraphicFramePr>
-          <p:cNvPr id="7" name="Content Placeholder 3"/>
-          <p:cNvGraphicFramePr>
-            <a:graphicFrameLocks noGrp="1"/>
-          </p:cNvGraphicFramePr>
-          <p:nvPr/>
-        </p:nvGraphicFramePr>
-        <p:xfrm>
-          <a:off x="0" y="1805957"/>
-          <a:ext cx="9186176" cy="5052043"/>
-        </p:xfrm>
-        <a:graphic>
-          <a:graphicData uri="http://schemas.openxmlformats.org/drawingml/2006/chart">
-            <c:chart xmlns:c="http://schemas.openxmlformats.org/drawingml/2006/chart" xmlns:r="http://schemas.openxmlformats.org/officeDocument/2006/relationships" r:id="rId3"/>
-          </a:graphicData>
-        </a:graphic>
-      </p:graphicFrame>
-    </p:spTree>
-  </p:cSld>
-  <p:clrMapOvr>
-    <a:masterClrMapping/>
-  </p:clrMapOvr>
-  <p:timing>
-    <p:tnLst>
-      <p:par>
-        <p:cTn id="1" dur="indefinite" restart="never" nodeType="tmRoot"/>
-      </p:par>
-    </p:tnLst>
-  </p:timing>
-</p:sld>
-</file>
-
-<file path=ppt/slides/slide6.xml><?xml version="1.0" encoding="utf-8"?>
-<p:sld xmlns:a="http://schemas.openxmlformats.org/drawingml/2006/main" xmlns:r="http://schemas.openxmlformats.org/officeDocument/2006/relationships" xmlns:p="http://schemas.openxmlformats.org/presentationml/2006/main">
-  <p:cSld>
-    <p:spTree>
-      <p:nvGrpSpPr>
-        <p:cNvPr id="1" name=""/>
-        <p:cNvGrpSpPr/>
-        <p:nvPr/>
-      </p:nvGrpSpPr>
-      <p:grpSpPr>
-        <a:xfrm>
-          <a:off x="0" y="0"/>
-          <a:ext cx="0" cy="0"/>
-          <a:chOff x="0" y="0"/>
-          <a:chExt cx="0" cy="0"/>
-        </a:xfrm>
-      </p:grpSpPr>
-      <p:sp>
-        <p:nvSpPr>
-          <p:cNvPr id="2" name="Title 1"/>
-          <p:cNvSpPr>
-            <a:spLocks noGrp="1"/>
-          </p:cNvSpPr>
-          <p:nvPr>
-            <p:ph type="title"/>
-          </p:nvPr>
-        </p:nvSpPr>
-        <p:spPr/>
-        <p:txBody>
-          <a:bodyPr/>
-          <a:lstStyle/>
-          <a:p>
-            <a:r>
-              <a:rPr lang="en-US" dirty="0" smtClean="0"/>
-              <a:t>Performance (lj1)</a:t>
-            </a:r>
-            <a:endParaRPr lang="en-US" dirty="0"/>
-          </a:p>
-        </p:txBody>
-      </p:sp>
-      <p:graphicFrame>
-        <p:nvGraphicFramePr>
-          <p:cNvPr id="7" name="Content Placeholder 6"/>
-          <p:cNvGraphicFramePr>
-            <a:graphicFrameLocks noGrp="1"/>
-          </p:cNvGraphicFramePr>
-          <p:nvPr>
-            <p:ph idx="1"/>
-          </p:nvPr>
-        </p:nvGraphicFramePr>
-        <p:xfrm>
-          <a:off x="-320" y="1600200"/>
-          <a:ext cx="9144640" cy="5029200"/>
-        </p:xfrm>
-        <a:graphic>
-          <a:graphicData uri="http://schemas.openxmlformats.org/drawingml/2006/chart">
-            <c:chart xmlns:c="http://schemas.openxmlformats.org/drawingml/2006/chart" xmlns:r="http://schemas.openxmlformats.org/officeDocument/2006/relationships" r:id="rId3"/>
-          </a:graphicData>
-        </a:graphic>
-      </p:graphicFrame>
-    </p:spTree>
-  </p:cSld>
-  <p:clrMapOvr>
-    <a:masterClrMapping/>
-  </p:clrMapOvr>
-  <p:timing>
-    <p:tnLst>
-      <p:par>
-        <p:cTn id="1" dur="indefinite" restart="never" nodeType="tmRoot"/>
-      </p:par>
-    </p:tnLst>
-  </p:timing>
-</p:sld>
-</file>
-
-<file path=ppt/slides/slide7.xml><?xml version="1.0" encoding="utf-8"?>
-<p:sld xmlns:a="http://schemas.openxmlformats.org/drawingml/2006/main" xmlns:r="http://schemas.openxmlformats.org/officeDocument/2006/relationships" xmlns:p="http://schemas.openxmlformats.org/presentationml/2006/main">
-  <p:cSld>
-    <p:spTree>
-      <p:nvGrpSpPr>
-        <p:cNvPr id="1" name=""/>
-        <p:cNvGrpSpPr/>
-        <p:nvPr/>
-      </p:nvGrpSpPr>
-      <p:grpSpPr>
-        <a:xfrm>
-          <a:off x="0" y="0"/>
-          <a:ext cx="0" cy="0"/>
-          <a:chOff x="0" y="0"/>
-          <a:chExt cx="0" cy="0"/>
-        </a:xfrm>
-      </p:grpSpPr>
-      <p:sp>
-        <p:nvSpPr>
-          <p:cNvPr id="2" name="Title 1"/>
-          <p:cNvSpPr>
-            <a:spLocks noGrp="1"/>
-          </p:cNvSpPr>
-          <p:nvPr>
-            <p:ph type="title"/>
-          </p:nvPr>
-        </p:nvSpPr>
-        <p:spPr>
-          <a:xfrm>
-            <a:off x="457200" y="274638"/>
-            <a:ext cx="8229600" cy="563562"/>
-          </a:xfrm>
-        </p:spPr>
-        <p:txBody>
-          <a:bodyPr>
-            <a:normAutofit fontScale="90000"/>
-          </a:bodyPr>
-          <a:lstStyle/>
-          <a:p>
-            <a:r>
-              <a:rPr lang="en-US" dirty="0" smtClean="0"/>
-              <a:t>Thread Block Cell Processor</a:t>
-            </a:r>
-            <a:endParaRPr lang="en-US" dirty="0"/>
-          </a:p>
-        </p:txBody>
-      </p:sp>
-      <p:pic>
-        <p:nvPicPr>
-          <p:cNvPr id="4" name="Content Placeholder 3" descr="cellprocessor_block_iteration.png"/>
-          <p:cNvPicPr>
-            <a:picLocks noGrp="1" noChangeAspect="1"/>
-          </p:cNvPicPr>
-          <p:nvPr>
-            <p:ph idx="1"/>
-          </p:nvPr>
-        </p:nvPicPr>
-        <p:blipFill>
-          <a:blip r:embed="rId3" cstate="print"/>
-          <a:stretch>
-            <a:fillRect/>
-          </a:stretch>
-        </p:blipFill>
-        <p:spPr>
-          <a:xfrm>
-            <a:off x="1562100" y="815181"/>
-            <a:ext cx="6019800" cy="6019800"/>
-          </a:xfrm>
-        </p:spPr>
-      </p:pic>
-    </p:spTree>
-  </p:cSld>
-  <p:clrMapOvr>
-    <a:masterClrMapping/>
-  </p:clrMapOvr>
-  <p:timing>
-    <p:tnLst>
-      <p:par>
-        <p:cTn id="1" dur="indefinite" restart="never" nodeType="tmRoot"/>
-      </p:par>
-    </p:tnLst>
-  </p:timing>
-</p:sld>
-</file>
-
-<file path=ppt/slides/slide8.xml><?xml version="1.0" encoding="utf-8"?>
-<p:sld xmlns:a="http://schemas.openxmlformats.org/drawingml/2006/main" xmlns:r="http://schemas.openxmlformats.org/officeDocument/2006/relationships" xmlns:p="http://schemas.openxmlformats.org/presentationml/2006/main">
-  <p:cSld>
-    <p:spTree>
-      <p:nvGrpSpPr>
-        <p:cNvPr id="1" name=""/>
-        <p:cNvGrpSpPr/>
-        <p:nvPr/>
-      </p:nvGrpSpPr>
-      <p:grpSpPr>
-        <a:xfrm>
-          <a:off x="0" y="0"/>
-          <a:ext cx="0" cy="0"/>
-          <a:chOff x="0" y="0"/>
-          <a:chExt cx="0" cy="0"/>
-        </a:xfrm>
-      </p:grpSpPr>
-      <p:sp>
-        <p:nvSpPr>
-          <p:cNvPr id="2" name="Title 1"/>
-          <p:cNvSpPr>
-            <a:spLocks noGrp="1"/>
-          </p:cNvSpPr>
-          <p:nvPr>
-            <p:ph type="title"/>
-          </p:nvPr>
-        </p:nvSpPr>
-        <p:spPr/>
-        <p:txBody>
-          <a:bodyPr/>
-          <a:lstStyle/>
-          <a:p>
-            <a:r>
-              <a:rPr lang="en-US" dirty="0" smtClean="0"/>
-              <a:t>Warp Block Cell Processor</a:t>
-            </a:r>
-            <a:endParaRPr lang="en-US" dirty="0"/>
-          </a:p>
-        </p:txBody>
-      </p:sp>
-      <p:sp>
-        <p:nvSpPr>
-          <p:cNvPr id="3" name="Content Placeholder 2"/>
-          <p:cNvSpPr>
-            <a:spLocks noGrp="1"/>
-          </p:cNvSpPr>
-          <p:nvPr>
-            <p:ph idx="1"/>
-          </p:nvPr>
-        </p:nvSpPr>
-        <p:spPr/>
-        <p:txBody>
-          <a:bodyPr/>
-          <a:lstStyle/>
-          <a:p>
-            <a:endParaRPr lang="en-US" dirty="0" smtClean="0"/>
-          </a:p>
-          <a:p>
-            <a:endParaRPr lang="en-US" dirty="0"/>
-          </a:p>
-        </p:txBody>
-      </p:sp>
-    </p:spTree>
-  </p:cSld>
-  <p:clrMapOvr>
-    <a:masterClrMapping/>
-  </p:clrMapOvr>
-  <p:timing>
-    <p:tnLst>
-      <p:par>
-        <p:cTn id="1" dur="indefinite" restart="never" nodeType="tmRoot"/>
-      </p:par>
-    </p:tnLst>
-  </p:timing>
-</p:sld>
-</file>
-
-<file path=ppt/slides/slide9.xml><?xml version="1.0" encoding="utf-8"?>
-<p:sld xmlns:a="http://schemas.openxmlformats.org/drawingml/2006/main" xmlns:r="http://schemas.openxmlformats.org/officeDocument/2006/relationships" xmlns:p="http://schemas.openxmlformats.org/presentationml/2006/main">
-  <p:cSld>
-    <p:spTree>
-      <p:nvGrpSpPr>
-        <p:cNvPr id="1" name=""/>
-        <p:cNvGrpSpPr/>
-        <p:nvPr/>
-      </p:nvGrpSpPr>
-      <p:grpSpPr>
-        <a:xfrm>
-          <a:off x="0" y="0"/>
-          <a:ext cx="0" cy="0"/>
-          <a:chOff x="0" y="0"/>
-          <a:chExt cx="0" cy="0"/>
-        </a:xfrm>
-      </p:grpSpPr>
-      <p:sp>
-        <p:nvSpPr>
-          <p:cNvPr id="2" name="Title 1"/>
-          <p:cNvSpPr>
-            <a:spLocks noGrp="1"/>
-          </p:cNvSpPr>
-          <p:nvPr>
-            <p:ph type="title"/>
-          </p:nvPr>
-        </p:nvSpPr>
-        <p:spPr/>
-        <p:txBody>
-          <a:bodyPr/>
-          <a:lstStyle/>
-          <a:p>
-            <a:r>
-              <a:rPr lang="en-US" dirty="0" smtClean="0"/>
               <a:t>Optimizations</a:t>
             </a:r>
             <a:endParaRPr lang="en-US" dirty="0"/>
@@ -7181,6 +5910,1567 @@
             </p:seq>
           </p:childTnLst>
         </p:cTn>
+      </p:par>
+    </p:tnLst>
+  </p:timing>
+</p:sld>
+</file>
+
+<file path=ppt/slides/slide11.xml><?xml version="1.0" encoding="utf-8"?>
+<p:sld xmlns:a="http://schemas.openxmlformats.org/drawingml/2006/main" xmlns:r="http://schemas.openxmlformats.org/officeDocument/2006/relationships" xmlns:p="http://schemas.openxmlformats.org/presentationml/2006/main">
+  <p:cSld>
+    <p:spTree>
+      <p:nvGrpSpPr>
+        <p:cNvPr id="1" name=""/>
+        <p:cNvGrpSpPr/>
+        <p:nvPr/>
+      </p:nvGrpSpPr>
+      <p:grpSpPr>
+        <a:xfrm>
+          <a:off x="0" y="0"/>
+          <a:ext cx="0" cy="0"/>
+          <a:chOff x="0" y="0"/>
+          <a:chExt cx="0" cy="0"/>
+        </a:xfrm>
+      </p:grpSpPr>
+      <p:sp>
+        <p:nvSpPr>
+          <p:cNvPr id="2" name="Title 1"/>
+          <p:cNvSpPr>
+            <a:spLocks noGrp="1"/>
+          </p:cNvSpPr>
+          <p:nvPr>
+            <p:ph type="title"/>
+          </p:nvPr>
+        </p:nvSpPr>
+        <p:spPr/>
+        <p:txBody>
+          <a:bodyPr/>
+          <a:lstStyle/>
+          <a:p>
+            <a:r>
+              <a:rPr lang="en-US" dirty="0" smtClean="0"/>
+              <a:t>Implementation</a:t>
+            </a:r>
+            <a:endParaRPr lang="en-US" dirty="0"/>
+          </a:p>
+        </p:txBody>
+      </p:sp>
+      <p:pic>
+        <p:nvPicPr>
+          <p:cNvPr id="4" name="Content Placeholder 3" descr="component_architecture.png"/>
+          <p:cNvPicPr>
+            <a:picLocks noGrp="1" noChangeAspect="1"/>
+          </p:cNvPicPr>
+          <p:nvPr>
+            <p:ph idx="1"/>
+          </p:nvPr>
+        </p:nvPicPr>
+        <p:blipFill>
+          <a:blip r:embed="rId3" cstate="print"/>
+          <a:stretch>
+            <a:fillRect/>
+          </a:stretch>
+        </p:blipFill>
+        <p:spPr>
+          <a:xfrm>
+            <a:off x="244608" y="2247900"/>
+            <a:ext cx="8654784" cy="2362200"/>
+          </a:xfrm>
+        </p:spPr>
+      </p:pic>
+    </p:spTree>
+  </p:cSld>
+  <p:clrMapOvr>
+    <a:masterClrMapping/>
+  </p:clrMapOvr>
+  <p:timing>
+    <p:tnLst>
+      <p:par>
+        <p:cTn id="1" dur="indefinite" restart="never" nodeType="tmRoot"/>
+      </p:par>
+    </p:tnLst>
+  </p:timing>
+</p:sld>
+</file>
+
+<file path=ppt/slides/slide12.xml><?xml version="1.0" encoding="utf-8"?>
+<p:sld xmlns:a="http://schemas.openxmlformats.org/drawingml/2006/main" xmlns:r="http://schemas.openxmlformats.org/officeDocument/2006/relationships" xmlns:p="http://schemas.openxmlformats.org/presentationml/2006/main">
+  <p:cSld>
+    <p:spTree>
+      <p:nvGrpSpPr>
+        <p:cNvPr id="1" name=""/>
+        <p:cNvGrpSpPr/>
+        <p:nvPr/>
+      </p:nvGrpSpPr>
+      <p:grpSpPr>
+        <a:xfrm>
+          <a:off x="0" y="0"/>
+          <a:ext cx="0" cy="0"/>
+          <a:chOff x="0" y="0"/>
+          <a:chExt cx="0" cy="0"/>
+        </a:xfrm>
+      </p:grpSpPr>
+      <p:sp>
+        <p:nvSpPr>
+          <p:cNvPr id="2" name="Title 1"/>
+          <p:cNvSpPr>
+            <a:spLocks noGrp="1"/>
+          </p:cNvSpPr>
+          <p:nvPr>
+            <p:ph type="title"/>
+          </p:nvPr>
+        </p:nvSpPr>
+        <p:spPr/>
+        <p:txBody>
+          <a:bodyPr/>
+          <a:lstStyle/>
+          <a:p>
+            <a:r>
+              <a:rPr lang="en-US" dirty="0" smtClean="0"/>
+              <a:t>Implementation</a:t>
+            </a:r>
+            <a:endParaRPr lang="en-US" dirty="0"/>
+          </a:p>
+        </p:txBody>
+      </p:sp>
+      <p:sp>
+        <p:nvSpPr>
+          <p:cNvPr id="5" name="Content Placeholder 4"/>
+          <p:cNvSpPr>
+            <a:spLocks noGrp="1"/>
+          </p:cNvSpPr>
+          <p:nvPr>
+            <p:ph idx="1"/>
+          </p:nvPr>
+        </p:nvSpPr>
+        <p:spPr/>
+        <p:txBody>
+          <a:bodyPr>
+            <a:normAutofit fontScale="92500"/>
+          </a:bodyPr>
+          <a:lstStyle/>
+          <a:p>
+            <a:r>
+              <a:rPr lang="en-US" dirty="0" smtClean="0"/>
+              <a:t>Global </a:t>
+            </a:r>
+            <a:r>
+              <a:rPr lang="en-US" b="1" dirty="0" smtClean="0"/>
+              <a:t>constant </a:t>
+            </a:r>
+            <a:r>
+              <a:rPr lang="en-US" dirty="0" smtClean="0"/>
+              <a:t>variables to avoid kernel parameters</a:t>
+            </a:r>
+          </a:p>
+          <a:p>
+            <a:endParaRPr lang="en-US" dirty="0" smtClean="0"/>
+          </a:p>
+          <a:p>
+            <a:r>
+              <a:rPr lang="en-US" dirty="0" smtClean="0"/>
+              <a:t>Heavy use of </a:t>
+            </a:r>
+            <a:r>
+              <a:rPr lang="en-US" b="1" dirty="0" smtClean="0"/>
+              <a:t>template</a:t>
+            </a:r>
+            <a:r>
+              <a:rPr lang="en-US" dirty="0" smtClean="0"/>
+              <a:t> parameters to link modules together and keep things </a:t>
+            </a:r>
+            <a:r>
+              <a:rPr lang="en-US" dirty="0" err="1" smtClean="0"/>
+              <a:t>interchangable</a:t>
+            </a:r>
+            <a:endParaRPr lang="en-US" dirty="0" smtClean="0"/>
+          </a:p>
+          <a:p>
+            <a:r>
+              <a:rPr lang="en-US" b="1" dirty="0" smtClean="0"/>
+              <a:t>CUDA/C</a:t>
+            </a:r>
+            <a:r>
+              <a:rPr lang="en-US" b="1" dirty="0" smtClean="0"/>
+              <a:t>++ still sucks for fast, modular code</a:t>
+            </a:r>
+          </a:p>
+          <a:p>
+            <a:endParaRPr lang="en-US" dirty="0" smtClean="0"/>
+          </a:p>
+          <a:p>
+            <a:r>
+              <a:rPr lang="en-US" dirty="0" smtClean="0"/>
+              <a:t>3 source code iterations during the project</a:t>
+            </a:r>
+          </a:p>
+          <a:p>
+            <a:endParaRPr lang="en-US" dirty="0"/>
+          </a:p>
+        </p:txBody>
+      </p:sp>
+    </p:spTree>
+  </p:cSld>
+  <p:clrMapOvr>
+    <a:masterClrMapping/>
+  </p:clrMapOvr>
+  <p:timing>
+    <p:tnLst>
+      <p:par>
+        <p:cTn id="1" dur="indefinite" restart="never" nodeType="tmRoot"/>
+      </p:par>
+    </p:tnLst>
+  </p:timing>
+</p:sld>
+</file>
+
+<file path=ppt/slides/slide13.xml><?xml version="1.0" encoding="utf-8"?>
+<p:sld xmlns:a="http://schemas.openxmlformats.org/drawingml/2006/main" xmlns:r="http://schemas.openxmlformats.org/officeDocument/2006/relationships" xmlns:p="http://schemas.openxmlformats.org/presentationml/2006/main">
+  <p:cSld>
+    <p:spTree>
+      <p:nvGrpSpPr>
+        <p:cNvPr id="1" name=""/>
+        <p:cNvGrpSpPr/>
+        <p:nvPr/>
+      </p:nvGrpSpPr>
+      <p:grpSpPr>
+        <a:xfrm>
+          <a:off x="0" y="0"/>
+          <a:ext cx="0" cy="0"/>
+          <a:chOff x="0" y="0"/>
+          <a:chExt cx="0" cy="0"/>
+        </a:xfrm>
+      </p:grpSpPr>
+      <p:sp>
+        <p:nvSpPr>
+          <p:cNvPr id="2" name="Title 1"/>
+          <p:cNvSpPr>
+            <a:spLocks noGrp="1"/>
+          </p:cNvSpPr>
+          <p:nvPr>
+            <p:ph type="title"/>
+          </p:nvPr>
+        </p:nvSpPr>
+        <p:spPr/>
+        <p:txBody>
+          <a:bodyPr>
+            <a:normAutofit/>
+          </a:bodyPr>
+          <a:lstStyle/>
+          <a:p>
+            <a:r>
+              <a:rPr lang="en-US" dirty="0" smtClean="0"/>
+              <a:t>Interesting Papers</a:t>
+            </a:r>
+            <a:endParaRPr lang="en-US" dirty="0"/>
+          </a:p>
+        </p:txBody>
+      </p:sp>
+      <p:sp>
+        <p:nvSpPr>
+          <p:cNvPr id="3" name="Content Placeholder 2"/>
+          <p:cNvSpPr>
+            <a:spLocks noGrp="1"/>
+          </p:cNvSpPr>
+          <p:nvPr>
+            <p:ph idx="1"/>
+          </p:nvPr>
+        </p:nvSpPr>
+        <p:spPr/>
+        <p:txBody>
+          <a:bodyPr>
+            <a:normAutofit fontScale="92500" lnSpcReduction="10000"/>
+          </a:bodyPr>
+          <a:lstStyle/>
+          <a:p>
+            <a:r>
+              <a:rPr lang="en-US" dirty="0" smtClean="0"/>
+              <a:t>Better performance at lower occupancy</a:t>
+            </a:r>
+            <a:br>
+              <a:rPr lang="en-US" dirty="0" smtClean="0"/>
+            </a:br>
+            <a:r>
+              <a:rPr lang="en-US" dirty="0" smtClean="0">
+                <a:hlinkClick r:id="rId2"/>
+              </a:rPr>
+              <a:t>http://www.cs.berkeley.edu/~volkov/volkov10-GTC.pdf</a:t>
+            </a:r>
+            <a:endParaRPr lang="en-US" dirty="0" smtClean="0"/>
+          </a:p>
+          <a:p>
+            <a:r>
+              <a:rPr lang="en-US" dirty="0" smtClean="0"/>
+              <a:t>Demystifying GPU </a:t>
+            </a:r>
+            <a:r>
+              <a:rPr lang="en-US" dirty="0" err="1" smtClean="0"/>
+              <a:t>microarchitecture</a:t>
+            </a:r>
+            <a:r>
+              <a:rPr lang="en-US" dirty="0" smtClean="0"/>
+              <a:t> through </a:t>
+            </a:r>
+            <a:r>
+              <a:rPr lang="en-US" dirty="0" err="1" smtClean="0"/>
+              <a:t>microbenchmarking</a:t>
+            </a:r>
+            <a:r>
+              <a:rPr lang="en-US" dirty="0" smtClean="0"/>
+              <a:t/>
+            </a:r>
+            <a:br>
+              <a:rPr lang="en-US" dirty="0" smtClean="0"/>
+            </a:br>
+            <a:r>
+              <a:rPr lang="en-US" dirty="0" smtClean="0">
+                <a:hlinkClick r:id="rId3"/>
+              </a:rPr>
+              <a:t>http://www.stuffedcow.net/research/cudabmk</a:t>
+            </a:r>
+            <a:endParaRPr lang="en-US" dirty="0" smtClean="0"/>
+          </a:p>
+          <a:p>
+            <a:r>
+              <a:rPr lang="en-US" dirty="0" err="1" smtClean="0"/>
+              <a:t>CudaDMA</a:t>
+            </a:r>
+            <a:r>
+              <a:rPr lang="en-US" dirty="0" smtClean="0"/>
+              <a:t>: Optimizing GPU Memory Bandwidth via Warp Specialization</a:t>
+            </a:r>
+            <a:br>
+              <a:rPr lang="en-US" dirty="0" smtClean="0"/>
+            </a:br>
+            <a:r>
+              <a:rPr lang="en-US" dirty="0" smtClean="0">
+                <a:hlinkClick r:id="rId4"/>
+              </a:rPr>
+              <a:t>http://www.stanford.edu/~mebauer/pdfs/cudadma-sc11.pdf</a:t>
+            </a:r>
+            <a:endParaRPr lang="en-US" dirty="0"/>
+          </a:p>
+        </p:txBody>
+      </p:sp>
+    </p:spTree>
+  </p:cSld>
+  <p:clrMapOvr>
+    <a:masterClrMapping/>
+  </p:clrMapOvr>
+  <p:timing>
+    <p:tnLst>
+      <p:par>
+        <p:cTn id="1" dur="indefinite" restart="never" nodeType="tmRoot"/>
+      </p:par>
+    </p:tnLst>
+  </p:timing>
+</p:sld>
+</file>
+
+<file path=ppt/slides/slide14.xml><?xml version="1.0" encoding="utf-8"?>
+<p:sld xmlns:a="http://schemas.openxmlformats.org/drawingml/2006/main" xmlns:r="http://schemas.openxmlformats.org/officeDocument/2006/relationships" xmlns:p="http://schemas.openxmlformats.org/presentationml/2006/main">
+  <p:cSld>
+    <p:spTree>
+      <p:nvGrpSpPr>
+        <p:cNvPr id="1" name=""/>
+        <p:cNvGrpSpPr/>
+        <p:nvPr/>
+      </p:nvGrpSpPr>
+      <p:grpSpPr>
+        <a:xfrm>
+          <a:off x="0" y="0"/>
+          <a:ext cx="0" cy="0"/>
+          <a:chOff x="0" y="0"/>
+          <a:chExt cx="0" cy="0"/>
+        </a:xfrm>
+      </p:grpSpPr>
+      <p:sp>
+        <p:nvSpPr>
+          <p:cNvPr id="2" name="Title 1"/>
+          <p:cNvSpPr>
+            <a:spLocks noGrp="1"/>
+          </p:cNvSpPr>
+          <p:nvPr>
+            <p:ph type="title"/>
+          </p:nvPr>
+        </p:nvSpPr>
+        <p:spPr/>
+        <p:txBody>
+          <a:bodyPr/>
+          <a:lstStyle/>
+          <a:p>
+            <a:r>
+              <a:rPr lang="en-US" smtClean="0"/>
+              <a:t>Interesting Bugs	 &amp; Facts</a:t>
+            </a:r>
+            <a:endParaRPr lang="en-US" dirty="0"/>
+          </a:p>
+        </p:txBody>
+      </p:sp>
+      <p:sp>
+        <p:nvSpPr>
+          <p:cNvPr id="6" name="Content Placeholder 5"/>
+          <p:cNvSpPr>
+            <a:spLocks noGrp="1"/>
+          </p:cNvSpPr>
+          <p:nvPr>
+            <p:ph idx="1"/>
+          </p:nvPr>
+        </p:nvSpPr>
+        <p:spPr/>
+        <p:txBody>
+          <a:bodyPr/>
+          <a:lstStyle/>
+          <a:p>
+            <a:r>
+              <a:rPr lang="en-US" dirty="0" smtClean="0"/>
+              <a:t>Constructors can be evil (for shared memory objects)</a:t>
+            </a:r>
+          </a:p>
+          <a:p>
+            <a:r>
+              <a:rPr lang="en-US" dirty="0" smtClean="0"/>
+              <a:t>Too many nested, </a:t>
+            </a:r>
+            <a:r>
+              <a:rPr lang="en-US" dirty="0" err="1" smtClean="0"/>
+              <a:t>inlined</a:t>
+            </a:r>
+            <a:r>
+              <a:rPr lang="en-US" dirty="0" smtClean="0"/>
+              <a:t> loops confuse the compiler: __</a:t>
+            </a:r>
+            <a:r>
+              <a:rPr lang="en-US" dirty="0" err="1" smtClean="0"/>
+              <a:t>noinline</a:t>
+            </a:r>
+            <a:r>
+              <a:rPr lang="en-US" dirty="0" smtClean="0"/>
+              <a:t>__ to the rescue!</a:t>
+            </a:r>
+          </a:p>
+          <a:p>
+            <a:r>
+              <a:rPr lang="en-US" dirty="0" smtClean="0"/>
+              <a:t>__</a:t>
+            </a:r>
+            <a:r>
+              <a:rPr lang="en-US" dirty="0" err="1" smtClean="0"/>
+              <a:t>syncthreads</a:t>
+            </a:r>
+            <a:r>
+              <a:rPr lang="en-US" dirty="0" smtClean="0"/>
+              <a:t>() should be called __</a:t>
+            </a:r>
+            <a:r>
+              <a:rPr lang="en-US" dirty="0" err="1" smtClean="0"/>
+              <a:t>syncwarps</a:t>
+            </a:r>
+            <a:r>
+              <a:rPr lang="en-US" dirty="0" smtClean="0"/>
+              <a:t>()!</a:t>
+            </a:r>
+          </a:p>
+          <a:p>
+            <a:r>
+              <a:rPr lang="en-US" dirty="0" smtClean="0"/>
+              <a:t>PTX assembly has more “features”</a:t>
+            </a:r>
+          </a:p>
+          <a:p>
+            <a:endParaRPr lang="en-US" dirty="0"/>
+          </a:p>
+        </p:txBody>
+      </p:sp>
+      <p:sp>
+        <p:nvSpPr>
+          <p:cNvPr id="4" name="Content Placeholder 2"/>
+          <p:cNvSpPr txBox="1">
+            <a:spLocks/>
+          </p:cNvSpPr>
+          <p:nvPr/>
+        </p:nvSpPr>
+        <p:spPr>
+          <a:xfrm>
+            <a:off x="457200" y="1600200"/>
+            <a:ext cx="8229600" cy="4525963"/>
+          </a:xfrm>
+          <a:prstGeom prst="rect">
+            <a:avLst/>
+          </a:prstGeom>
+        </p:spPr>
+        <p:txBody>
+          <a:bodyPr vert="horz" lIns="91440" tIns="45720" rIns="91440" bIns="45720" rtlCol="0" anchor="ctr">
+            <a:normAutofit/>
+          </a:bodyPr>
+          <a:lstStyle/>
+          <a:p>
+            <a:pPr marL="342900" marR="0" lvl="0" indent="-342900" algn="ctr" defTabSz="914400" rtl="0" eaLnBrk="1" fontAlgn="auto" latinLnBrk="0" hangingPunct="1">
+              <a:lnSpc>
+                <a:spcPct val="100000"/>
+              </a:lnSpc>
+              <a:spcBef>
+                <a:spcPct val="20000"/>
+              </a:spcBef>
+              <a:spcAft>
+                <a:spcPts val="0"/>
+              </a:spcAft>
+              <a:buClrTx/>
+              <a:buSzTx/>
+              <a:buFont typeface="Arial" pitchFamily="34" charset="0"/>
+              <a:buNone/>
+              <a:tabLst/>
+              <a:defRPr/>
+            </a:pPr>
+            <a:endParaRPr lang="en-US" sz="3200" dirty="0" smtClean="0"/>
+          </a:p>
+        </p:txBody>
+      </p:sp>
+    </p:spTree>
+  </p:cSld>
+  <p:clrMapOvr>
+    <a:masterClrMapping/>
+  </p:clrMapOvr>
+  <p:timing>
+    <p:tnLst>
+      <p:par>
+        <p:cTn id="1" dur="indefinite" restart="never" nodeType="tmRoot">
+          <p:childTnLst>
+            <p:seq concurrent="1" nextAc="seek">
+              <p:cTn id="2" dur="indefinite" nodeType="mainSeq">
+                <p:childTnLst>
+                  <p:par>
+                    <p:cTn id="3" fill="hold">
+                      <p:stCondLst>
+                        <p:cond delay="indefinite"/>
+                      </p:stCondLst>
+                      <p:childTnLst>
+                        <p:par>
+                          <p:cTn id="4" fill="hold">
+                            <p:stCondLst>
+                              <p:cond delay="0"/>
+                            </p:stCondLst>
+                            <p:childTnLst>
+                              <p:par>
+                                <p:cTn id="5" presetID="10" presetClass="entr" presetSubtype="0" fill="hold" grpId="0" nodeType="clickEffect" nodePh="1">
+                                  <p:stCondLst>
+                                    <p:cond delay="0"/>
+                                  </p:stCondLst>
+                                  <p:endCondLst>
+                                    <p:cond evt="begin" delay="0">
+                                      <p:tn val="5"/>
+                                    </p:cond>
+                                  </p:endCondLst>
+                                  <p:childTnLst>
+                                    <p:set>
+                                      <p:cBhvr>
+                                        <p:cTn id="6" dur="1" fill="hold">
+                                          <p:stCondLst>
+                                            <p:cond delay="0"/>
+                                          </p:stCondLst>
+                                        </p:cTn>
+                                        <p:tgtEl>
+                                          <p:spTgt spid="4">
+                                            <p:txEl>
+                                              <p:pRg st="0" end="0"/>
+                                            </p:txEl>
+                                          </p:spTgt>
+                                        </p:tgtEl>
+                                        <p:attrNameLst>
+                                          <p:attrName>style.visibility</p:attrName>
+                                        </p:attrNameLst>
+                                      </p:cBhvr>
+                                      <p:to>
+                                        <p:strVal val="visible"/>
+                                      </p:to>
+                                    </p:set>
+                                    <p:animEffect transition="in" filter="fade">
+                                      <p:cBhvr>
+                                        <p:cTn id="7" dur="500"/>
+                                        <p:tgtEl>
+                                          <p:spTgt spid="4">
+                                            <p:txEl>
+                                              <p:pRg st="0" end="0"/>
+                                            </p:txEl>
+                                          </p:spTgt>
+                                        </p:tgtEl>
+                                      </p:cBhvr>
+                                    </p:animEffect>
+                                  </p:childTnLst>
+                                </p:cTn>
+                              </p:par>
+                            </p:childTnLst>
+                          </p:cTn>
+                        </p:par>
+                      </p:childTnLst>
+                    </p:cTn>
+                  </p:par>
+                </p:childTnLst>
+              </p:cTn>
+              <p:prevCondLst>
+                <p:cond evt="onPrev" delay="0">
+                  <p:tgtEl>
+                    <p:sldTgt/>
+                  </p:tgtEl>
+                </p:cond>
+              </p:prevCondLst>
+              <p:nextCondLst>
+                <p:cond evt="onNext" delay="0">
+                  <p:tgtEl>
+                    <p:sldTgt/>
+                  </p:tgtEl>
+                </p:cond>
+              </p:nextCondLst>
+            </p:seq>
+          </p:childTnLst>
+        </p:cTn>
+      </p:par>
+    </p:tnLst>
+    <p:bldLst>
+      <p:bldP spid="4" grpId="0" build="p"/>
+    </p:bldLst>
+  </p:timing>
+</p:sld>
+</file>
+
+<file path=ppt/slides/slide15.xml><?xml version="1.0" encoding="utf-8"?>
+<p:sld xmlns:a="http://schemas.openxmlformats.org/drawingml/2006/main" xmlns:r="http://schemas.openxmlformats.org/officeDocument/2006/relationships" xmlns:p="http://schemas.openxmlformats.org/presentationml/2006/main">
+  <p:cSld>
+    <p:spTree>
+      <p:nvGrpSpPr>
+        <p:cNvPr id="1" name=""/>
+        <p:cNvGrpSpPr/>
+        <p:nvPr/>
+      </p:nvGrpSpPr>
+      <p:grpSpPr>
+        <a:xfrm>
+          <a:off x="0" y="0"/>
+          <a:ext cx="0" cy="0"/>
+          <a:chOff x="0" y="0"/>
+          <a:chExt cx="0" cy="0"/>
+        </a:xfrm>
+      </p:grpSpPr>
+      <p:sp>
+        <p:nvSpPr>
+          <p:cNvPr id="2" name="Title 1"/>
+          <p:cNvSpPr>
+            <a:spLocks noGrp="1"/>
+          </p:cNvSpPr>
+          <p:nvPr>
+            <p:ph type="title"/>
+          </p:nvPr>
+        </p:nvSpPr>
+        <p:spPr/>
+        <p:txBody>
+          <a:bodyPr/>
+          <a:lstStyle/>
+          <a:p>
+            <a:r>
+              <a:rPr lang="en-US" dirty="0" smtClean="0"/>
+              <a:t>Lessons learned</a:t>
+            </a:r>
+            <a:endParaRPr lang="en-US" dirty="0"/>
+          </a:p>
+        </p:txBody>
+      </p:sp>
+      <p:sp>
+        <p:nvSpPr>
+          <p:cNvPr id="3" name="Content Placeholder 2"/>
+          <p:cNvSpPr>
+            <a:spLocks noGrp="1"/>
+          </p:cNvSpPr>
+          <p:nvPr>
+            <p:ph idx="1"/>
+          </p:nvPr>
+        </p:nvSpPr>
+        <p:spPr/>
+        <p:txBody>
+          <a:bodyPr/>
+          <a:lstStyle/>
+          <a:p>
+            <a:r>
+              <a:rPr lang="en-US" dirty="0" smtClean="0"/>
+              <a:t>Benchmark early and benchmark often!</a:t>
+            </a:r>
+          </a:p>
+          <a:p>
+            <a:r>
+              <a:rPr lang="en-US" dirty="0" smtClean="0"/>
+              <a:t>Write down expectations and how to verify them before implementing anything</a:t>
+            </a:r>
+          </a:p>
+          <a:p>
+            <a:r>
+              <a:rPr lang="en-US" dirty="0" smtClean="0"/>
+              <a:t>Iterate multiple times and throw away old code</a:t>
+            </a:r>
+          </a:p>
+          <a:p>
+            <a:endParaRPr lang="en-US" dirty="0"/>
+          </a:p>
+        </p:txBody>
+      </p:sp>
+    </p:spTree>
+  </p:cSld>
+  <p:clrMapOvr>
+    <a:masterClrMapping/>
+  </p:clrMapOvr>
+  <p:timing>
+    <p:tnLst>
+      <p:par>
+        <p:cTn id="1" dur="indefinite" restart="never" nodeType="tmRoot"/>
+      </p:par>
+    </p:tnLst>
+  </p:timing>
+</p:sld>
+</file>
+
+<file path=ppt/slides/slide16.xml><?xml version="1.0" encoding="utf-8"?>
+<p:sld xmlns:a="http://schemas.openxmlformats.org/drawingml/2006/main" xmlns:r="http://schemas.openxmlformats.org/officeDocument/2006/relationships" xmlns:p="http://schemas.openxmlformats.org/presentationml/2006/main">
+  <p:cSld>
+    <p:spTree>
+      <p:nvGrpSpPr>
+        <p:cNvPr id="1" name=""/>
+        <p:cNvGrpSpPr/>
+        <p:nvPr/>
+      </p:nvGrpSpPr>
+      <p:grpSpPr>
+        <a:xfrm>
+          <a:off x="0" y="0"/>
+          <a:ext cx="0" cy="0"/>
+          <a:chOff x="0" y="0"/>
+          <a:chExt cx="0" cy="0"/>
+        </a:xfrm>
+      </p:grpSpPr>
+      <p:sp>
+        <p:nvSpPr>
+          <p:cNvPr id="2" name="Title 1"/>
+          <p:cNvSpPr>
+            <a:spLocks noGrp="1"/>
+          </p:cNvSpPr>
+          <p:nvPr>
+            <p:ph type="title"/>
+          </p:nvPr>
+        </p:nvSpPr>
+        <p:spPr/>
+        <p:txBody>
+          <a:bodyPr/>
+          <a:lstStyle/>
+          <a:p>
+            <a:endParaRPr lang="en-US" dirty="0"/>
+          </a:p>
+        </p:txBody>
+      </p:sp>
+      <p:sp>
+        <p:nvSpPr>
+          <p:cNvPr id="3" name="Content Placeholder 2"/>
+          <p:cNvSpPr>
+            <a:spLocks noGrp="1"/>
+          </p:cNvSpPr>
+          <p:nvPr>
+            <p:ph idx="1"/>
+          </p:nvPr>
+        </p:nvSpPr>
+        <p:spPr>
+          <a:xfrm>
+            <a:off x="457200" y="1600200"/>
+            <a:ext cx="8229600" cy="4525963"/>
+          </a:xfrm>
+        </p:spPr>
+        <p:txBody>
+          <a:bodyPr anchor="ctr">
+            <a:normAutofit/>
+          </a:bodyPr>
+          <a:lstStyle/>
+          <a:p>
+            <a:pPr algn="ctr">
+              <a:buNone/>
+            </a:pPr>
+            <a:r>
+              <a:rPr lang="en-US" sz="6000" dirty="0" smtClean="0"/>
+              <a:t>Thank You!</a:t>
+            </a:r>
+            <a:endParaRPr lang="en-US" sz="6000" dirty="0"/>
+          </a:p>
+        </p:txBody>
+      </p:sp>
+    </p:spTree>
+  </p:cSld>
+  <p:clrMapOvr>
+    <a:masterClrMapping/>
+  </p:clrMapOvr>
+  <p:timing>
+    <p:tnLst>
+      <p:par>
+        <p:cTn id="1" dur="indefinite" restart="never" nodeType="tmRoot"/>
+      </p:par>
+    </p:tnLst>
+  </p:timing>
+</p:sld>
+</file>
+
+<file path=ppt/slides/slide2.xml><?xml version="1.0" encoding="utf-8"?>
+<p:sld xmlns:a="http://schemas.openxmlformats.org/drawingml/2006/main" xmlns:r="http://schemas.openxmlformats.org/officeDocument/2006/relationships" xmlns:p="http://schemas.openxmlformats.org/presentationml/2006/main">
+  <p:cSld>
+    <p:spTree>
+      <p:nvGrpSpPr>
+        <p:cNvPr id="1" name=""/>
+        <p:cNvGrpSpPr/>
+        <p:nvPr/>
+      </p:nvGrpSpPr>
+      <p:grpSpPr>
+        <a:xfrm>
+          <a:off x="0" y="0"/>
+          <a:ext cx="0" cy="0"/>
+          <a:chOff x="0" y="0"/>
+          <a:chExt cx="0" cy="0"/>
+        </a:xfrm>
+      </p:grpSpPr>
+      <p:sp>
+        <p:nvSpPr>
+          <p:cNvPr id="2" name="Title 1"/>
+          <p:cNvSpPr>
+            <a:spLocks noGrp="1"/>
+          </p:cNvSpPr>
+          <p:nvPr>
+            <p:ph type="title"/>
+          </p:nvPr>
+        </p:nvSpPr>
+        <p:spPr/>
+        <p:txBody>
+          <a:bodyPr/>
+          <a:lstStyle/>
+          <a:p>
+            <a:r>
+              <a:rPr lang="en-US" dirty="0" smtClean="0"/>
+              <a:t>Molecule Interactions</a:t>
+            </a:r>
+            <a:endParaRPr lang="en-US" dirty="0"/>
+          </a:p>
+        </p:txBody>
+      </p:sp>
+      <p:sp>
+        <p:nvSpPr>
+          <p:cNvPr id="3" name="Content Placeholder 2"/>
+          <p:cNvSpPr>
+            <a:spLocks noGrp="1"/>
+          </p:cNvSpPr>
+          <p:nvPr>
+            <p:ph idx="1"/>
+          </p:nvPr>
+        </p:nvSpPr>
+        <p:spPr/>
+        <p:txBody>
+          <a:bodyPr>
+            <a:normAutofit lnSpcReduction="10000"/>
+          </a:bodyPr>
+          <a:lstStyle/>
+          <a:p>
+            <a:r>
+              <a:rPr lang="en-US" dirty="0" smtClean="0"/>
+              <a:t>One molecule can be made up of multiple sites</a:t>
+            </a:r>
+          </a:p>
+          <a:p>
+            <a:r>
+              <a:rPr lang="en-US" dirty="0" smtClean="0"/>
+              <a:t>Different potentials possible for the sites: </a:t>
+            </a:r>
+            <a:r>
+              <a:rPr lang="en-US" b="1" dirty="0" err="1" smtClean="0"/>
+              <a:t>Lennard</a:t>
+            </a:r>
+            <a:r>
+              <a:rPr lang="en-US" b="1" dirty="0" smtClean="0"/>
+              <a:t>-Jones</a:t>
+            </a:r>
+            <a:r>
+              <a:rPr lang="en-US" dirty="0" smtClean="0"/>
+              <a:t>, </a:t>
+            </a:r>
+            <a:r>
+              <a:rPr lang="en-US" b="1" dirty="0" smtClean="0"/>
+              <a:t>Charges</a:t>
+            </a:r>
+            <a:r>
+              <a:rPr lang="en-US" dirty="0" smtClean="0"/>
+              <a:t>, </a:t>
+            </a:r>
+            <a:r>
+              <a:rPr lang="en-US" b="1" dirty="0" smtClean="0"/>
+              <a:t>Dipoles</a:t>
+            </a:r>
+          </a:p>
+          <a:p>
+            <a:r>
+              <a:rPr lang="en-US" dirty="0" smtClean="0"/>
+              <a:t>Interactions need to be calculated between all molecule pairs</a:t>
+            </a:r>
+          </a:p>
+          <a:p>
+            <a:r>
+              <a:rPr lang="en-US" dirty="0" smtClean="0"/>
+              <a:t>Simplification: use a cutoff radius to reduce the number of interactions</a:t>
+            </a:r>
+          </a:p>
+          <a:p>
+            <a:r>
+              <a:rPr lang="en-US" dirty="0" smtClean="0"/>
+              <a:t>Result: Linked Cell Algorithm</a:t>
+            </a:r>
+          </a:p>
+          <a:p>
+            <a:endParaRPr lang="en-US" dirty="0" smtClean="0"/>
+          </a:p>
+          <a:p>
+            <a:endParaRPr lang="en-US" dirty="0"/>
+          </a:p>
+        </p:txBody>
+      </p:sp>
+    </p:spTree>
+  </p:cSld>
+  <p:clrMapOvr>
+    <a:masterClrMapping/>
+  </p:clrMapOvr>
+  <p:timing>
+    <p:tnLst>
+      <p:par>
+        <p:cTn id="1" dur="indefinite" restart="never" nodeType="tmRoot"/>
+      </p:par>
+    </p:tnLst>
+  </p:timing>
+</p:sld>
+</file>
+
+<file path=ppt/slides/slide3.xml><?xml version="1.0" encoding="utf-8"?>
+<p:sld xmlns:a="http://schemas.openxmlformats.org/drawingml/2006/main" xmlns:r="http://schemas.openxmlformats.org/officeDocument/2006/relationships" xmlns:p="http://schemas.openxmlformats.org/presentationml/2006/main">
+  <p:cSld>
+    <p:spTree>
+      <p:nvGrpSpPr>
+        <p:cNvPr id="1" name=""/>
+        <p:cNvGrpSpPr/>
+        <p:nvPr/>
+      </p:nvGrpSpPr>
+      <p:grpSpPr>
+        <a:xfrm>
+          <a:off x="0" y="0"/>
+          <a:ext cx="0" cy="0"/>
+          <a:chOff x="0" y="0"/>
+          <a:chExt cx="0" cy="0"/>
+        </a:xfrm>
+      </p:grpSpPr>
+      <p:sp>
+        <p:nvSpPr>
+          <p:cNvPr id="2" name="Title 1"/>
+          <p:cNvSpPr>
+            <a:spLocks noGrp="1"/>
+          </p:cNvSpPr>
+          <p:nvPr>
+            <p:ph type="title"/>
+          </p:nvPr>
+        </p:nvSpPr>
+        <p:spPr/>
+        <p:txBody>
+          <a:bodyPr>
+            <a:normAutofit/>
+          </a:bodyPr>
+          <a:lstStyle/>
+          <a:p>
+            <a:r>
+              <a:rPr lang="en-US" dirty="0" smtClean="0"/>
+              <a:t>Modules and Dependencies</a:t>
+            </a:r>
+            <a:endParaRPr lang="en-US" dirty="0"/>
+          </a:p>
+        </p:txBody>
+      </p:sp>
+      <p:pic>
+        <p:nvPicPr>
+          <p:cNvPr id="8" name="Content Placeholder 7" descr="component_dependencies.png"/>
+          <p:cNvPicPr>
+            <a:picLocks noGrp="1" noChangeAspect="1"/>
+          </p:cNvPicPr>
+          <p:nvPr>
+            <p:ph idx="1"/>
+          </p:nvPr>
+        </p:nvPicPr>
+        <p:blipFill>
+          <a:blip r:embed="rId2" cstate="print"/>
+          <a:stretch>
+            <a:fillRect/>
+          </a:stretch>
+        </p:blipFill>
+        <p:spPr>
+          <a:xfrm>
+            <a:off x="28641" y="1295400"/>
+            <a:ext cx="9086718" cy="5411191"/>
+          </a:xfrm>
+        </p:spPr>
+      </p:pic>
+    </p:spTree>
+  </p:cSld>
+  <p:clrMapOvr>
+    <a:masterClrMapping/>
+  </p:clrMapOvr>
+  <p:timing>
+    <p:tnLst>
+      <p:par>
+        <p:cTn id="1" dur="indefinite" restart="never" nodeType="tmRoot"/>
+      </p:par>
+    </p:tnLst>
+  </p:timing>
+</p:sld>
+</file>
+
+<file path=ppt/slides/slide4.xml><?xml version="1.0" encoding="utf-8"?>
+<p:sld xmlns:a="http://schemas.openxmlformats.org/drawingml/2006/main" xmlns:r="http://schemas.openxmlformats.org/officeDocument/2006/relationships" xmlns:p="http://schemas.openxmlformats.org/presentationml/2006/main">
+  <p:cSld>
+    <p:spTree>
+      <p:nvGrpSpPr>
+        <p:cNvPr id="1" name=""/>
+        <p:cNvGrpSpPr/>
+        <p:nvPr/>
+      </p:nvGrpSpPr>
+      <p:grpSpPr>
+        <a:xfrm>
+          <a:off x="0" y="0"/>
+          <a:ext cx="0" cy="0"/>
+          <a:chOff x="0" y="0"/>
+          <a:chExt cx="0" cy="0"/>
+        </a:xfrm>
+      </p:grpSpPr>
+      <p:sp>
+        <p:nvSpPr>
+          <p:cNvPr id="2" name="Title 1"/>
+          <p:cNvSpPr>
+            <a:spLocks noGrp="1"/>
+          </p:cNvSpPr>
+          <p:nvPr>
+            <p:ph type="title"/>
+          </p:nvPr>
+        </p:nvSpPr>
+        <p:spPr/>
+        <p:txBody>
+          <a:bodyPr/>
+          <a:lstStyle/>
+          <a:p>
+            <a:r>
+              <a:rPr lang="en-US" dirty="0" smtClean="0"/>
+              <a:t>CUDA Architecture</a:t>
+            </a:r>
+            <a:endParaRPr lang="en-US" dirty="0"/>
+          </a:p>
+        </p:txBody>
+      </p:sp>
+      <p:sp>
+        <p:nvSpPr>
+          <p:cNvPr id="3" name="Content Placeholder 2"/>
+          <p:cNvSpPr>
+            <a:spLocks noGrp="1"/>
+          </p:cNvSpPr>
+          <p:nvPr>
+            <p:ph idx="1"/>
+          </p:nvPr>
+        </p:nvSpPr>
+        <p:spPr/>
+        <p:txBody>
+          <a:bodyPr/>
+          <a:lstStyle/>
+          <a:p>
+            <a:pPr>
+              <a:buNone/>
+            </a:pPr>
+            <a:r>
+              <a:rPr lang="en-US" dirty="0" smtClean="0"/>
+              <a:t>See the CUDA Programming Guide..</a:t>
+            </a:r>
+            <a:endParaRPr lang="en-US" dirty="0"/>
+          </a:p>
+        </p:txBody>
+      </p:sp>
+    </p:spTree>
+  </p:cSld>
+  <p:clrMapOvr>
+    <a:masterClrMapping/>
+  </p:clrMapOvr>
+  <p:timing>
+    <p:tnLst>
+      <p:par>
+        <p:cTn id="1" dur="indefinite" restart="never" nodeType="tmRoot"/>
+      </p:par>
+    </p:tnLst>
+  </p:timing>
+</p:sld>
+</file>
+
+<file path=ppt/slides/slide5.xml><?xml version="1.0" encoding="utf-8"?>
+<p:sld xmlns:a="http://schemas.openxmlformats.org/drawingml/2006/main" xmlns:r="http://schemas.openxmlformats.org/officeDocument/2006/relationships" xmlns:p="http://schemas.openxmlformats.org/presentationml/2006/main">
+  <p:cSld>
+    <p:spTree>
+      <p:nvGrpSpPr>
+        <p:cNvPr id="1" name=""/>
+        <p:cNvGrpSpPr/>
+        <p:nvPr/>
+      </p:nvGrpSpPr>
+      <p:grpSpPr>
+        <a:xfrm>
+          <a:off x="0" y="0"/>
+          <a:ext cx="0" cy="0"/>
+          <a:chOff x="0" y="0"/>
+          <a:chExt cx="0" cy="0"/>
+        </a:xfrm>
+      </p:grpSpPr>
+      <p:sp>
+        <p:nvSpPr>
+          <p:cNvPr id="2" name="Title 1"/>
+          <p:cNvSpPr>
+            <a:spLocks noGrp="1"/>
+          </p:cNvSpPr>
+          <p:nvPr>
+            <p:ph type="title"/>
+          </p:nvPr>
+        </p:nvSpPr>
+        <p:spPr/>
+        <p:txBody>
+          <a:bodyPr/>
+          <a:lstStyle/>
+          <a:p>
+            <a:r>
+              <a:rPr lang="en-US" dirty="0" smtClean="0"/>
+              <a:t>Performance (lj2d1)</a:t>
+            </a:r>
+            <a:endParaRPr lang="en-US" dirty="0"/>
+          </a:p>
+        </p:txBody>
+      </p:sp>
+      <p:graphicFrame>
+        <p:nvGraphicFramePr>
+          <p:cNvPr id="7" name="Content Placeholder 3"/>
+          <p:cNvGraphicFramePr>
+            <a:graphicFrameLocks noGrp="1"/>
+          </p:cNvGraphicFramePr>
+          <p:nvPr/>
+        </p:nvGraphicFramePr>
+        <p:xfrm>
+          <a:off x="0" y="1805957"/>
+          <a:ext cx="9186176" cy="5052043"/>
+        </p:xfrm>
+        <a:graphic>
+          <a:graphicData uri="http://schemas.openxmlformats.org/drawingml/2006/chart">
+            <c:chart xmlns:c="http://schemas.openxmlformats.org/drawingml/2006/chart" xmlns:r="http://schemas.openxmlformats.org/officeDocument/2006/relationships" r:id="rId3"/>
+          </a:graphicData>
+        </a:graphic>
+      </p:graphicFrame>
+    </p:spTree>
+  </p:cSld>
+  <p:clrMapOvr>
+    <a:masterClrMapping/>
+  </p:clrMapOvr>
+  <p:timing>
+    <p:tnLst>
+      <p:par>
+        <p:cTn id="1" dur="indefinite" restart="never" nodeType="tmRoot"/>
+      </p:par>
+    </p:tnLst>
+  </p:timing>
+</p:sld>
+</file>
+
+<file path=ppt/slides/slide6.xml><?xml version="1.0" encoding="utf-8"?>
+<p:sld xmlns:a="http://schemas.openxmlformats.org/drawingml/2006/main" xmlns:r="http://schemas.openxmlformats.org/officeDocument/2006/relationships" xmlns:p="http://schemas.openxmlformats.org/presentationml/2006/main">
+  <p:cSld>
+    <p:spTree>
+      <p:nvGrpSpPr>
+        <p:cNvPr id="1" name=""/>
+        <p:cNvGrpSpPr/>
+        <p:nvPr/>
+      </p:nvGrpSpPr>
+      <p:grpSpPr>
+        <a:xfrm>
+          <a:off x="0" y="0"/>
+          <a:ext cx="0" cy="0"/>
+          <a:chOff x="0" y="0"/>
+          <a:chExt cx="0" cy="0"/>
+        </a:xfrm>
+      </p:grpSpPr>
+      <p:sp>
+        <p:nvSpPr>
+          <p:cNvPr id="2" name="Title 1"/>
+          <p:cNvSpPr>
+            <a:spLocks noGrp="1"/>
+          </p:cNvSpPr>
+          <p:nvPr>
+            <p:ph type="title"/>
+          </p:nvPr>
+        </p:nvSpPr>
+        <p:spPr/>
+        <p:txBody>
+          <a:bodyPr/>
+          <a:lstStyle/>
+          <a:p>
+            <a:r>
+              <a:rPr lang="en-US" dirty="0" smtClean="0"/>
+              <a:t>Performance (lj1)</a:t>
+            </a:r>
+            <a:endParaRPr lang="en-US" dirty="0"/>
+          </a:p>
+        </p:txBody>
+      </p:sp>
+      <p:graphicFrame>
+        <p:nvGraphicFramePr>
+          <p:cNvPr id="7" name="Content Placeholder 6"/>
+          <p:cNvGraphicFramePr>
+            <a:graphicFrameLocks noGrp="1"/>
+          </p:cNvGraphicFramePr>
+          <p:nvPr>
+            <p:ph idx="1"/>
+          </p:nvPr>
+        </p:nvGraphicFramePr>
+        <p:xfrm>
+          <a:off x="-320" y="1600200"/>
+          <a:ext cx="9144640" cy="5029200"/>
+        </p:xfrm>
+        <a:graphic>
+          <a:graphicData uri="http://schemas.openxmlformats.org/drawingml/2006/chart">
+            <c:chart xmlns:c="http://schemas.openxmlformats.org/drawingml/2006/chart" xmlns:r="http://schemas.openxmlformats.org/officeDocument/2006/relationships" r:id="rId3"/>
+          </a:graphicData>
+        </a:graphic>
+      </p:graphicFrame>
+    </p:spTree>
+  </p:cSld>
+  <p:clrMapOvr>
+    <a:masterClrMapping/>
+  </p:clrMapOvr>
+  <p:timing>
+    <p:tnLst>
+      <p:par>
+        <p:cTn id="1" dur="indefinite" restart="never" nodeType="tmRoot"/>
+      </p:par>
+    </p:tnLst>
+  </p:timing>
+</p:sld>
+</file>
+
+<file path=ppt/slides/slide7.xml><?xml version="1.0" encoding="utf-8"?>
+<p:sld xmlns:a="http://schemas.openxmlformats.org/drawingml/2006/main" xmlns:r="http://schemas.openxmlformats.org/officeDocument/2006/relationships" xmlns:p="http://schemas.openxmlformats.org/presentationml/2006/main">
+  <p:cSld>
+    <p:spTree>
+      <p:nvGrpSpPr>
+        <p:cNvPr id="1" name=""/>
+        <p:cNvGrpSpPr/>
+        <p:nvPr/>
+      </p:nvGrpSpPr>
+      <p:grpSpPr>
+        <a:xfrm>
+          <a:off x="0" y="0"/>
+          <a:ext cx="0" cy="0"/>
+          <a:chOff x="0" y="0"/>
+          <a:chExt cx="0" cy="0"/>
+        </a:xfrm>
+      </p:grpSpPr>
+      <p:sp>
+        <p:nvSpPr>
+          <p:cNvPr id="2" name="Title 1"/>
+          <p:cNvSpPr>
+            <a:spLocks noGrp="1"/>
+          </p:cNvSpPr>
+          <p:nvPr>
+            <p:ph type="title"/>
+          </p:nvPr>
+        </p:nvSpPr>
+        <p:spPr>
+          <a:xfrm>
+            <a:off x="457200" y="274638"/>
+            <a:ext cx="8229600" cy="563562"/>
+          </a:xfrm>
+        </p:spPr>
+        <p:txBody>
+          <a:bodyPr>
+            <a:normAutofit fontScale="90000"/>
+          </a:bodyPr>
+          <a:lstStyle/>
+          <a:p>
+            <a:r>
+              <a:rPr lang="en-US" dirty="0" smtClean="0"/>
+              <a:t>Thread Block Cell Processor</a:t>
+            </a:r>
+            <a:endParaRPr lang="en-US" dirty="0"/>
+          </a:p>
+        </p:txBody>
+      </p:sp>
+      <p:pic>
+        <p:nvPicPr>
+          <p:cNvPr id="4" name="Content Placeholder 3" descr="cellprocessor_block_iteration.png"/>
+          <p:cNvPicPr>
+            <a:picLocks noGrp="1" noChangeAspect="1"/>
+          </p:cNvPicPr>
+          <p:nvPr>
+            <p:ph idx="1"/>
+          </p:nvPr>
+        </p:nvPicPr>
+        <p:blipFill>
+          <a:blip r:embed="rId3" cstate="print"/>
+          <a:stretch>
+            <a:fillRect/>
+          </a:stretch>
+        </p:blipFill>
+        <p:spPr>
+          <a:xfrm>
+            <a:off x="1562100" y="815181"/>
+            <a:ext cx="6019800" cy="6019800"/>
+          </a:xfrm>
+        </p:spPr>
+      </p:pic>
+    </p:spTree>
+  </p:cSld>
+  <p:clrMapOvr>
+    <a:masterClrMapping/>
+  </p:clrMapOvr>
+  <p:timing>
+    <p:tnLst>
+      <p:par>
+        <p:cTn id="1" dur="indefinite" restart="never" nodeType="tmRoot"/>
+      </p:par>
+    </p:tnLst>
+  </p:timing>
+</p:sld>
+</file>
+
+<file path=ppt/slides/slide8.xml><?xml version="1.0" encoding="utf-8"?>
+<p:sld xmlns:a="http://schemas.openxmlformats.org/drawingml/2006/main" xmlns:r="http://schemas.openxmlformats.org/officeDocument/2006/relationships" xmlns:p="http://schemas.openxmlformats.org/presentationml/2006/main">
+  <p:cSld>
+    <p:spTree>
+      <p:nvGrpSpPr>
+        <p:cNvPr id="1" name=""/>
+        <p:cNvGrpSpPr/>
+        <p:nvPr/>
+      </p:nvGrpSpPr>
+      <p:grpSpPr>
+        <a:xfrm>
+          <a:off x="0" y="0"/>
+          <a:ext cx="0" cy="0"/>
+          <a:chOff x="0" y="0"/>
+          <a:chExt cx="0" cy="0"/>
+        </a:xfrm>
+      </p:grpSpPr>
+      <p:sp>
+        <p:nvSpPr>
+          <p:cNvPr id="2" name="Title 1"/>
+          <p:cNvSpPr>
+            <a:spLocks noGrp="1"/>
+          </p:cNvSpPr>
+          <p:nvPr>
+            <p:ph type="title"/>
+          </p:nvPr>
+        </p:nvSpPr>
+        <p:spPr/>
+        <p:txBody>
+          <a:bodyPr/>
+          <a:lstStyle/>
+          <a:p>
+            <a:r>
+              <a:rPr lang="en-US" dirty="0" smtClean="0"/>
+              <a:t>Warp Block Cell Processor</a:t>
+            </a:r>
+            <a:endParaRPr lang="en-US" dirty="0"/>
+          </a:p>
+        </p:txBody>
+      </p:sp>
+      <p:sp>
+        <p:nvSpPr>
+          <p:cNvPr id="3" name="Content Placeholder 2"/>
+          <p:cNvSpPr>
+            <a:spLocks noGrp="1"/>
+          </p:cNvSpPr>
+          <p:nvPr>
+            <p:ph idx="1"/>
+          </p:nvPr>
+        </p:nvSpPr>
+        <p:spPr/>
+        <p:txBody>
+          <a:bodyPr/>
+          <a:lstStyle/>
+          <a:p>
+            <a:r>
+              <a:rPr lang="en-US" dirty="0" smtClean="0"/>
+              <a:t>Dynamic scheduler</a:t>
+            </a:r>
+          </a:p>
+          <a:p>
+            <a:r>
+              <a:rPr lang="en-US" dirty="0" smtClean="0"/>
+              <a:t>Jobs queue</a:t>
+            </a:r>
+          </a:p>
+          <a:p>
+            <a:r>
+              <a:rPr lang="en-US" dirty="0" smtClean="0"/>
+              <a:t>No instruction-level synchronization</a:t>
+            </a:r>
+          </a:p>
+          <a:p>
+            <a:r>
+              <a:rPr lang="en-US" dirty="0" smtClean="0"/>
+              <a:t>Memory-level synchronization (via spin locks)</a:t>
+            </a:r>
+          </a:p>
+        </p:txBody>
+      </p:sp>
+    </p:spTree>
+  </p:cSld>
+  <p:clrMapOvr>
+    <a:masterClrMapping/>
+  </p:clrMapOvr>
+  <p:timing>
+    <p:tnLst>
+      <p:par>
+        <p:cTn id="1" dur="indefinite" restart="never" nodeType="tmRoot"/>
+      </p:par>
+    </p:tnLst>
+  </p:timing>
+</p:sld>
+</file>
+
+<file path=ppt/slides/slide9.xml><?xml version="1.0" encoding="utf-8"?>
+<p:sld xmlns:a="http://schemas.openxmlformats.org/drawingml/2006/main" xmlns:r="http://schemas.openxmlformats.org/officeDocument/2006/relationships" xmlns:p="http://schemas.openxmlformats.org/presentationml/2006/main">
+  <p:cSld>
+    <p:spTree>
+      <p:nvGrpSpPr>
+        <p:cNvPr id="1" name=""/>
+        <p:cNvGrpSpPr/>
+        <p:nvPr/>
+      </p:nvGrpSpPr>
+      <p:grpSpPr>
+        <a:xfrm>
+          <a:off x="0" y="0"/>
+          <a:ext cx="0" cy="0"/>
+          <a:chOff x="0" y="0"/>
+          <a:chExt cx="0" cy="0"/>
+        </a:xfrm>
+      </p:grpSpPr>
+      <p:sp>
+        <p:nvSpPr>
+          <p:cNvPr id="2" name="Title 1"/>
+          <p:cNvSpPr>
+            <a:spLocks noGrp="1"/>
+          </p:cNvSpPr>
+          <p:nvPr>
+            <p:ph type="title"/>
+          </p:nvPr>
+        </p:nvSpPr>
+        <p:spPr/>
+        <p:txBody>
+          <a:bodyPr/>
+          <a:lstStyle/>
+          <a:p>
+            <a:r>
+              <a:rPr lang="en-US" smtClean="0"/>
+              <a:t>Optimizations</a:t>
+            </a:r>
+            <a:endParaRPr lang="en-US" dirty="0"/>
+          </a:p>
+        </p:txBody>
+      </p:sp>
+      <p:sp>
+        <p:nvSpPr>
+          <p:cNvPr id="5" name="Content Placeholder 4"/>
+          <p:cNvSpPr>
+            <a:spLocks noGrp="1"/>
+          </p:cNvSpPr>
+          <p:nvPr>
+            <p:ph idx="1"/>
+          </p:nvPr>
+        </p:nvSpPr>
+        <p:spPr/>
+        <p:txBody>
+          <a:bodyPr>
+            <a:normAutofit fontScale="92500" lnSpcReduction="20000"/>
+          </a:bodyPr>
+          <a:lstStyle/>
+          <a:p>
+            <a:r>
+              <a:rPr lang="en-US" dirty="0" smtClean="0"/>
+              <a:t>Shared memory </a:t>
+            </a:r>
+            <a:r>
+              <a:rPr lang="en-US" dirty="0" smtClean="0"/>
+              <a:t>cache</a:t>
+            </a:r>
+            <a:br>
+              <a:rPr lang="en-US" dirty="0" smtClean="0"/>
+            </a:br>
+            <a:r>
+              <a:rPr lang="en-US" b="1" i="1" dirty="0" smtClean="0"/>
+              <a:t>Shared </a:t>
+            </a:r>
+            <a:r>
+              <a:rPr lang="en-US" b="1" i="1" dirty="0" smtClean="0"/>
+              <a:t>memory results differ for TBCP and WBCP</a:t>
+            </a:r>
+          </a:p>
+          <a:p>
+            <a:endParaRPr lang="en-US" dirty="0" smtClean="0"/>
+          </a:p>
+          <a:p>
+            <a:r>
+              <a:rPr lang="en-US" dirty="0" smtClean="0"/>
+              <a:t>Constant </a:t>
+            </a:r>
+            <a:r>
+              <a:rPr lang="en-US" dirty="0" smtClean="0"/>
+              <a:t>memory</a:t>
+            </a:r>
+            <a:br>
+              <a:rPr lang="en-US" dirty="0" smtClean="0"/>
+            </a:br>
+            <a:r>
+              <a:rPr lang="en-US" b="1" i="1" dirty="0" smtClean="0"/>
+              <a:t>Constant </a:t>
+            </a:r>
+            <a:r>
+              <a:rPr lang="en-US" b="1" i="1" dirty="0" smtClean="0"/>
+              <a:t>memory was a good idea</a:t>
+            </a:r>
+          </a:p>
+          <a:p>
+            <a:endParaRPr lang="en-US" dirty="0" smtClean="0"/>
+          </a:p>
+          <a:p>
+            <a:r>
+              <a:rPr lang="en-US" strike="sngStrike" dirty="0" smtClean="0"/>
+              <a:t>Non-interleaved </a:t>
+            </a:r>
+            <a:r>
+              <a:rPr lang="en-US" strike="sngStrike" dirty="0" smtClean="0"/>
+              <a:t>storage</a:t>
+            </a:r>
+            <a:br>
+              <a:rPr lang="en-US" strike="sngStrike" dirty="0" smtClean="0"/>
+            </a:br>
+            <a:r>
+              <a:rPr lang="en-US" b="1" i="1" dirty="0" smtClean="0"/>
+              <a:t>Non-interleaved </a:t>
+            </a:r>
+            <a:r>
+              <a:rPr lang="en-US" b="1" i="1" dirty="0" smtClean="0"/>
+              <a:t>storage failed because of temporarily sparse access patterns (more cache misses with non-interleaved data)</a:t>
+            </a:r>
+          </a:p>
+          <a:p>
+            <a:endParaRPr lang="en-US" dirty="0"/>
+          </a:p>
+        </p:txBody>
+      </p:sp>
+    </p:spTree>
+  </p:cSld>
+  <p:clrMapOvr>
+    <a:masterClrMapping/>
+  </p:clrMapOvr>
+  <p:timing>
+    <p:tnLst>
+      <p:par>
+        <p:cTn id="1" dur="indefinite" restart="never" nodeType="tmRoot"/>
       </p:par>
     </p:tnLst>
   </p:timing>

</xml_diff>